<commit_message>
Add use to top of scripts
Add use to top of scripts
</commit_message>
<xml_diff>
--- a/PSSUG_202511.pptx
+++ b/PSSUG_202511.pptx
@@ -5,27 +5,31 @@
     <p:sldMasterId id="2147483648" r:id="rId4"/>
   </p:sldMasterIdLst>
   <p:notesMasterIdLst>
-    <p:notesMasterId r:id="rId20"/>
+    <p:notesMasterId r:id="rId24"/>
   </p:notesMasterIdLst>
   <p:handoutMasterIdLst>
-    <p:handoutMasterId r:id="rId21"/>
+    <p:handoutMasterId r:id="rId25"/>
   </p:handoutMasterIdLst>
   <p:sldIdLst>
     <p:sldId id="342" r:id="rId5"/>
     <p:sldId id="359" r:id="rId6"/>
-    <p:sldId id="373" r:id="rId7"/>
-    <p:sldId id="383" r:id="rId8"/>
-    <p:sldId id="382" r:id="rId9"/>
-    <p:sldId id="374" r:id="rId10"/>
-    <p:sldId id="375" r:id="rId11"/>
-    <p:sldId id="365" r:id="rId12"/>
-    <p:sldId id="376" r:id="rId13"/>
-    <p:sldId id="377" r:id="rId14"/>
-    <p:sldId id="378" r:id="rId15"/>
-    <p:sldId id="379" r:id="rId16"/>
-    <p:sldId id="380" r:id="rId17"/>
-    <p:sldId id="381" r:id="rId18"/>
-    <p:sldId id="372" r:id="rId19"/>
+    <p:sldId id="384" r:id="rId7"/>
+    <p:sldId id="386" r:id="rId8"/>
+    <p:sldId id="387" r:id="rId9"/>
+    <p:sldId id="385" r:id="rId10"/>
+    <p:sldId id="373" r:id="rId11"/>
+    <p:sldId id="383" r:id="rId12"/>
+    <p:sldId id="382" r:id="rId13"/>
+    <p:sldId id="374" r:id="rId14"/>
+    <p:sldId id="375" r:id="rId15"/>
+    <p:sldId id="365" r:id="rId16"/>
+    <p:sldId id="376" r:id="rId17"/>
+    <p:sldId id="377" r:id="rId18"/>
+    <p:sldId id="378" r:id="rId19"/>
+    <p:sldId id="379" r:id="rId20"/>
+    <p:sldId id="380" r:id="rId21"/>
+    <p:sldId id="381" r:id="rId22"/>
+    <p:sldId id="372" r:id="rId23"/>
   </p:sldIdLst>
   <p:sldSz cx="12192000" cy="6858000"/>
   <p:notesSz cx="6858000" cy="9144000"/>
@@ -155,7 +159,7 @@
 <file path=ppt/revisionInfo.xml><?xml version="1.0" encoding="utf-8"?>
 <p1510:revInfo xmlns:a="http://schemas.openxmlformats.org/drawingml/2006/main" xmlns:r="http://schemas.openxmlformats.org/officeDocument/2006/relationships" xmlns:p1510="http://schemas.microsoft.com/office/powerpoint/2015/10/main">
   <p1510:revLst>
-    <p1510:client id="{C18D176D-675C-4E70-91FC-14F29171721C}" v="3" dt="2025-10-29T21:52:48.053"/>
+    <p1510:client id="{C18D176D-675C-4E70-91FC-14F29171721C}" v="14" dt="2025-11-05T22:53:58.621"/>
   </p1510:revLst>
 </p1510:revInfo>
 </file>
@@ -165,7 +169,7 @@
   <pc:docChgLst>
     <pc:chgData name="Said Salomon" userId="eac27f7e7e547993" providerId="LiveId" clId="{5C6D2034-25CF-4C21-B599-846C40023CBB}"/>
     <pc:docChg chg="undo custSel addSld modSld sldOrd">
-      <pc:chgData name="Said Salomon" userId="eac27f7e7e547993" providerId="LiveId" clId="{5C6D2034-25CF-4C21-B599-846C40023CBB}" dt="2025-10-29T21:57:35.946" v="651"/>
+      <pc:chgData name="Said Salomon" userId="eac27f7e7e547993" providerId="LiveId" clId="{5C6D2034-25CF-4C21-B599-846C40023CBB}" dt="2025-11-05T23:08:02.739" v="1827" actId="12"/>
       <pc:docMkLst>
         <pc:docMk/>
       </pc:docMkLst>
@@ -206,14 +210,6 @@
           <pc:docMk/>
           <pc:sldMk cId="1460159330" sldId="359"/>
         </pc:sldMkLst>
-        <pc:spChg chg="add del mod ord">
-          <ac:chgData name="Said Salomon" userId="eac27f7e7e547993" providerId="LiveId" clId="{5C6D2034-25CF-4C21-B599-846C40023CBB}" dt="2025-10-29T21:49:33.419" v="547" actId="700"/>
-          <ac:spMkLst>
-            <pc:docMk/>
-            <pc:sldMk cId="1460159330" sldId="359"/>
-            <ac:spMk id="2" creationId="{D672C32A-C45B-EFA1-EE4E-2E74BFCC57A2}"/>
-          </ac:spMkLst>
-        </pc:spChg>
         <pc:spChg chg="mod ord">
           <ac:chgData name="Said Salomon" userId="eac27f7e7e547993" providerId="LiveId" clId="{5C6D2034-25CF-4C21-B599-846C40023CBB}" dt="2025-10-29T21:49:54.202" v="548" actId="26606"/>
           <ac:spMkLst>
@@ -228,14 +224,6 @@
             <pc:docMk/>
             <pc:sldMk cId="1460159330" sldId="359"/>
             <ac:spMk id="31" creationId="{F1239C0E-3F39-787D-0FC3-6B7C9BA37E8F}"/>
-          </ac:spMkLst>
-        </pc:spChg>
-        <pc:spChg chg="add del mod">
-          <ac:chgData name="Said Salomon" userId="eac27f7e7e547993" providerId="LiveId" clId="{5C6D2034-25CF-4C21-B599-846C40023CBB}" dt="2025-10-29T21:51:54.907" v="549" actId="931"/>
-          <ac:spMkLst>
-            <pc:docMk/>
-            <pc:sldMk cId="1460159330" sldId="359"/>
-            <ac:spMk id="36" creationId="{612C951A-0F52-74F7-76EB-7AB1EEE11748}"/>
           </ac:spMkLst>
         </pc:spChg>
         <pc:spChg chg="add mod">
@@ -275,14 +263,6 @@
           <pc:docMk/>
           <pc:sldMk cId="1397193754" sldId="373"/>
         </pc:sldMkLst>
-        <pc:spChg chg="del">
-          <ac:chgData name="Said Salomon" userId="eac27f7e7e547993" providerId="LiveId" clId="{5C6D2034-25CF-4C21-B599-846C40023CBB}" dt="2025-10-29T21:54:53.995" v="576" actId="478"/>
-          <ac:spMkLst>
-            <pc:docMk/>
-            <pc:sldMk cId="1397193754" sldId="373"/>
-            <ac:spMk id="2" creationId="{E117F7C5-CBA2-9823-0CBA-5BD773998046}"/>
-          </ac:spMkLst>
-        </pc:spChg>
         <pc:spChg chg="mod">
           <ac:chgData name="Said Salomon" userId="eac27f7e7e547993" providerId="LiveId" clId="{5C6D2034-25CF-4C21-B599-846C40023CBB}" dt="2025-10-29T21:55:30.245" v="605" actId="20577"/>
           <ac:spMkLst>
@@ -386,6 +366,122 @@
           </ac:spMkLst>
         </pc:spChg>
       </pc:sldChg>
+      <pc:sldChg chg="addSp delSp modSp new mod ord">
+        <pc:chgData name="Said Salomon" userId="eac27f7e7e547993" providerId="LiveId" clId="{5C6D2034-25CF-4C21-B599-846C40023CBB}" dt="2025-11-05T22:02:10.050" v="662" actId="207"/>
+        <pc:sldMkLst>
+          <pc:docMk/>
+          <pc:sldMk cId="2130301932" sldId="384"/>
+        </pc:sldMkLst>
+        <pc:spChg chg="del mod">
+          <ac:chgData name="Said Salomon" userId="eac27f7e7e547993" providerId="LiveId" clId="{5C6D2034-25CF-4C21-B599-846C40023CBB}" dt="2025-11-05T21:57:25.861" v="656" actId="478"/>
+          <ac:spMkLst>
+            <pc:docMk/>
+            <pc:sldMk cId="2130301932" sldId="384"/>
+            <ac:spMk id="2" creationId="{956E061A-B6B0-3721-CFC6-8803CADDAC93}"/>
+          </ac:spMkLst>
+        </pc:spChg>
+        <pc:spChg chg="del">
+          <ac:chgData name="Said Salomon" userId="eac27f7e7e547993" providerId="LiveId" clId="{5C6D2034-25CF-4C21-B599-846C40023CBB}" dt="2025-11-05T21:57:33.112" v="657" actId="478"/>
+          <ac:spMkLst>
+            <pc:docMk/>
+            <pc:sldMk cId="2130301932" sldId="384"/>
+            <ac:spMk id="3" creationId="{F5EF9802-5A63-4EB7-BDD9-F3313CCB214A}"/>
+          </ac:spMkLst>
+        </pc:spChg>
+        <pc:picChg chg="add mod">
+          <ac:chgData name="Said Salomon" userId="eac27f7e7e547993" providerId="LiveId" clId="{5C6D2034-25CF-4C21-B599-846C40023CBB}" dt="2025-11-05T22:02:10.050" v="662" actId="207"/>
+          <ac:picMkLst>
+            <pc:docMk/>
+            <pc:sldMk cId="2130301932" sldId="384"/>
+            <ac:picMk id="6" creationId="{52A77FBD-8FB8-2A23-4739-9D0134E791F2}"/>
+          </ac:picMkLst>
+        </pc:picChg>
+      </pc:sldChg>
+      <pc:sldChg chg="addSp delSp modSp new mod">
+        <pc:chgData name="Said Salomon" userId="eac27f7e7e547993" providerId="LiveId" clId="{5C6D2034-25CF-4C21-B599-846C40023CBB}" dt="2025-11-05T22:31:38.842" v="1010" actId="12"/>
+        <pc:sldMkLst>
+          <pc:docMk/>
+          <pc:sldMk cId="1587207474" sldId="385"/>
+        </pc:sldMkLst>
+        <pc:spChg chg="mod">
+          <ac:chgData name="Said Salomon" userId="eac27f7e7e547993" providerId="LiveId" clId="{5C6D2034-25CF-4C21-B599-846C40023CBB}" dt="2025-11-05T22:05:38.811" v="674" actId="14100"/>
+          <ac:spMkLst>
+            <pc:docMk/>
+            <pc:sldMk cId="1587207474" sldId="385"/>
+            <ac:spMk id="2" creationId="{718C5A32-2572-96A5-EBB3-09019F61350F}"/>
+          </ac:spMkLst>
+        </pc:spChg>
+        <pc:spChg chg="del">
+          <ac:chgData name="Said Salomon" userId="eac27f7e7e547993" providerId="LiveId" clId="{5C6D2034-25CF-4C21-B599-846C40023CBB}" dt="2025-11-05T22:05:46.342" v="675" actId="478"/>
+          <ac:spMkLst>
+            <pc:docMk/>
+            <pc:sldMk cId="1587207474" sldId="385"/>
+            <ac:spMk id="3" creationId="{1C7412BC-7236-9206-43DB-219909A4972C}"/>
+          </ac:spMkLst>
+        </pc:spChg>
+        <pc:spChg chg="add mod">
+          <ac:chgData name="Said Salomon" userId="eac27f7e7e547993" providerId="LiveId" clId="{5C6D2034-25CF-4C21-B599-846C40023CBB}" dt="2025-11-05T22:31:38.842" v="1010" actId="12"/>
+          <ac:spMkLst>
+            <pc:docMk/>
+            <pc:sldMk cId="1587207474" sldId="385"/>
+            <ac:spMk id="5" creationId="{96D9EF59-16FB-1C65-3A5C-E878ADEA2979}"/>
+          </ac:spMkLst>
+        </pc:spChg>
+      </pc:sldChg>
+      <pc:sldChg chg="addSp delSp modSp new mod ord">
+        <pc:chgData name="Said Salomon" userId="eac27f7e7e547993" providerId="LiveId" clId="{5C6D2034-25CF-4C21-B599-846C40023CBB}" dt="2025-11-05T22:52:56.544" v="1338" actId="21"/>
+        <pc:sldMkLst>
+          <pc:docMk/>
+          <pc:sldMk cId="1155694617" sldId="386"/>
+        </pc:sldMkLst>
+        <pc:spChg chg="mod">
+          <ac:chgData name="Said Salomon" userId="eac27f7e7e547993" providerId="LiveId" clId="{5C6D2034-25CF-4C21-B599-846C40023CBB}" dt="2025-11-05T22:35:09.035" v="1030" actId="14100"/>
+          <ac:spMkLst>
+            <pc:docMk/>
+            <pc:sldMk cId="1155694617" sldId="386"/>
+            <ac:spMk id="2" creationId="{88FE15A4-FDF7-E1B4-5A0D-4CD83B494A82}"/>
+          </ac:spMkLst>
+        </pc:spChg>
+        <pc:spChg chg="del">
+          <ac:chgData name="Said Salomon" userId="eac27f7e7e547993" providerId="LiveId" clId="{5C6D2034-25CF-4C21-B599-846C40023CBB}" dt="2025-11-05T22:35:18.032" v="1031" actId="478"/>
+          <ac:spMkLst>
+            <pc:docMk/>
+            <pc:sldMk cId="1155694617" sldId="386"/>
+            <ac:spMk id="3" creationId="{54AA5389-1631-6891-7F80-D385F99BFCC1}"/>
+          </ac:spMkLst>
+        </pc:spChg>
+        <pc:spChg chg="add mod">
+          <ac:chgData name="Said Salomon" userId="eac27f7e7e547993" providerId="LiveId" clId="{5C6D2034-25CF-4C21-B599-846C40023CBB}" dt="2025-11-05T22:52:56.544" v="1338" actId="21"/>
+          <ac:spMkLst>
+            <pc:docMk/>
+            <pc:sldMk cId="1155694617" sldId="386"/>
+            <ac:spMk id="5" creationId="{90E73C3C-1218-55F2-4019-5749C7676374}"/>
+          </ac:spMkLst>
+        </pc:spChg>
+      </pc:sldChg>
+      <pc:sldChg chg="modSp add mod">
+        <pc:chgData name="Said Salomon" userId="eac27f7e7e547993" providerId="LiveId" clId="{5C6D2034-25CF-4C21-B599-846C40023CBB}" dt="2025-11-05T23:08:02.739" v="1827" actId="12"/>
+        <pc:sldMkLst>
+          <pc:docMk/>
+          <pc:sldMk cId="582232591" sldId="387"/>
+        </pc:sldMkLst>
+        <pc:spChg chg="mod">
+          <ac:chgData name="Said Salomon" userId="eac27f7e7e547993" providerId="LiveId" clId="{5C6D2034-25CF-4C21-B599-846C40023CBB}" dt="2025-11-05T22:53:27.499" v="1361" actId="20577"/>
+          <ac:spMkLst>
+            <pc:docMk/>
+            <pc:sldMk cId="582232591" sldId="387"/>
+            <ac:spMk id="2" creationId="{D23A2242-E41D-DCE7-E2FA-0F228DB5A5C9}"/>
+          </ac:spMkLst>
+        </pc:spChg>
+        <pc:spChg chg="mod">
+          <ac:chgData name="Said Salomon" userId="eac27f7e7e547993" providerId="LiveId" clId="{5C6D2034-25CF-4C21-B599-846C40023CBB}" dt="2025-11-05T23:08:02.739" v="1827" actId="12"/>
+          <ac:spMkLst>
+            <pc:docMk/>
+            <pc:sldMk cId="582232591" sldId="387"/>
+            <ac:spMk id="5" creationId="{CC18A7CB-7F3C-A6AF-4739-CDEC843331B5}"/>
+          </ac:spMkLst>
+        </pc:spChg>
+      </pc:sldChg>
     </pc:docChg>
   </pc:docChgLst>
 </pc:chgInfo>
@@ -485,7 +581,7 @@
           <a:p>
             <a:fld id="{258BFD57-AB0A-470B-A7AF-56DFE7B5174A}" type="datetimeFigureOut">
               <a:rPr lang="en-US" smtClean="0"/>
-              <a:t>10/29/2025</a:t>
+              <a:t>11/5/2025</a:t>
             </a:fld>
             <a:endParaRPr lang="en-US" dirty="0"/>
           </a:p>
@@ -662,7 +758,7 @@
           <a:p>
             <a:fld id="{D4B3339F-6CEA-4641-BE08-40DAFD6FCF25}" type="datetimeFigureOut">
               <a:rPr lang="en-US" smtClean="0"/>
-              <a:t>10/29/2025</a:t>
+              <a:t>11/5/2025</a:t>
             </a:fld>
             <a:endParaRPr lang="en-US" dirty="0"/>
           </a:p>
@@ -1078,7 +1174,7 @@
           <a:p>
             <a:fld id="{DEF75CB5-5666-5049-9AE0-38EFD385C21E}" type="slidenum">
               <a:rPr lang="en-US" smtClean="0"/>
-              <a:t>10</a:t>
+              <a:t>14</a:t>
             </a:fld>
             <a:endParaRPr lang="en-US" dirty="0"/>
           </a:p>
@@ -1162,7 +1258,7 @@
           <a:p>
             <a:fld id="{DEF75CB5-5666-5049-9AE0-38EFD385C21E}" type="slidenum">
               <a:rPr lang="en-US" smtClean="0"/>
-              <a:t>11</a:t>
+              <a:t>15</a:t>
             </a:fld>
             <a:endParaRPr lang="en-US" dirty="0"/>
           </a:p>
@@ -1246,7 +1342,7 @@
           <a:p>
             <a:fld id="{DEF75CB5-5666-5049-9AE0-38EFD385C21E}" type="slidenum">
               <a:rPr lang="en-US" smtClean="0"/>
-              <a:t>12</a:t>
+              <a:t>16</a:t>
             </a:fld>
             <a:endParaRPr lang="en-US" dirty="0"/>
           </a:p>
@@ -1330,7 +1426,7 @@
           <a:p>
             <a:fld id="{DEF75CB5-5666-5049-9AE0-38EFD385C21E}" type="slidenum">
               <a:rPr lang="en-US" smtClean="0"/>
-              <a:t>13</a:t>
+              <a:t>17</a:t>
             </a:fld>
             <a:endParaRPr lang="en-US" dirty="0"/>
           </a:p>
@@ -1414,7 +1510,7 @@
           <a:p>
             <a:fld id="{DEF75CB5-5666-5049-9AE0-38EFD385C21E}" type="slidenum">
               <a:rPr lang="en-US" smtClean="0"/>
-              <a:t>14</a:t>
+              <a:t>18</a:t>
             </a:fld>
             <a:endParaRPr lang="en-US" dirty="0"/>
           </a:p>
@@ -1498,7 +1594,7 @@
           <a:p>
             <a:fld id="{DEF75CB5-5666-5049-9AE0-38EFD385C21E}" type="slidenum">
               <a:rPr lang="en-US" smtClean="0"/>
-              <a:t>15</a:t>
+              <a:t>19</a:t>
             </a:fld>
             <a:endParaRPr lang="en-US" dirty="0"/>
           </a:p>
@@ -1726,7 +1822,7 @@
           <a:p>
             <a:fld id="{DEF75CB5-5666-5049-9AE0-38EFD385C21E}" type="slidenum">
               <a:rPr lang="en-US" smtClean="0"/>
-              <a:t>3</a:t>
+              <a:t>7</a:t>
             </a:fld>
             <a:endParaRPr lang="en-US" dirty="0"/>
           </a:p>
@@ -1834,7 +1930,7 @@
           <a:p>
             <a:fld id="{DEF75CB5-5666-5049-9AE0-38EFD385C21E}" type="slidenum">
               <a:rPr lang="en-US" smtClean="0"/>
-              <a:t>4</a:t>
+              <a:t>8</a:t>
             </a:fld>
             <a:endParaRPr lang="en-US" dirty="0"/>
           </a:p>
@@ -1942,7 +2038,7 @@
           <a:p>
             <a:fld id="{DEF75CB5-5666-5049-9AE0-38EFD385C21E}" type="slidenum">
               <a:rPr lang="en-US" smtClean="0"/>
-              <a:t>5</a:t>
+              <a:t>9</a:t>
             </a:fld>
             <a:endParaRPr lang="en-US" dirty="0"/>
           </a:p>
@@ -2026,7 +2122,7 @@
           <a:p>
             <a:fld id="{DEF75CB5-5666-5049-9AE0-38EFD385C21E}" type="slidenum">
               <a:rPr lang="en-US" smtClean="0"/>
-              <a:t>6</a:t>
+              <a:t>10</a:t>
             </a:fld>
             <a:endParaRPr lang="en-US" dirty="0"/>
           </a:p>
@@ -2110,7 +2206,7 @@
           <a:p>
             <a:fld id="{DEF75CB5-5666-5049-9AE0-38EFD385C21E}" type="slidenum">
               <a:rPr lang="en-US" smtClean="0"/>
-              <a:t>7</a:t>
+              <a:t>11</a:t>
             </a:fld>
             <a:endParaRPr lang="en-US" dirty="0"/>
           </a:p>
@@ -2241,7 +2337,7 @@
                 <a:tabLst/>
                 <a:defRPr/>
               </a:pPr>
-              <a:t>8</a:t>
+              <a:t>12</a:t>
             </a:fld>
             <a:endParaRPr kumimoji="0" lang="en-US" sz="1200" b="0" i="0" u="none" strike="noStrike" kern="1200" cap="none" spc="0" normalizeH="0" baseline="0" noProof="0" dirty="0">
               <a:ln>
@@ -2338,7 +2434,7 @@
           <a:p>
             <a:fld id="{DEF75CB5-5666-5049-9AE0-38EFD385C21E}" type="slidenum">
               <a:rPr lang="en-US" smtClean="0"/>
-              <a:t>9</a:t>
+              <a:t>13</a:t>
             </a:fld>
             <a:endParaRPr lang="en-US" dirty="0"/>
           </a:p>
@@ -11130,6 +11226,716 @@
 <file path=ppt/slides/slide10.xml><?xml version="1.0" encoding="utf-8"?>
 <p:sld xmlns:a="http://schemas.openxmlformats.org/drawingml/2006/main" xmlns:r="http://schemas.openxmlformats.org/officeDocument/2006/relationships" xmlns:p="http://schemas.openxmlformats.org/presentationml/2006/main" show="0">
   <p:cSld>
+    <p:bg>
+      <p:bgPr>
+        <a:gradFill>
+          <a:gsLst>
+            <a:gs pos="100000">
+              <a:schemeClr val="tx2"/>
+            </a:gs>
+            <a:gs pos="79000">
+              <a:schemeClr val="accent6"/>
+            </a:gs>
+            <a:gs pos="31000">
+              <a:srgbClr val="02090E"/>
+            </a:gs>
+            <a:gs pos="14000">
+              <a:schemeClr val="accent4">
+                <a:lumMod val="75000"/>
+              </a:schemeClr>
+            </a:gs>
+            <a:gs pos="0">
+              <a:schemeClr val="accent4"/>
+            </a:gs>
+          </a:gsLst>
+          <a:lin ang="5400000" scaled="0"/>
+        </a:gradFill>
+        <a:effectLst/>
+      </p:bgPr>
+    </p:bg>
+    <p:spTree>
+      <p:nvGrpSpPr>
+        <p:cNvPr id="1" name=""/>
+        <p:cNvGrpSpPr/>
+        <p:nvPr/>
+      </p:nvGrpSpPr>
+      <p:grpSpPr>
+        <a:xfrm>
+          <a:off x="0" y="0"/>
+          <a:ext cx="0" cy="0"/>
+          <a:chOff x="0" y="0"/>
+          <a:chExt cx="0" cy="0"/>
+        </a:xfrm>
+      </p:grpSpPr>
+      <p:sp>
+        <p:nvSpPr>
+          <p:cNvPr id="3" name="Title 2">
+            <a:extLst>
+              <a:ext uri="{FF2B5EF4-FFF2-40B4-BE49-F238E27FC236}">
+                <a16:creationId xmlns:a16="http://schemas.microsoft.com/office/drawing/2014/main" id="{3FEFE388-CD0B-9671-4D4E-D6D8004C8851}"/>
+              </a:ext>
+            </a:extLst>
+          </p:cNvPr>
+          <p:cNvSpPr>
+            <a:spLocks noGrp="1"/>
+          </p:cNvSpPr>
+          <p:nvPr>
+            <p:ph type="title"/>
+          </p:nvPr>
+        </p:nvSpPr>
+        <p:spPr>
+          <a:xfrm>
+            <a:off x="799891" y="511762"/>
+            <a:ext cx="4960830" cy="2785158"/>
+          </a:xfrm>
+        </p:spPr>
+        <p:txBody>
+          <a:bodyPr/>
+          <a:lstStyle/>
+          <a:p>
+            <a:r>
+              <a:rPr lang="en-US" dirty="0"/>
+              <a:t>Overcoming </a:t>
+            </a:r>
+          </a:p>
+        </p:txBody>
+      </p:sp>
+      <p:sp>
+        <p:nvSpPr>
+          <p:cNvPr id="5" name="Subtitle 4">
+            <a:extLst>
+              <a:ext uri="{FF2B5EF4-FFF2-40B4-BE49-F238E27FC236}">
+                <a16:creationId xmlns:a16="http://schemas.microsoft.com/office/drawing/2014/main" id="{BE4E0F37-0AD5-833C-CBE5-EAE02EC46069}"/>
+              </a:ext>
+            </a:extLst>
+          </p:cNvPr>
+          <p:cNvSpPr>
+            <a:spLocks noGrp="1"/>
+          </p:cNvSpPr>
+          <p:nvPr>
+            <p:ph type="subTitle" idx="1"/>
+          </p:nvPr>
+        </p:nvSpPr>
+        <p:spPr>
+          <a:xfrm>
+            <a:off x="802640" y="3484615"/>
+            <a:ext cx="4958081" cy="2387865"/>
+          </a:xfrm>
+        </p:spPr>
+        <p:txBody>
+          <a:bodyPr/>
+          <a:lstStyle/>
+          <a:p>
+            <a:r>
+              <a:rPr lang="en-US" dirty="0"/>
+              <a:t>Nervousness</a:t>
+            </a:r>
+          </a:p>
+        </p:txBody>
+      </p:sp>
+      <p:pic>
+        <p:nvPicPr>
+          <p:cNvPr id="8" name="Picture Placeholder 7" descr="A blue and purple spirals">
+            <a:extLst>
+              <a:ext uri="{FF2B5EF4-FFF2-40B4-BE49-F238E27FC236}">
+                <a16:creationId xmlns:a16="http://schemas.microsoft.com/office/drawing/2014/main" id="{E1DBD4C7-D952-4426-40FD-8799F80F821F}"/>
+              </a:ext>
+            </a:extLst>
+          </p:cNvPr>
+          <p:cNvPicPr>
+            <a:picLocks noGrp="1" noChangeAspect="1"/>
+          </p:cNvPicPr>
+          <p:nvPr>
+            <p:ph type="pic" sz="quarter" idx="13"/>
+          </p:nvPr>
+        </p:nvPicPr>
+        <p:blipFill>
+          <a:blip r:embed="rId3"/>
+          <a:srcRect t="31" b="31"/>
+          <a:stretch/>
+        </p:blipFill>
+        <p:spPr>
+          <a:xfrm>
+            <a:off x="6497638" y="336550"/>
+            <a:ext cx="5322887" cy="6184900"/>
+          </a:xfrm>
+        </p:spPr>
+      </p:pic>
+      <p:sp>
+        <p:nvSpPr>
+          <p:cNvPr id="4" name="Slide Number Placeholder 3">
+            <a:extLst>
+              <a:ext uri="{FF2B5EF4-FFF2-40B4-BE49-F238E27FC236}">
+                <a16:creationId xmlns:a16="http://schemas.microsoft.com/office/drawing/2014/main" id="{67D6EA54-3083-FB0D-9011-2353791B0495}"/>
+              </a:ext>
+            </a:extLst>
+          </p:cNvPr>
+          <p:cNvSpPr>
+            <a:spLocks noGrp="1"/>
+          </p:cNvSpPr>
+          <p:nvPr>
+            <p:ph type="sldNum" sz="quarter" idx="12"/>
+          </p:nvPr>
+        </p:nvSpPr>
+        <p:spPr>
+          <a:xfrm>
+            <a:off x="9140971" y="6226198"/>
+            <a:ext cx="2743200" cy="365125"/>
+          </a:xfrm>
+        </p:spPr>
+        <p:txBody>
+          <a:bodyPr/>
+          <a:lstStyle/>
+          <a:p>
+            <a:fld id="{FE024F78-56A6-7740-B68D-8D4D026EDF3F}" type="slidenum">
+              <a:rPr lang="en-US" smtClean="0"/>
+              <a:pPr/>
+              <a:t>10</a:t>
+            </a:fld>
+            <a:endParaRPr lang="en-US" dirty="0"/>
+          </a:p>
+        </p:txBody>
+      </p:sp>
+    </p:spTree>
+    <p:extLst>
+      <p:ext uri="{BB962C8B-B14F-4D97-AF65-F5344CB8AC3E}">
+        <p14:creationId xmlns:p14="http://schemas.microsoft.com/office/powerpoint/2010/main" val="598144966"/>
+      </p:ext>
+    </p:extLst>
+  </p:cSld>
+  <p:clrMapOvr>
+    <a:masterClrMapping/>
+  </p:clrMapOvr>
+</p:sld>
+</file>
+
+<file path=ppt/slides/slide11.xml><?xml version="1.0" encoding="utf-8"?>
+<p:sld xmlns:a="http://schemas.openxmlformats.org/drawingml/2006/main" xmlns:r="http://schemas.openxmlformats.org/officeDocument/2006/relationships" xmlns:p="http://schemas.openxmlformats.org/presentationml/2006/main" show="0">
+  <p:cSld>
+    <p:spTree>
+      <p:nvGrpSpPr>
+        <p:cNvPr id="1" name=""/>
+        <p:cNvGrpSpPr/>
+        <p:nvPr/>
+      </p:nvGrpSpPr>
+      <p:grpSpPr>
+        <a:xfrm>
+          <a:off x="0" y="0"/>
+          <a:ext cx="0" cy="0"/>
+          <a:chOff x="0" y="0"/>
+          <a:chExt cx="0" cy="0"/>
+        </a:xfrm>
+      </p:grpSpPr>
+      <p:sp>
+        <p:nvSpPr>
+          <p:cNvPr id="2" name="Title 1">
+            <a:extLst>
+              <a:ext uri="{FF2B5EF4-FFF2-40B4-BE49-F238E27FC236}">
+                <a16:creationId xmlns:a16="http://schemas.microsoft.com/office/drawing/2014/main" id="{D9F60903-003B-273E-3584-5312F76C3EF3}"/>
+              </a:ext>
+            </a:extLst>
+          </p:cNvPr>
+          <p:cNvSpPr>
+            <a:spLocks noGrp="1"/>
+          </p:cNvSpPr>
+          <p:nvPr>
+            <p:ph type="title"/>
+          </p:nvPr>
+        </p:nvSpPr>
+        <p:spPr>
+          <a:xfrm>
+            <a:off x="3305669" y="113097"/>
+            <a:ext cx="7420819" cy="1656304"/>
+          </a:xfrm>
+        </p:spPr>
+        <p:txBody>
+          <a:bodyPr/>
+          <a:lstStyle/>
+          <a:p>
+            <a:r>
+              <a:rPr lang="en-US" dirty="0"/>
+              <a:t>ENGAGING THE AUDIENCE</a:t>
+            </a:r>
+          </a:p>
+        </p:txBody>
+      </p:sp>
+      <p:sp>
+        <p:nvSpPr>
+          <p:cNvPr id="4" name="Content Placeholder 3">
+            <a:extLst>
+              <a:ext uri="{FF2B5EF4-FFF2-40B4-BE49-F238E27FC236}">
+                <a16:creationId xmlns:a16="http://schemas.microsoft.com/office/drawing/2014/main" id="{74160DFF-2E7E-7A22-819A-C011020DFF01}"/>
+              </a:ext>
+            </a:extLst>
+          </p:cNvPr>
+          <p:cNvSpPr>
+            <a:spLocks noGrp="1"/>
+          </p:cNvSpPr>
+          <p:nvPr>
+            <p:ph sz="quarter" idx="31"/>
+          </p:nvPr>
+        </p:nvSpPr>
+        <p:spPr>
+          <a:xfrm>
+            <a:off x="3305669" y="2470150"/>
+            <a:ext cx="7420819" cy="3676649"/>
+          </a:xfrm>
+        </p:spPr>
+        <p:txBody>
+          <a:bodyPr/>
+          <a:lstStyle/>
+          <a:p>
+            <a:r>
+              <a:rPr lang="en-US" dirty="0"/>
+              <a:t>Make eye contact with your audience to create a sense of intimacy and involvement</a:t>
+            </a:r>
+          </a:p>
+          <a:p>
+            <a:r>
+              <a:rPr lang="en-US" dirty="0"/>
+              <a:t>Weave relatable stories into your presentation using narratives that make your message memorable and impactful</a:t>
+            </a:r>
+          </a:p>
+          <a:p>
+            <a:r>
+              <a:rPr lang="en-US" dirty="0"/>
+              <a:t>Encourage questions and provide thoughtful responses to enhance audience participation</a:t>
+            </a:r>
+          </a:p>
+          <a:p>
+            <a:r>
+              <a:rPr lang="en-US" dirty="0"/>
+              <a:t>Use live polls or surveys to gather audience opinions, promoting engagement and making sure the audience feel involved</a:t>
+            </a:r>
+          </a:p>
+        </p:txBody>
+      </p:sp>
+      <p:sp>
+        <p:nvSpPr>
+          <p:cNvPr id="3" name="Slide Number Placeholder 2">
+            <a:extLst>
+              <a:ext uri="{FF2B5EF4-FFF2-40B4-BE49-F238E27FC236}">
+                <a16:creationId xmlns:a16="http://schemas.microsoft.com/office/drawing/2014/main" id="{64347AE7-D6A2-42FB-3D58-6297742FC352}"/>
+              </a:ext>
+            </a:extLst>
+          </p:cNvPr>
+          <p:cNvSpPr>
+            <a:spLocks noGrp="1"/>
+          </p:cNvSpPr>
+          <p:nvPr>
+            <p:ph type="sldNum" sz="quarter" idx="12"/>
+          </p:nvPr>
+        </p:nvSpPr>
+        <p:spPr>
+          <a:xfrm>
+            <a:off x="9140971" y="6226198"/>
+            <a:ext cx="2743200" cy="365125"/>
+          </a:xfrm>
+        </p:spPr>
+        <p:txBody>
+          <a:bodyPr/>
+          <a:lstStyle/>
+          <a:p>
+            <a:fld id="{FE024F78-56A6-7740-B68D-8D4D026EDF3F}" type="slidenum">
+              <a:rPr lang="en-US" smtClean="0"/>
+              <a:pPr/>
+              <a:t>11</a:t>
+            </a:fld>
+            <a:endParaRPr lang="en-US" dirty="0"/>
+          </a:p>
+        </p:txBody>
+      </p:sp>
+    </p:spTree>
+    <p:extLst>
+      <p:ext uri="{BB962C8B-B14F-4D97-AF65-F5344CB8AC3E}">
+        <p14:creationId xmlns:p14="http://schemas.microsoft.com/office/powerpoint/2010/main" val="1962637282"/>
+      </p:ext>
+    </p:extLst>
+  </p:cSld>
+  <p:clrMapOvr>
+    <a:masterClrMapping/>
+  </p:clrMapOvr>
+</p:sld>
+</file>
+
+<file path=ppt/slides/slide12.xml><?xml version="1.0" encoding="utf-8"?>
+<p:sld xmlns:a="http://schemas.openxmlformats.org/drawingml/2006/main" xmlns:r="http://schemas.openxmlformats.org/officeDocument/2006/relationships" xmlns:p="http://schemas.openxmlformats.org/presentationml/2006/main" show="0">
+  <p:cSld>
+    <p:spTree>
+      <p:nvGrpSpPr>
+        <p:cNvPr id="1" name=""/>
+        <p:cNvGrpSpPr/>
+        <p:nvPr/>
+      </p:nvGrpSpPr>
+      <p:grpSpPr>
+        <a:xfrm>
+          <a:off x="0" y="0"/>
+          <a:ext cx="0" cy="0"/>
+          <a:chOff x="0" y="0"/>
+          <a:chExt cx="0" cy="0"/>
+        </a:xfrm>
+      </p:grpSpPr>
+      <p:sp>
+        <p:nvSpPr>
+          <p:cNvPr id="3" name="Rectangle 2" hidden="1">
+            <a:extLst>
+              <a:ext uri="{FF2B5EF4-FFF2-40B4-BE49-F238E27FC236}">
+                <a16:creationId xmlns:a16="http://schemas.microsoft.com/office/drawing/2014/main" id="{8692FC88-DAD7-F5AD-7831-DE54322108F6}"/>
+              </a:ext>
+              <a:ext uri="{C183D7F6-B498-43B3-948B-1728B52AA6E4}">
+                <adec:decorative xmlns:adec="http://schemas.microsoft.com/office/drawing/2017/decorative" val="1"/>
+              </a:ext>
+            </a:extLst>
+          </p:cNvPr>
+          <p:cNvSpPr/>
+          <p:nvPr/>
+        </p:nvSpPr>
+        <p:spPr>
+          <a:xfrm>
+            <a:off x="1" y="2"/>
+            <a:ext cx="12227942" cy="6857997"/>
+          </a:xfrm>
+          <a:prstGeom prst="rect">
+            <a:avLst/>
+          </a:prstGeom>
+          <a:solidFill>
+            <a:schemeClr val="tx1">
+              <a:alpha val="70000"/>
+            </a:schemeClr>
+          </a:solidFill>
+          <a:ln>
+            <a:noFill/>
+          </a:ln>
+        </p:spPr>
+        <p:style>
+          <a:lnRef idx="2">
+            <a:schemeClr val="accent1">
+              <a:shade val="50000"/>
+            </a:schemeClr>
+          </a:lnRef>
+          <a:fillRef idx="1">
+            <a:schemeClr val="accent1"/>
+          </a:fillRef>
+          <a:effectRef idx="0">
+            <a:schemeClr val="accent1"/>
+          </a:effectRef>
+          <a:fontRef idx="minor">
+            <a:schemeClr val="lt1"/>
+          </a:fontRef>
+        </p:style>
+        <p:txBody>
+          <a:bodyPr rtlCol="0" anchor="ctr">
+            <a:noAutofit/>
+          </a:bodyPr>
+          <a:lstStyle/>
+          <a:p>
+            <a:pPr algn="ctr"/>
+            <a:endParaRPr lang="en-US" dirty="0"/>
+          </a:p>
+        </p:txBody>
+      </p:sp>
+      <p:sp>
+        <p:nvSpPr>
+          <p:cNvPr id="9" name="Title 1">
+            <a:extLst>
+              <a:ext uri="{FF2B5EF4-FFF2-40B4-BE49-F238E27FC236}">
+                <a16:creationId xmlns:a16="http://schemas.microsoft.com/office/drawing/2014/main" id="{0FD6A3FE-1BF6-4C1A-0553-EBD497A69F2D}"/>
+              </a:ext>
+            </a:extLst>
+          </p:cNvPr>
+          <p:cNvSpPr>
+            <a:spLocks noGrp="1"/>
+          </p:cNvSpPr>
+          <p:nvPr>
+            <p:ph type="title"/>
+          </p:nvPr>
+        </p:nvSpPr>
+        <p:spPr>
+          <a:xfrm>
+            <a:off x="2932448" y="264160"/>
+            <a:ext cx="6327105" cy="3373973"/>
+          </a:xfrm>
+        </p:spPr>
+        <p:txBody>
+          <a:bodyPr anchor="b"/>
+          <a:lstStyle/>
+          <a:p>
+            <a:r>
+              <a:rPr lang="en-US" dirty="0"/>
+              <a:t>SELECTING</a:t>
+            </a:r>
+            <a:br>
+              <a:rPr lang="en-US" dirty="0"/>
+            </a:br>
+            <a:r>
+              <a:rPr lang="en-US" dirty="0"/>
+              <a:t>VISUAL AIDS</a:t>
+            </a:r>
+          </a:p>
+        </p:txBody>
+      </p:sp>
+      <p:sp>
+        <p:nvSpPr>
+          <p:cNvPr id="6" name="Subtitle 5">
+            <a:extLst>
+              <a:ext uri="{FF2B5EF4-FFF2-40B4-BE49-F238E27FC236}">
+                <a16:creationId xmlns:a16="http://schemas.microsoft.com/office/drawing/2014/main" id="{C15774B0-D971-67D7-27EB-FDB82B3A58CD}"/>
+              </a:ext>
+            </a:extLst>
+          </p:cNvPr>
+          <p:cNvSpPr>
+            <a:spLocks noGrp="1"/>
+          </p:cNvSpPr>
+          <p:nvPr>
+            <p:ph type="subTitle" idx="1"/>
+          </p:nvPr>
+        </p:nvSpPr>
+        <p:spPr>
+          <a:xfrm>
+            <a:off x="2932448" y="3962135"/>
+            <a:ext cx="6327105" cy="2653771"/>
+          </a:xfrm>
+        </p:spPr>
+        <p:txBody>
+          <a:bodyPr/>
+          <a:lstStyle/>
+          <a:p>
+            <a:r>
+              <a:rPr lang="en-US" dirty="0"/>
+              <a:t>ENHANCING YOUR PRESENTATION</a:t>
+            </a:r>
+          </a:p>
+        </p:txBody>
+      </p:sp>
+    </p:spTree>
+    <p:extLst>
+      <p:ext uri="{BB962C8B-B14F-4D97-AF65-F5344CB8AC3E}">
+        <p14:creationId xmlns:p14="http://schemas.microsoft.com/office/powerpoint/2010/main" val="1330733909"/>
+      </p:ext>
+    </p:extLst>
+  </p:cSld>
+  <p:clrMapOvr>
+    <a:masterClrMapping/>
+  </p:clrMapOvr>
+</p:sld>
+</file>
+
+<file path=ppt/slides/slide13.xml><?xml version="1.0" encoding="utf-8"?>
+<p:sld xmlns:a="http://schemas.openxmlformats.org/drawingml/2006/main" xmlns:r="http://schemas.openxmlformats.org/officeDocument/2006/relationships" xmlns:p="http://schemas.openxmlformats.org/presentationml/2006/main" show="0">
+  <p:cSld>
+    <p:spTree>
+      <p:nvGrpSpPr>
+        <p:cNvPr id="1" name=""/>
+        <p:cNvGrpSpPr/>
+        <p:nvPr/>
+      </p:nvGrpSpPr>
+      <p:grpSpPr>
+        <a:xfrm>
+          <a:off x="0" y="0"/>
+          <a:ext cx="0" cy="0"/>
+          <a:chOff x="0" y="0"/>
+          <a:chExt cx="0" cy="0"/>
+        </a:xfrm>
+      </p:grpSpPr>
+      <p:sp>
+        <p:nvSpPr>
+          <p:cNvPr id="2" name="Title 1">
+            <a:extLst>
+              <a:ext uri="{FF2B5EF4-FFF2-40B4-BE49-F238E27FC236}">
+                <a16:creationId xmlns:a16="http://schemas.microsoft.com/office/drawing/2014/main" id="{6CCA29A4-AAFD-04EE-0732-0671E83D5EF1}"/>
+              </a:ext>
+            </a:extLst>
+          </p:cNvPr>
+          <p:cNvSpPr>
+            <a:spLocks noGrp="1"/>
+          </p:cNvSpPr>
+          <p:nvPr>
+            <p:ph type="title"/>
+          </p:nvPr>
+        </p:nvSpPr>
+        <p:spPr>
+          <a:xfrm>
+            <a:off x="2399620" y="162560"/>
+            <a:ext cx="8843050" cy="1616904"/>
+          </a:xfrm>
+        </p:spPr>
+        <p:txBody>
+          <a:bodyPr/>
+          <a:lstStyle/>
+          <a:p>
+            <a:r>
+              <a:rPr lang="en-US" dirty="0"/>
+              <a:t>EFFECTIVE DELIVERY TECHNIQUES</a:t>
+            </a:r>
+          </a:p>
+        </p:txBody>
+      </p:sp>
+      <p:sp>
+        <p:nvSpPr>
+          <p:cNvPr id="3" name="Content Placeholder 2">
+            <a:extLst>
+              <a:ext uri="{FF2B5EF4-FFF2-40B4-BE49-F238E27FC236}">
+                <a16:creationId xmlns:a16="http://schemas.microsoft.com/office/drawing/2014/main" id="{F09FEE91-E849-1CB0-9E51-A58B99C631C5}"/>
+              </a:ext>
+            </a:extLst>
+          </p:cNvPr>
+          <p:cNvSpPr>
+            <a:spLocks noGrp="1"/>
+          </p:cNvSpPr>
+          <p:nvPr>
+            <p:ph sz="quarter" idx="35"/>
+          </p:nvPr>
+        </p:nvSpPr>
+        <p:spPr>
+          <a:xfrm>
+            <a:off x="2373002" y="2474811"/>
+            <a:ext cx="4015098" cy="3528397"/>
+          </a:xfrm>
+        </p:spPr>
+        <p:txBody>
+          <a:bodyPr/>
+          <a:lstStyle/>
+          <a:p>
+            <a:r>
+              <a:rPr lang="en-US" dirty="0"/>
+              <a:t>This is a powerful tool in public speaking. It involves varying pitch, tone, and volume to convey emotion, emphasize points, and maintain interest.</a:t>
+            </a:r>
+          </a:p>
+          <a:p>
+            <a:pPr lvl="1"/>
+            <a:r>
+              <a:rPr lang="en-US" dirty="0"/>
+              <a:t>Pitch variation</a:t>
+            </a:r>
+          </a:p>
+          <a:p>
+            <a:pPr lvl="1"/>
+            <a:r>
+              <a:rPr lang="en-US" dirty="0"/>
+              <a:t>Tone inflection</a:t>
+            </a:r>
+          </a:p>
+          <a:p>
+            <a:pPr lvl="1"/>
+            <a:r>
+              <a:rPr lang="en-US" dirty="0"/>
+              <a:t>Volume control</a:t>
+            </a:r>
+          </a:p>
+        </p:txBody>
+      </p:sp>
+      <p:sp>
+        <p:nvSpPr>
+          <p:cNvPr id="4" name="Content Placeholder 3">
+            <a:extLst>
+              <a:ext uri="{FF2B5EF4-FFF2-40B4-BE49-F238E27FC236}">
+                <a16:creationId xmlns:a16="http://schemas.microsoft.com/office/drawing/2014/main" id="{9B774F1A-D233-C240-B22D-F82C6161FAC1}"/>
+              </a:ext>
+            </a:extLst>
+          </p:cNvPr>
+          <p:cNvSpPr>
+            <a:spLocks noGrp="1"/>
+          </p:cNvSpPr>
+          <p:nvPr>
+            <p:ph sz="quarter" idx="36"/>
+          </p:nvPr>
+        </p:nvSpPr>
+        <p:spPr>
+          <a:xfrm>
+            <a:off x="6995159" y="2474811"/>
+            <a:ext cx="4227332" cy="3528397"/>
+          </a:xfrm>
+        </p:spPr>
+        <p:txBody>
+          <a:bodyPr/>
+          <a:lstStyle/>
+          <a:p>
+            <a:r>
+              <a:rPr lang="en-US" dirty="0"/>
+              <a:t>Effective body language enhances your message, making it more impactful and memorable.</a:t>
+            </a:r>
+          </a:p>
+          <a:p>
+            <a:pPr lvl="1"/>
+            <a:r>
+              <a:rPr lang="en-US" dirty="0"/>
+              <a:t>Meaningful eye contact</a:t>
+            </a:r>
+          </a:p>
+          <a:p>
+            <a:pPr lvl="1"/>
+            <a:r>
+              <a:rPr lang="en-US" dirty="0"/>
+              <a:t>Purposeful gestures</a:t>
+            </a:r>
+          </a:p>
+          <a:p>
+            <a:pPr lvl="1"/>
+            <a:r>
+              <a:rPr lang="en-US" dirty="0"/>
+              <a:t>Maintain good posture</a:t>
+            </a:r>
+          </a:p>
+          <a:p>
+            <a:pPr lvl="1"/>
+            <a:r>
+              <a:rPr lang="en-US" dirty="0"/>
+              <a:t>Control your expressions</a:t>
+            </a:r>
+          </a:p>
+        </p:txBody>
+      </p:sp>
+      <p:sp>
+        <p:nvSpPr>
+          <p:cNvPr id="5" name="Slide Number Placeholder 4">
+            <a:extLst>
+              <a:ext uri="{FF2B5EF4-FFF2-40B4-BE49-F238E27FC236}">
+                <a16:creationId xmlns:a16="http://schemas.microsoft.com/office/drawing/2014/main" id="{23E23533-91C6-420C-B7D7-4977ACF73ACF}"/>
+              </a:ext>
+            </a:extLst>
+          </p:cNvPr>
+          <p:cNvSpPr>
+            <a:spLocks noGrp="1"/>
+          </p:cNvSpPr>
+          <p:nvPr>
+            <p:ph type="sldNum" sz="quarter" idx="12"/>
+          </p:nvPr>
+        </p:nvSpPr>
+        <p:spPr>
+          <a:xfrm>
+            <a:off x="9140971" y="6226198"/>
+            <a:ext cx="2743200" cy="365125"/>
+          </a:xfrm>
+        </p:spPr>
+        <p:txBody>
+          <a:bodyPr/>
+          <a:lstStyle/>
+          <a:p>
+            <a:fld id="{FE024F78-56A6-7740-B68D-8D4D026EDF3F}" type="slidenum">
+              <a:rPr lang="en-US" smtClean="0"/>
+              <a:pPr/>
+              <a:t>13</a:t>
+            </a:fld>
+            <a:endParaRPr lang="en-US" dirty="0"/>
+          </a:p>
+        </p:txBody>
+      </p:sp>
+    </p:spTree>
+    <p:extLst>
+      <p:ext uri="{BB962C8B-B14F-4D97-AF65-F5344CB8AC3E}">
+        <p14:creationId xmlns:p14="http://schemas.microsoft.com/office/powerpoint/2010/main" val="1073601555"/>
+      </p:ext>
+    </p:extLst>
+  </p:cSld>
+  <p:clrMapOvr>
+    <a:masterClrMapping/>
+  </p:clrMapOvr>
+</p:sld>
+</file>
+
+<file path=ppt/slides/slide14.xml><?xml version="1.0" encoding="utf-8"?>
+<p:sld xmlns:a="http://schemas.openxmlformats.org/drawingml/2006/main" xmlns:r="http://schemas.openxmlformats.org/officeDocument/2006/relationships" xmlns:p="http://schemas.openxmlformats.org/presentationml/2006/main" show="0">
+  <p:cSld>
     <p:spTree>
       <p:nvGrpSpPr>
         <p:cNvPr id="1" name=""/>
@@ -11312,7 +12118,7 @@
             <a:fld id="{FE024F78-56A6-7740-B68D-8D4D026EDF3F}" type="slidenum">
               <a:rPr lang="en-US" smtClean="0"/>
               <a:pPr/>
-              <a:t>10</a:t>
+              <a:t>14</a:t>
             </a:fld>
             <a:endParaRPr lang="en-US" dirty="0"/>
           </a:p>
@@ -11331,7 +12137,7 @@
 </p:sld>
 </file>
 
-<file path=ppt/slides/slide11.xml><?xml version="1.0" encoding="utf-8"?>
+<file path=ppt/slides/slide15.xml><?xml version="1.0" encoding="utf-8"?>
 <p:sld xmlns:a="http://schemas.openxmlformats.org/drawingml/2006/main" xmlns:r="http://schemas.openxmlformats.org/officeDocument/2006/relationships" xmlns:p="http://schemas.openxmlformats.org/presentationml/2006/main" show="0">
   <p:cSld>
     <p:spTree>
@@ -11484,7 +12290,7 @@
             <a:fld id="{FE024F78-56A6-7740-B68D-8D4D026EDF3F}" type="slidenum">
               <a:rPr lang="en-US" smtClean="0"/>
               <a:pPr/>
-              <a:t>11</a:t>
+              <a:t>15</a:t>
             </a:fld>
             <a:endParaRPr lang="en-US" dirty="0"/>
           </a:p>
@@ -11503,7 +12309,7 @@
 </p:sld>
 </file>
 
-<file path=ppt/slides/slide12.xml><?xml version="1.0" encoding="utf-8"?>
+<file path=ppt/slides/slide16.xml><?xml version="1.0" encoding="utf-8"?>
 <p:sld xmlns:a="http://schemas.openxmlformats.org/drawingml/2006/main" xmlns:r="http://schemas.openxmlformats.org/officeDocument/2006/relationships" xmlns:p="http://schemas.openxmlformats.org/presentationml/2006/main" show="0">
   <p:cSld>
     <p:spTree>
@@ -13861,7 +14667,7 @@
 </p:sld>
 </file>
 
-<file path=ppt/slides/slide13.xml><?xml version="1.0" encoding="utf-8"?>
+<file path=ppt/slides/slide17.xml><?xml version="1.0" encoding="utf-8"?>
 <p:sld xmlns:a="http://schemas.openxmlformats.org/drawingml/2006/main" xmlns:r="http://schemas.openxmlformats.org/officeDocument/2006/relationships" xmlns:p="http://schemas.openxmlformats.org/presentationml/2006/main" show="0">
   <p:cSld>
     <p:spTree>
@@ -14076,7 +14882,7 @@
             <a:fld id="{FE024F78-56A6-7740-B68D-8D4D026EDF3F}" type="slidenum">
               <a:rPr lang="en-US" smtClean="0"/>
               <a:pPr/>
-              <a:t>13</a:t>
+              <a:t>17</a:t>
             </a:fld>
             <a:endParaRPr lang="en-US" dirty="0"/>
           </a:p>
@@ -14095,7 +14901,7 @@
 </p:sld>
 </file>
 
-<file path=ppt/slides/slide14.xml><?xml version="1.0" encoding="utf-8"?>
+<file path=ppt/slides/slide18.xml><?xml version="1.0" encoding="utf-8"?>
 <p:sld xmlns:a="http://schemas.openxmlformats.org/drawingml/2006/main" xmlns:r="http://schemas.openxmlformats.org/officeDocument/2006/relationships" xmlns:p="http://schemas.openxmlformats.org/presentationml/2006/main" show="0">
   <p:cSld>
     <p:spTree>
@@ -14621,7 +15427,7 @@
             <a:fld id="{FE024F78-56A6-7740-B68D-8D4D026EDF3F}" type="slidenum">
               <a:rPr lang="en-US" smtClean="0"/>
               <a:pPr/>
-              <a:t>14</a:t>
+              <a:t>18</a:t>
             </a:fld>
             <a:endParaRPr lang="en-US" dirty="0"/>
           </a:p>
@@ -14640,7 +15446,7 @@
 </p:sld>
 </file>
 
-<file path=ppt/slides/slide15.xml><?xml version="1.0" encoding="utf-8"?>
+<file path=ppt/slides/slide19.xml><?xml version="1.0" encoding="utf-8"?>
 <p:sld xmlns:a="http://schemas.openxmlformats.org/drawingml/2006/main" xmlns:r="http://schemas.openxmlformats.org/officeDocument/2006/relationships" xmlns:p="http://schemas.openxmlformats.org/presentationml/2006/main" show="0">
   <p:cSld>
     <p:bg>
@@ -15100,6 +15906,1058 @@
       </p:grpSpPr>
       <p:sp>
         <p:nvSpPr>
+          <p:cNvPr id="4" name="Slide Number Placeholder 3">
+            <a:extLst>
+              <a:ext uri="{FF2B5EF4-FFF2-40B4-BE49-F238E27FC236}">
+                <a16:creationId xmlns:a16="http://schemas.microsoft.com/office/drawing/2014/main" id="{25204BED-8881-888B-6A82-3BD7E1305D39}"/>
+              </a:ext>
+            </a:extLst>
+          </p:cNvPr>
+          <p:cNvSpPr>
+            <a:spLocks noGrp="1"/>
+          </p:cNvSpPr>
+          <p:nvPr>
+            <p:ph type="sldNum" sz="quarter" idx="12"/>
+          </p:nvPr>
+        </p:nvSpPr>
+        <p:spPr/>
+        <p:txBody>
+          <a:bodyPr/>
+          <a:lstStyle/>
+          <a:p>
+            <a:fld id="{FE024F78-56A6-7740-B68D-8D4D026EDF3F}" type="slidenum">
+              <a:rPr lang="en-US" smtClean="0"/>
+              <a:pPr/>
+              <a:t>3</a:t>
+            </a:fld>
+            <a:endParaRPr lang="en-US" dirty="0"/>
+          </a:p>
+        </p:txBody>
+      </p:sp>
+      <p:pic>
+        <p:nvPicPr>
+          <p:cNvPr id="6" name="Picture 5" descr="A screenshot of a computer&#10;&#10;AI-generated content may be incorrect.">
+            <a:extLst>
+              <a:ext uri="{FF2B5EF4-FFF2-40B4-BE49-F238E27FC236}">
+                <a16:creationId xmlns:a16="http://schemas.microsoft.com/office/drawing/2014/main" id="{52A77FBD-8FB8-2A23-4739-9D0134E791F2}"/>
+              </a:ext>
+            </a:extLst>
+          </p:cNvPr>
+          <p:cNvPicPr>
+            <a:picLocks noChangeAspect="1"/>
+          </p:cNvPicPr>
+          <p:nvPr/>
+        </p:nvPicPr>
+        <p:blipFill>
+          <a:blip r:embed="rId2"/>
+          <a:stretch>
+            <a:fillRect/>
+          </a:stretch>
+        </p:blipFill>
+        <p:spPr>
+          <a:xfrm>
+            <a:off x="1719853" y="748689"/>
+            <a:ext cx="8752294" cy="5360621"/>
+          </a:xfrm>
+          <a:prstGeom prst="rect">
+            <a:avLst/>
+          </a:prstGeom>
+          <a:solidFill>
+            <a:schemeClr val="bg1"/>
+          </a:solidFill>
+        </p:spPr>
+      </p:pic>
+    </p:spTree>
+    <p:extLst>
+      <p:ext uri="{BB962C8B-B14F-4D97-AF65-F5344CB8AC3E}">
+        <p14:creationId xmlns:p14="http://schemas.microsoft.com/office/powerpoint/2010/main" val="2130301932"/>
+      </p:ext>
+    </p:extLst>
+  </p:cSld>
+  <p:clrMapOvr>
+    <a:masterClrMapping/>
+  </p:clrMapOvr>
+</p:sld>
+</file>
+
+<file path=ppt/slides/slide4.xml><?xml version="1.0" encoding="utf-8"?>
+<p:sld xmlns:a="http://schemas.openxmlformats.org/drawingml/2006/main" xmlns:r="http://schemas.openxmlformats.org/officeDocument/2006/relationships" xmlns:p="http://schemas.openxmlformats.org/presentationml/2006/main">
+  <p:cSld>
+    <p:spTree>
+      <p:nvGrpSpPr>
+        <p:cNvPr id="1" name=""/>
+        <p:cNvGrpSpPr/>
+        <p:nvPr/>
+      </p:nvGrpSpPr>
+      <p:grpSpPr>
+        <a:xfrm>
+          <a:off x="0" y="0"/>
+          <a:ext cx="0" cy="0"/>
+          <a:chOff x="0" y="0"/>
+          <a:chExt cx="0" cy="0"/>
+        </a:xfrm>
+      </p:grpSpPr>
+      <p:sp>
+        <p:nvSpPr>
+          <p:cNvPr id="2" name="Title 1">
+            <a:extLst>
+              <a:ext uri="{FF2B5EF4-FFF2-40B4-BE49-F238E27FC236}">
+                <a16:creationId xmlns:a16="http://schemas.microsoft.com/office/drawing/2014/main" id="{88FE15A4-FDF7-E1B4-5A0D-4CD83B494A82}"/>
+              </a:ext>
+            </a:extLst>
+          </p:cNvPr>
+          <p:cNvSpPr>
+            <a:spLocks noGrp="1"/>
+          </p:cNvSpPr>
+          <p:nvPr>
+            <p:ph type="title"/>
+          </p:nvPr>
+        </p:nvSpPr>
+        <p:spPr>
+          <a:xfrm>
+            <a:off x="321869" y="579120"/>
+            <a:ext cx="11548261" cy="590919"/>
+          </a:xfrm>
+        </p:spPr>
+        <p:txBody>
+          <a:bodyPr/>
+          <a:lstStyle/>
+          <a:p>
+            <a:r>
+              <a:rPr lang="en-US" dirty="0"/>
+              <a:t>What is a Vector</a:t>
+            </a:r>
+          </a:p>
+        </p:txBody>
+      </p:sp>
+      <p:sp>
+        <p:nvSpPr>
+          <p:cNvPr id="4" name="Slide Number Placeholder 3">
+            <a:extLst>
+              <a:ext uri="{FF2B5EF4-FFF2-40B4-BE49-F238E27FC236}">
+                <a16:creationId xmlns:a16="http://schemas.microsoft.com/office/drawing/2014/main" id="{54453AE4-A5D7-889B-A7F5-30CC298DB7CB}"/>
+              </a:ext>
+            </a:extLst>
+          </p:cNvPr>
+          <p:cNvSpPr>
+            <a:spLocks noGrp="1"/>
+          </p:cNvSpPr>
+          <p:nvPr>
+            <p:ph type="sldNum" sz="quarter" idx="12"/>
+          </p:nvPr>
+        </p:nvSpPr>
+        <p:spPr/>
+        <p:txBody>
+          <a:bodyPr/>
+          <a:lstStyle/>
+          <a:p>
+            <a:fld id="{FE024F78-56A6-7740-B68D-8D4D026EDF3F}" type="slidenum">
+              <a:rPr lang="en-US" smtClean="0"/>
+              <a:pPr/>
+              <a:t>4</a:t>
+            </a:fld>
+            <a:endParaRPr lang="en-US" dirty="0"/>
+          </a:p>
+        </p:txBody>
+      </p:sp>
+      <p:sp>
+        <p:nvSpPr>
+          <p:cNvPr id="5" name="TextBox 4">
+            <a:extLst>
+              <a:ext uri="{FF2B5EF4-FFF2-40B4-BE49-F238E27FC236}">
+                <a16:creationId xmlns:a16="http://schemas.microsoft.com/office/drawing/2014/main" id="{90E73C3C-1218-55F2-4019-5749C7676374}"/>
+              </a:ext>
+            </a:extLst>
+          </p:cNvPr>
+          <p:cNvSpPr txBox="1"/>
+          <p:nvPr/>
+        </p:nvSpPr>
+        <p:spPr>
+          <a:xfrm>
+            <a:off x="904569" y="1406014"/>
+            <a:ext cx="9389806" cy="3139321"/>
+          </a:xfrm>
+          <a:prstGeom prst="rect">
+            <a:avLst/>
+          </a:prstGeom>
+          <a:noFill/>
+        </p:spPr>
+        <p:txBody>
+          <a:bodyPr wrap="square" rtlCol="0">
+            <a:spAutoFit/>
+          </a:bodyPr>
+          <a:lstStyle/>
+          <a:p>
+            <a:r>
+              <a:rPr lang="en-US" dirty="0">
+                <a:solidFill>
+                  <a:schemeClr val="accent2">
+                    <a:lumMod val="20000"/>
+                    <a:lumOff val="80000"/>
+                  </a:schemeClr>
+                </a:solidFill>
+              </a:rPr>
+              <a:t>A vector is a mathematical and physical object that has both </a:t>
+            </a:r>
+            <a:r>
+              <a:rPr lang="en-US" b="1" dirty="0">
+                <a:solidFill>
+                  <a:schemeClr val="accent2">
+                    <a:lumMod val="20000"/>
+                    <a:lumOff val="80000"/>
+                  </a:schemeClr>
+                </a:solidFill>
+              </a:rPr>
+              <a:t>magnitude</a:t>
+            </a:r>
+            <a:r>
+              <a:rPr lang="en-US" dirty="0">
+                <a:solidFill>
+                  <a:schemeClr val="accent2">
+                    <a:lumMod val="20000"/>
+                    <a:lumOff val="80000"/>
+                  </a:schemeClr>
+                </a:solidFill>
+              </a:rPr>
+              <a:t> and </a:t>
+            </a:r>
+            <a:r>
+              <a:rPr lang="en-US" b="1" dirty="0">
+                <a:solidFill>
+                  <a:schemeClr val="accent2">
+                    <a:lumMod val="20000"/>
+                    <a:lumOff val="80000"/>
+                  </a:schemeClr>
+                </a:solidFill>
+              </a:rPr>
+              <a:t>direction</a:t>
+            </a:r>
+            <a:r>
+              <a:rPr lang="en-US" dirty="0">
+                <a:solidFill>
+                  <a:schemeClr val="accent2">
+                    <a:lumMod val="20000"/>
+                    <a:lumOff val="80000"/>
+                  </a:schemeClr>
+                </a:solidFill>
+              </a:rPr>
+              <a:t>.</a:t>
+            </a:r>
+          </a:p>
+          <a:p>
+            <a:endParaRPr lang="en-US" dirty="0">
+              <a:solidFill>
+                <a:schemeClr val="accent2">
+                  <a:lumMod val="20000"/>
+                  <a:lumOff val="80000"/>
+                </a:schemeClr>
+              </a:solidFill>
+            </a:endParaRPr>
+          </a:p>
+          <a:p>
+            <a:r>
+              <a:rPr lang="en-US" dirty="0">
+                <a:solidFill>
+                  <a:schemeClr val="accent2">
+                    <a:lumMod val="20000"/>
+                    <a:lumOff val="80000"/>
+                  </a:schemeClr>
+                </a:solidFill>
+              </a:rPr>
+              <a:t>In SQL 2025:</a:t>
+            </a:r>
+          </a:p>
+          <a:p>
+            <a:endParaRPr lang="en-US" dirty="0">
+              <a:solidFill>
+                <a:schemeClr val="accent2">
+                  <a:lumMod val="20000"/>
+                  <a:lumOff val="80000"/>
+                </a:schemeClr>
+              </a:solidFill>
+            </a:endParaRPr>
+          </a:p>
+          <a:p>
+            <a:pPr lvl="1"/>
+            <a:r>
+              <a:rPr lang="en-US" dirty="0">
+                <a:solidFill>
+                  <a:schemeClr val="accent2">
+                    <a:lumMod val="20000"/>
+                    <a:lumOff val="80000"/>
+                  </a:schemeClr>
+                </a:solidFill>
+              </a:rPr>
+              <a:t>In SQL Server 2025, a vector refers to a new data type designed to store and manage numerical representations of data, particularly for AI and machine learning applications. These numerical representations are often called embeddings.  Used to do similarity search and or logical distance.</a:t>
+            </a:r>
+          </a:p>
+          <a:p>
+            <a:pPr lvl="1"/>
+            <a:endParaRPr lang="en-US" dirty="0">
+              <a:solidFill>
+                <a:schemeClr val="accent2">
+                  <a:lumMod val="20000"/>
+                  <a:lumOff val="80000"/>
+                </a:schemeClr>
+              </a:solidFill>
+            </a:endParaRPr>
+          </a:p>
+          <a:p>
+            <a:pPr lvl="1"/>
+            <a:endParaRPr lang="en-US" dirty="0">
+              <a:solidFill>
+                <a:schemeClr val="accent2">
+                  <a:lumMod val="20000"/>
+                  <a:lumOff val="80000"/>
+                </a:schemeClr>
+              </a:solidFill>
+            </a:endParaRPr>
+          </a:p>
+          <a:p>
+            <a:endParaRPr lang="en-US" dirty="0"/>
+          </a:p>
+        </p:txBody>
+      </p:sp>
+    </p:spTree>
+    <p:extLst>
+      <p:ext uri="{BB962C8B-B14F-4D97-AF65-F5344CB8AC3E}">
+        <p14:creationId xmlns:p14="http://schemas.microsoft.com/office/powerpoint/2010/main" val="1155694617"/>
+      </p:ext>
+    </p:extLst>
+  </p:cSld>
+  <p:clrMapOvr>
+    <a:masterClrMapping/>
+  </p:clrMapOvr>
+</p:sld>
+</file>
+
+<file path=ppt/slides/slide5.xml><?xml version="1.0" encoding="utf-8"?>
+<p:sld xmlns:a="http://schemas.openxmlformats.org/drawingml/2006/main" xmlns:r="http://schemas.openxmlformats.org/officeDocument/2006/relationships" xmlns:p="http://schemas.openxmlformats.org/presentationml/2006/main">
+  <p:cSld>
+    <p:spTree>
+      <p:nvGrpSpPr>
+        <p:cNvPr id="1" name="">
+          <a:extLst>
+            <a:ext uri="{FF2B5EF4-FFF2-40B4-BE49-F238E27FC236}">
+              <a16:creationId xmlns:a16="http://schemas.microsoft.com/office/drawing/2014/main" id="{C84C1D80-19AE-9AD7-9544-1EF4566EFCA7}"/>
+            </a:ext>
+          </a:extLst>
+        </p:cNvPr>
+        <p:cNvGrpSpPr/>
+        <p:nvPr/>
+      </p:nvGrpSpPr>
+      <p:grpSpPr>
+        <a:xfrm>
+          <a:off x="0" y="0"/>
+          <a:ext cx="0" cy="0"/>
+          <a:chOff x="0" y="0"/>
+          <a:chExt cx="0" cy="0"/>
+        </a:xfrm>
+      </p:grpSpPr>
+      <p:sp>
+        <p:nvSpPr>
+          <p:cNvPr id="2" name="Title 1">
+            <a:extLst>
+              <a:ext uri="{FF2B5EF4-FFF2-40B4-BE49-F238E27FC236}">
+                <a16:creationId xmlns:a16="http://schemas.microsoft.com/office/drawing/2014/main" id="{D23A2242-E41D-DCE7-E2FA-0F228DB5A5C9}"/>
+              </a:ext>
+            </a:extLst>
+          </p:cNvPr>
+          <p:cNvSpPr>
+            <a:spLocks noGrp="1"/>
+          </p:cNvSpPr>
+          <p:nvPr>
+            <p:ph type="title"/>
+          </p:nvPr>
+        </p:nvSpPr>
+        <p:spPr>
+          <a:xfrm>
+            <a:off x="321869" y="579120"/>
+            <a:ext cx="11548261" cy="590919"/>
+          </a:xfrm>
+        </p:spPr>
+        <p:txBody>
+          <a:bodyPr/>
+          <a:lstStyle/>
+          <a:p>
+            <a:r>
+              <a:rPr lang="en-US" dirty="0"/>
+              <a:t>Vector Data type</a:t>
+            </a:r>
+          </a:p>
+        </p:txBody>
+      </p:sp>
+      <p:sp>
+        <p:nvSpPr>
+          <p:cNvPr id="4" name="Slide Number Placeholder 3">
+            <a:extLst>
+              <a:ext uri="{FF2B5EF4-FFF2-40B4-BE49-F238E27FC236}">
+                <a16:creationId xmlns:a16="http://schemas.microsoft.com/office/drawing/2014/main" id="{C1DA1988-30A1-BAE5-E8B0-CF491831A3FB}"/>
+              </a:ext>
+            </a:extLst>
+          </p:cNvPr>
+          <p:cNvSpPr>
+            <a:spLocks noGrp="1"/>
+          </p:cNvSpPr>
+          <p:nvPr>
+            <p:ph type="sldNum" sz="quarter" idx="12"/>
+          </p:nvPr>
+        </p:nvSpPr>
+        <p:spPr/>
+        <p:txBody>
+          <a:bodyPr/>
+          <a:lstStyle/>
+          <a:p>
+            <a:fld id="{FE024F78-56A6-7740-B68D-8D4D026EDF3F}" type="slidenum">
+              <a:rPr lang="en-US" smtClean="0"/>
+              <a:pPr/>
+              <a:t>5</a:t>
+            </a:fld>
+            <a:endParaRPr lang="en-US" dirty="0"/>
+          </a:p>
+        </p:txBody>
+      </p:sp>
+      <p:sp>
+        <p:nvSpPr>
+          <p:cNvPr id="5" name="TextBox 4">
+            <a:extLst>
+              <a:ext uri="{FF2B5EF4-FFF2-40B4-BE49-F238E27FC236}">
+                <a16:creationId xmlns:a16="http://schemas.microsoft.com/office/drawing/2014/main" id="{CC18A7CB-7F3C-A6AF-4739-CDEC843331B5}"/>
+              </a:ext>
+            </a:extLst>
+          </p:cNvPr>
+          <p:cNvSpPr txBox="1"/>
+          <p:nvPr/>
+        </p:nvSpPr>
+        <p:spPr>
+          <a:xfrm>
+            <a:off x="904569" y="1406014"/>
+            <a:ext cx="9389806" cy="5078313"/>
+          </a:xfrm>
+          <a:prstGeom prst="rect">
+            <a:avLst/>
+          </a:prstGeom>
+          <a:noFill/>
+        </p:spPr>
+        <p:txBody>
+          <a:bodyPr wrap="square" rtlCol="0">
+            <a:spAutoFit/>
+          </a:bodyPr>
+          <a:lstStyle/>
+          <a:p>
+            <a:pPr lvl="1"/>
+            <a:r>
+              <a:rPr lang="en-US" dirty="0">
+                <a:solidFill>
+                  <a:schemeClr val="accent2">
+                    <a:lumMod val="20000"/>
+                    <a:lumOff val="80000"/>
+                  </a:schemeClr>
+                </a:solidFill>
+              </a:rPr>
+              <a:t>Stored as a </a:t>
+            </a:r>
+            <a:r>
+              <a:rPr lang="en-US" dirty="0" err="1">
+                <a:solidFill>
+                  <a:schemeClr val="accent2">
+                    <a:lumMod val="20000"/>
+                    <a:lumOff val="80000"/>
+                  </a:schemeClr>
+                </a:solidFill>
+              </a:rPr>
+              <a:t>varbinary</a:t>
+            </a:r>
+            <a:endParaRPr lang="en-US" dirty="0">
+              <a:solidFill>
+                <a:schemeClr val="accent2">
+                  <a:lumMod val="20000"/>
+                  <a:lumOff val="80000"/>
+                </a:schemeClr>
+              </a:solidFill>
+            </a:endParaRPr>
+          </a:p>
+          <a:p>
+            <a:pPr lvl="1"/>
+            <a:r>
+              <a:rPr lang="en-US" dirty="0">
+                <a:solidFill>
+                  <a:schemeClr val="accent2">
+                    <a:lumMod val="20000"/>
+                    <a:lumOff val="80000"/>
+                  </a:schemeClr>
+                </a:solidFill>
+              </a:rPr>
+              <a:t>Looks like an array of floating point (float32 or float16)</a:t>
+            </a:r>
+          </a:p>
+          <a:p>
+            <a:pPr lvl="1"/>
+            <a:r>
+              <a:rPr lang="en-US" dirty="0">
+                <a:solidFill>
+                  <a:schemeClr val="accent2">
+                    <a:lumMod val="20000"/>
+                    <a:lumOff val="80000"/>
+                  </a:schemeClr>
+                </a:solidFill>
+              </a:rPr>
+              <a:t>JSON format used</a:t>
+            </a:r>
+          </a:p>
+          <a:p>
+            <a:pPr lvl="1"/>
+            <a:endParaRPr lang="en-US" dirty="0">
+              <a:solidFill>
+                <a:schemeClr val="accent2">
+                  <a:lumMod val="20000"/>
+                  <a:lumOff val="80000"/>
+                </a:schemeClr>
+              </a:solidFill>
+            </a:endParaRPr>
+          </a:p>
+          <a:p>
+            <a:pPr lvl="1"/>
+            <a:r>
+              <a:rPr lang="en-US" dirty="0">
+                <a:solidFill>
+                  <a:schemeClr val="accent2">
+                    <a:lumMod val="20000"/>
+                    <a:lumOff val="80000"/>
+                  </a:schemeClr>
+                </a:solidFill>
+              </a:rPr>
+              <a:t>Limitations </a:t>
+            </a:r>
+          </a:p>
+          <a:p>
+            <a:pPr marL="1200150" lvl="2" indent="-285750">
+              <a:buFont typeface="Arial" panose="020B0604020202020204" pitchFamily="34" charset="0"/>
+              <a:buChar char="•"/>
+            </a:pPr>
+            <a:r>
+              <a:rPr lang="en-US" dirty="0">
+                <a:solidFill>
+                  <a:schemeClr val="accent2">
+                    <a:lumMod val="20000"/>
+                    <a:lumOff val="80000"/>
+                  </a:schemeClr>
+                </a:solidFill>
+              </a:rPr>
+              <a:t>Holds up to 1998 dimensions</a:t>
+            </a:r>
+          </a:p>
+          <a:p>
+            <a:pPr marL="1200150" lvl="2" indent="-285750">
+              <a:buFont typeface="Arial" panose="020B0604020202020204" pitchFamily="34" charset="0"/>
+              <a:buChar char="•"/>
+            </a:pPr>
+            <a:r>
+              <a:rPr lang="en-US" dirty="0">
+                <a:solidFill>
+                  <a:schemeClr val="accent2">
+                    <a:lumMod val="20000"/>
+                    <a:lumOff val="80000"/>
+                  </a:schemeClr>
+                </a:solidFill>
+              </a:rPr>
+              <a:t>Check and Default constraints nor not support for Vector columns</a:t>
+            </a:r>
+          </a:p>
+          <a:p>
+            <a:pPr marL="1200150" lvl="2" indent="-285750">
+              <a:buFont typeface="Arial" panose="020B0604020202020204" pitchFamily="34" charset="0"/>
+              <a:buChar char="•"/>
+            </a:pPr>
+            <a:r>
+              <a:rPr lang="en-US" dirty="0">
+                <a:solidFill>
+                  <a:schemeClr val="accent2">
+                    <a:lumMod val="20000"/>
+                    <a:lumOff val="80000"/>
+                  </a:schemeClr>
+                </a:solidFill>
+              </a:rPr>
+              <a:t>Foreign key and primary key constraints not supported</a:t>
+            </a:r>
+          </a:p>
+          <a:p>
+            <a:pPr marL="1200150" lvl="2" indent="-285750">
+              <a:buFont typeface="Arial" panose="020B0604020202020204" pitchFamily="34" charset="0"/>
+              <a:buChar char="•"/>
+            </a:pPr>
+            <a:r>
+              <a:rPr lang="en-US" dirty="0">
+                <a:solidFill>
+                  <a:schemeClr val="accent2">
+                    <a:lumMod val="20000"/>
+                    <a:lumOff val="80000"/>
+                  </a:schemeClr>
+                </a:solidFill>
+              </a:rPr>
+              <a:t>Most function other than the new Vector type functions will not work correctly</a:t>
+            </a:r>
+          </a:p>
+          <a:p>
+            <a:pPr marL="1200150" lvl="2" indent="-285750">
+              <a:buFont typeface="Arial" panose="020B0604020202020204" pitchFamily="34" charset="0"/>
+              <a:buChar char="•"/>
+            </a:pPr>
+            <a:r>
+              <a:rPr lang="en-US" dirty="0">
+                <a:solidFill>
+                  <a:schemeClr val="accent2">
+                    <a:lumMod val="20000"/>
+                    <a:lumOff val="80000"/>
+                  </a:schemeClr>
+                </a:solidFill>
+              </a:rPr>
+              <a:t>Memory-Optimized table not support</a:t>
+            </a:r>
+          </a:p>
+          <a:p>
+            <a:pPr marL="1200150" lvl="2" indent="-285750">
+              <a:buFont typeface="Arial" panose="020B0604020202020204" pitchFamily="34" charset="0"/>
+              <a:buChar char="•"/>
+            </a:pPr>
+            <a:r>
+              <a:rPr lang="en-US" dirty="0">
+                <a:solidFill>
+                  <a:schemeClr val="accent2">
+                    <a:lumMod val="20000"/>
+                    <a:lumOff val="80000"/>
+                  </a:schemeClr>
+                </a:solidFill>
+              </a:rPr>
+              <a:t>Always Encrypted not support</a:t>
+            </a:r>
+          </a:p>
+          <a:p>
+            <a:pPr marL="1200150" lvl="2" indent="-285750">
+              <a:buFont typeface="Arial" panose="020B0604020202020204" pitchFamily="34" charset="0"/>
+              <a:buChar char="•"/>
+            </a:pPr>
+            <a:r>
+              <a:rPr lang="en-US" dirty="0">
+                <a:solidFill>
+                  <a:schemeClr val="accent2">
+                    <a:lumMod val="20000"/>
+                    <a:lumOff val="80000"/>
+                  </a:schemeClr>
+                </a:solidFill>
+              </a:rPr>
+              <a:t>No indexes expect for new vector index type on vector columns</a:t>
+            </a:r>
+          </a:p>
+          <a:p>
+            <a:pPr lvl="1"/>
+            <a:endParaRPr lang="en-US" dirty="0">
+              <a:solidFill>
+                <a:schemeClr val="accent2">
+                  <a:lumMod val="20000"/>
+                  <a:lumOff val="80000"/>
+                </a:schemeClr>
+              </a:solidFill>
+            </a:endParaRPr>
+          </a:p>
+          <a:p>
+            <a:pPr lvl="1"/>
+            <a:r>
+              <a:rPr lang="en-US" dirty="0">
+                <a:solidFill>
+                  <a:schemeClr val="accent2">
+                    <a:lumMod val="20000"/>
+                    <a:lumOff val="80000"/>
+                  </a:schemeClr>
+                </a:solidFill>
+              </a:rPr>
+              <a:t>New Vector index using </a:t>
+            </a:r>
+            <a:r>
+              <a:rPr lang="en-US" dirty="0" err="1">
+                <a:solidFill>
+                  <a:schemeClr val="accent2">
+                    <a:lumMod val="20000"/>
+                    <a:lumOff val="80000"/>
+                  </a:schemeClr>
+                </a:solidFill>
+              </a:rPr>
+              <a:t>DiskANN</a:t>
+            </a:r>
+            <a:endParaRPr lang="en-US" dirty="0">
+              <a:solidFill>
+                <a:schemeClr val="accent2">
+                  <a:lumMod val="20000"/>
+                  <a:lumOff val="80000"/>
+                </a:schemeClr>
+              </a:solidFill>
+            </a:endParaRPr>
+          </a:p>
+          <a:p>
+            <a:pPr lvl="1"/>
+            <a:endParaRPr lang="en-US" dirty="0">
+              <a:solidFill>
+                <a:schemeClr val="accent2">
+                  <a:lumMod val="20000"/>
+                  <a:lumOff val="80000"/>
+                </a:schemeClr>
+              </a:solidFill>
+            </a:endParaRPr>
+          </a:p>
+          <a:p>
+            <a:pPr lvl="1"/>
+            <a:endParaRPr lang="en-US" dirty="0">
+              <a:solidFill>
+                <a:schemeClr val="accent2">
+                  <a:lumMod val="20000"/>
+                  <a:lumOff val="80000"/>
+                </a:schemeClr>
+              </a:solidFill>
+            </a:endParaRPr>
+          </a:p>
+          <a:p>
+            <a:pPr lvl="1"/>
+            <a:endParaRPr lang="en-US" dirty="0">
+              <a:solidFill>
+                <a:schemeClr val="accent2">
+                  <a:lumMod val="20000"/>
+                  <a:lumOff val="80000"/>
+                </a:schemeClr>
+              </a:solidFill>
+            </a:endParaRPr>
+          </a:p>
+          <a:p>
+            <a:endParaRPr lang="en-US" dirty="0"/>
+          </a:p>
+        </p:txBody>
+      </p:sp>
+    </p:spTree>
+    <p:extLst>
+      <p:ext uri="{BB962C8B-B14F-4D97-AF65-F5344CB8AC3E}">
+        <p14:creationId xmlns:p14="http://schemas.microsoft.com/office/powerpoint/2010/main" val="582232591"/>
+      </p:ext>
+    </p:extLst>
+  </p:cSld>
+  <p:clrMapOvr>
+    <a:masterClrMapping/>
+  </p:clrMapOvr>
+</p:sld>
+</file>
+
+<file path=ppt/slides/slide6.xml><?xml version="1.0" encoding="utf-8"?>
+<p:sld xmlns:a="http://schemas.openxmlformats.org/drawingml/2006/main" xmlns:r="http://schemas.openxmlformats.org/officeDocument/2006/relationships" xmlns:p="http://schemas.openxmlformats.org/presentationml/2006/main">
+  <p:cSld>
+    <p:spTree>
+      <p:nvGrpSpPr>
+        <p:cNvPr id="1" name=""/>
+        <p:cNvGrpSpPr/>
+        <p:nvPr/>
+      </p:nvGrpSpPr>
+      <p:grpSpPr>
+        <a:xfrm>
+          <a:off x="0" y="0"/>
+          <a:ext cx="0" cy="0"/>
+          <a:chOff x="0" y="0"/>
+          <a:chExt cx="0" cy="0"/>
+        </a:xfrm>
+      </p:grpSpPr>
+      <p:sp>
+        <p:nvSpPr>
+          <p:cNvPr id="2" name="Title 1">
+            <a:extLst>
+              <a:ext uri="{FF2B5EF4-FFF2-40B4-BE49-F238E27FC236}">
+                <a16:creationId xmlns:a16="http://schemas.microsoft.com/office/drawing/2014/main" id="{718C5A32-2572-96A5-EBB3-09019F61350F}"/>
+              </a:ext>
+            </a:extLst>
+          </p:cNvPr>
+          <p:cNvSpPr>
+            <a:spLocks noGrp="1"/>
+          </p:cNvSpPr>
+          <p:nvPr>
+            <p:ph type="title"/>
+          </p:nvPr>
+        </p:nvSpPr>
+        <p:spPr>
+          <a:xfrm>
+            <a:off x="321869" y="579120"/>
+            <a:ext cx="11548261" cy="482764"/>
+          </a:xfrm>
+        </p:spPr>
+        <p:txBody>
+          <a:bodyPr/>
+          <a:lstStyle/>
+          <a:p>
+            <a:r>
+              <a:rPr lang="en-US" dirty="0"/>
+              <a:t>Demo Setup</a:t>
+            </a:r>
+          </a:p>
+        </p:txBody>
+      </p:sp>
+      <p:sp>
+        <p:nvSpPr>
+          <p:cNvPr id="4" name="Slide Number Placeholder 3">
+            <a:extLst>
+              <a:ext uri="{FF2B5EF4-FFF2-40B4-BE49-F238E27FC236}">
+                <a16:creationId xmlns:a16="http://schemas.microsoft.com/office/drawing/2014/main" id="{2A810734-4519-D94F-D397-E200457B763D}"/>
+              </a:ext>
+            </a:extLst>
+          </p:cNvPr>
+          <p:cNvSpPr>
+            <a:spLocks noGrp="1"/>
+          </p:cNvSpPr>
+          <p:nvPr>
+            <p:ph type="sldNum" sz="quarter" idx="12"/>
+          </p:nvPr>
+        </p:nvSpPr>
+        <p:spPr/>
+        <p:txBody>
+          <a:bodyPr/>
+          <a:lstStyle/>
+          <a:p>
+            <a:fld id="{FE024F78-56A6-7740-B68D-8D4D026EDF3F}" type="slidenum">
+              <a:rPr lang="en-US" smtClean="0"/>
+              <a:pPr/>
+              <a:t>6</a:t>
+            </a:fld>
+            <a:endParaRPr lang="en-US" dirty="0"/>
+          </a:p>
+        </p:txBody>
+      </p:sp>
+      <p:sp>
+        <p:nvSpPr>
+          <p:cNvPr id="5" name="TextBox 4">
+            <a:extLst>
+              <a:ext uri="{FF2B5EF4-FFF2-40B4-BE49-F238E27FC236}">
+                <a16:creationId xmlns:a16="http://schemas.microsoft.com/office/drawing/2014/main" id="{96D9EF59-16FB-1C65-3A5C-E878ADEA2979}"/>
+              </a:ext>
+            </a:extLst>
+          </p:cNvPr>
+          <p:cNvSpPr txBox="1"/>
+          <p:nvPr/>
+        </p:nvSpPr>
+        <p:spPr>
+          <a:xfrm>
+            <a:off x="924231" y="1297858"/>
+            <a:ext cx="7806813" cy="3139321"/>
+          </a:xfrm>
+          <a:prstGeom prst="rect">
+            <a:avLst/>
+          </a:prstGeom>
+          <a:noFill/>
+        </p:spPr>
+        <p:txBody>
+          <a:bodyPr wrap="square" rtlCol="0">
+            <a:spAutoFit/>
+          </a:bodyPr>
+          <a:lstStyle/>
+          <a:p>
+            <a:pPr marL="285750" indent="-285750">
+              <a:buFont typeface="Arial" panose="020B0604020202020204" pitchFamily="34" charset="0"/>
+              <a:buChar char="•"/>
+            </a:pPr>
+            <a:r>
+              <a:rPr lang="en-US" u="sng" dirty="0">
+                <a:solidFill>
+                  <a:schemeClr val="accent2">
+                    <a:lumMod val="20000"/>
+                    <a:lumOff val="80000"/>
+                  </a:schemeClr>
+                </a:solidFill>
+              </a:rPr>
+              <a:t>SQL 2025 Developer Edition</a:t>
+            </a:r>
+          </a:p>
+          <a:p>
+            <a:pPr marL="285750" indent="-285750">
+              <a:buFont typeface="Arial" panose="020B0604020202020204" pitchFamily="34" charset="0"/>
+              <a:buChar char="•"/>
+            </a:pPr>
+            <a:r>
+              <a:rPr lang="en-US" u="sng" dirty="0">
+                <a:solidFill>
+                  <a:schemeClr val="accent2">
+                    <a:lumMod val="20000"/>
+                    <a:lumOff val="80000"/>
+                  </a:schemeClr>
+                </a:solidFill>
+              </a:rPr>
+              <a:t>SQL Server Management Studio version 22</a:t>
+            </a:r>
+          </a:p>
+          <a:p>
+            <a:pPr marL="285750" indent="-285750">
+              <a:buFont typeface="Arial" panose="020B0604020202020204" pitchFamily="34" charset="0"/>
+              <a:buChar char="•"/>
+            </a:pPr>
+            <a:r>
+              <a:rPr lang="en-US" u="sng" dirty="0">
+                <a:solidFill>
+                  <a:schemeClr val="accent2">
+                    <a:lumMod val="20000"/>
+                    <a:lumOff val="80000"/>
+                  </a:schemeClr>
+                </a:solidFill>
+              </a:rPr>
+              <a:t>Ollama (local model)</a:t>
+            </a:r>
+          </a:p>
+          <a:p>
+            <a:pPr marL="285750" indent="-285750">
+              <a:buFont typeface="Arial" panose="020B0604020202020204" pitchFamily="34" charset="0"/>
+              <a:buChar char="•"/>
+            </a:pPr>
+            <a:r>
+              <a:rPr lang="en-US" u="sng" dirty="0">
+                <a:solidFill>
+                  <a:schemeClr val="accent2">
+                    <a:lumMod val="20000"/>
+                    <a:lumOff val="80000"/>
+                  </a:schemeClr>
+                </a:solidFill>
+              </a:rPr>
+              <a:t>OpenSSL (generate certificate)</a:t>
+            </a:r>
+          </a:p>
+          <a:p>
+            <a:pPr marL="285750" indent="-285750">
+              <a:buFont typeface="Arial" panose="020B0604020202020204" pitchFamily="34" charset="0"/>
+              <a:buChar char="•"/>
+            </a:pPr>
+            <a:r>
+              <a:rPr lang="en-US" u="sng" dirty="0">
+                <a:solidFill>
+                  <a:schemeClr val="accent2">
+                    <a:lumMod val="20000"/>
+                    <a:lumOff val="80000"/>
+                  </a:schemeClr>
+                </a:solidFill>
+              </a:rPr>
+              <a:t>NGINX (HTTPS service)</a:t>
+            </a:r>
+          </a:p>
+          <a:p>
+            <a:pPr marL="285750" indent="-285750">
+              <a:buFont typeface="Arial" panose="020B0604020202020204" pitchFamily="34" charset="0"/>
+              <a:buChar char="•"/>
+            </a:pPr>
+            <a:r>
+              <a:rPr lang="en-US" u="sng" dirty="0">
+                <a:solidFill>
+                  <a:schemeClr val="accent2">
+                    <a:lumMod val="20000"/>
+                    <a:lumOff val="80000"/>
+                  </a:schemeClr>
+                </a:solidFill>
+              </a:rPr>
+              <a:t>POSTMAN (test https post)</a:t>
+            </a:r>
+          </a:p>
+          <a:p>
+            <a:pPr marL="285750" indent="-285750">
+              <a:buFont typeface="Arial" panose="020B0604020202020204" pitchFamily="34" charset="0"/>
+              <a:buChar char="•"/>
+            </a:pPr>
+            <a:r>
+              <a:rPr lang="en-US" u="sng" dirty="0">
+                <a:solidFill>
+                  <a:schemeClr val="accent2">
+                    <a:lumMod val="20000"/>
+                    <a:lumOff val="80000"/>
+                  </a:schemeClr>
+                </a:solidFill>
+              </a:rPr>
+              <a:t>SP_CONFIGURE</a:t>
+            </a:r>
+          </a:p>
+          <a:p>
+            <a:pPr marL="285750" indent="-285750">
+              <a:buFont typeface="Arial" panose="020B0604020202020204" pitchFamily="34" charset="0"/>
+              <a:buChar char="•"/>
+            </a:pPr>
+            <a:r>
+              <a:rPr lang="en-US" u="sng" dirty="0">
+                <a:solidFill>
+                  <a:schemeClr val="accent2">
+                    <a:lumMod val="20000"/>
+                    <a:lumOff val="80000"/>
+                  </a:schemeClr>
+                </a:solidFill>
+              </a:rPr>
+              <a:t>	external rest endpoint enabled</a:t>
+            </a:r>
+          </a:p>
+          <a:p>
+            <a:pPr marL="285750" indent="-285750">
+              <a:buFont typeface="Arial" panose="020B0604020202020204" pitchFamily="34" charset="0"/>
+              <a:buChar char="•"/>
+            </a:pPr>
+            <a:r>
+              <a:rPr lang="en-US" u="sng" dirty="0">
+                <a:solidFill>
+                  <a:schemeClr val="accent2">
+                    <a:lumMod val="20000"/>
+                    <a:lumOff val="80000"/>
+                  </a:schemeClr>
+                </a:solidFill>
+              </a:rPr>
+              <a:t>Create External Model</a:t>
+            </a:r>
+          </a:p>
+          <a:p>
+            <a:pPr marL="285750" indent="-285750">
+              <a:buFont typeface="Arial" panose="020B0604020202020204" pitchFamily="34" charset="0"/>
+              <a:buChar char="•"/>
+            </a:pPr>
+            <a:r>
+              <a:rPr lang="en-US" u="sng" dirty="0">
+                <a:solidFill>
+                  <a:schemeClr val="accent2">
+                    <a:lumMod val="20000"/>
+                    <a:lumOff val="80000"/>
+                  </a:schemeClr>
+                </a:solidFill>
+              </a:rPr>
+              <a:t>AI_GENERATE_EMBEDDINGS (test model)</a:t>
+            </a:r>
+          </a:p>
+          <a:p>
+            <a:endParaRPr lang="en-US" dirty="0"/>
+          </a:p>
+        </p:txBody>
+      </p:sp>
+    </p:spTree>
+    <p:extLst>
+      <p:ext uri="{BB962C8B-B14F-4D97-AF65-F5344CB8AC3E}">
+        <p14:creationId xmlns:p14="http://schemas.microsoft.com/office/powerpoint/2010/main" val="1587207474"/>
+      </p:ext>
+    </p:extLst>
+  </p:cSld>
+  <p:clrMapOvr>
+    <a:masterClrMapping/>
+  </p:clrMapOvr>
+</p:sld>
+</file>
+
+<file path=ppt/slides/slide7.xml><?xml version="1.0" encoding="utf-8"?>
+<p:sld xmlns:a="http://schemas.openxmlformats.org/drawingml/2006/main" xmlns:r="http://schemas.openxmlformats.org/officeDocument/2006/relationships" xmlns:p="http://schemas.openxmlformats.org/presentationml/2006/main">
+  <p:cSld>
+    <p:spTree>
+      <p:nvGrpSpPr>
+        <p:cNvPr id="1" name=""/>
+        <p:cNvGrpSpPr/>
+        <p:nvPr/>
+      </p:nvGrpSpPr>
+      <p:grpSpPr>
+        <a:xfrm>
+          <a:off x="0" y="0"/>
+          <a:ext cx="0" cy="0"/>
+          <a:chOff x="0" y="0"/>
+          <a:chExt cx="0" cy="0"/>
+        </a:xfrm>
+      </p:grpSpPr>
+      <p:sp>
+        <p:nvSpPr>
           <p:cNvPr id="4" name="Subtitle 3">
             <a:extLst>
               <a:ext uri="{FF2B5EF4-FFF2-40B4-BE49-F238E27FC236}">
@@ -15160,7 +17018,7 @@
             <a:fld id="{FE024F78-56A6-7740-B68D-8D4D026EDF3F}" type="slidenum">
               <a:rPr lang="en-US" smtClean="0"/>
               <a:pPr/>
-              <a:t>3</a:t>
+              <a:t>7</a:t>
             </a:fld>
             <a:endParaRPr lang="en-US" dirty="0"/>
           </a:p>
@@ -15207,7 +17065,7 @@
 </p:sld>
 </file>
 
-<file path=ppt/slides/slide4.xml><?xml version="1.0" encoding="utf-8"?>
+<file path=ppt/slides/slide8.xml><?xml version="1.0" encoding="utf-8"?>
 <p:sld xmlns:a="http://schemas.openxmlformats.org/drawingml/2006/main" xmlns:r="http://schemas.openxmlformats.org/officeDocument/2006/relationships" xmlns:p="http://schemas.openxmlformats.org/presentationml/2006/main">
   <p:cSld>
     <p:spTree>
@@ -15292,7 +17150,7 @@
             <a:fld id="{FE024F78-56A6-7740-B68D-8D4D026EDF3F}" type="slidenum">
               <a:rPr lang="en-US" smtClean="0"/>
               <a:pPr/>
-              <a:t>4</a:t>
+              <a:t>8</a:t>
             </a:fld>
             <a:endParaRPr lang="en-US" dirty="0"/>
           </a:p>
@@ -15339,7 +17197,7 @@
 </p:sld>
 </file>
 
-<file path=ppt/slides/slide5.xml><?xml version="1.0" encoding="utf-8"?>
+<file path=ppt/slides/slide9.xml><?xml version="1.0" encoding="utf-8"?>
 <p:sld xmlns:a="http://schemas.openxmlformats.org/drawingml/2006/main" xmlns:r="http://schemas.openxmlformats.org/officeDocument/2006/relationships" xmlns:p="http://schemas.openxmlformats.org/presentationml/2006/main">
   <p:cSld>
     <p:spTree>
@@ -15424,7 +17282,7 @@
             <a:fld id="{FE024F78-56A6-7740-B68D-8D4D026EDF3F}" type="slidenum">
               <a:rPr lang="en-US" smtClean="0"/>
               <a:pPr/>
-              <a:t>5</a:t>
+              <a:t>9</a:t>
             </a:fld>
             <a:endParaRPr lang="en-US" dirty="0"/>
           </a:p>
@@ -15462,716 +17320,6 @@
     <p:extLst>
       <p:ext uri="{BB962C8B-B14F-4D97-AF65-F5344CB8AC3E}">
         <p14:creationId xmlns:p14="http://schemas.microsoft.com/office/powerpoint/2010/main" val="1684862160"/>
-      </p:ext>
-    </p:extLst>
-  </p:cSld>
-  <p:clrMapOvr>
-    <a:masterClrMapping/>
-  </p:clrMapOvr>
-</p:sld>
-</file>
-
-<file path=ppt/slides/slide6.xml><?xml version="1.0" encoding="utf-8"?>
-<p:sld xmlns:a="http://schemas.openxmlformats.org/drawingml/2006/main" xmlns:r="http://schemas.openxmlformats.org/officeDocument/2006/relationships" xmlns:p="http://schemas.openxmlformats.org/presentationml/2006/main" show="0">
-  <p:cSld>
-    <p:bg>
-      <p:bgPr>
-        <a:gradFill>
-          <a:gsLst>
-            <a:gs pos="100000">
-              <a:schemeClr val="tx2"/>
-            </a:gs>
-            <a:gs pos="79000">
-              <a:schemeClr val="accent6"/>
-            </a:gs>
-            <a:gs pos="31000">
-              <a:srgbClr val="02090E"/>
-            </a:gs>
-            <a:gs pos="14000">
-              <a:schemeClr val="accent4">
-                <a:lumMod val="75000"/>
-              </a:schemeClr>
-            </a:gs>
-            <a:gs pos="0">
-              <a:schemeClr val="accent4"/>
-            </a:gs>
-          </a:gsLst>
-          <a:lin ang="5400000" scaled="0"/>
-        </a:gradFill>
-        <a:effectLst/>
-      </p:bgPr>
-    </p:bg>
-    <p:spTree>
-      <p:nvGrpSpPr>
-        <p:cNvPr id="1" name=""/>
-        <p:cNvGrpSpPr/>
-        <p:nvPr/>
-      </p:nvGrpSpPr>
-      <p:grpSpPr>
-        <a:xfrm>
-          <a:off x="0" y="0"/>
-          <a:ext cx="0" cy="0"/>
-          <a:chOff x="0" y="0"/>
-          <a:chExt cx="0" cy="0"/>
-        </a:xfrm>
-      </p:grpSpPr>
-      <p:sp>
-        <p:nvSpPr>
-          <p:cNvPr id="3" name="Title 2">
-            <a:extLst>
-              <a:ext uri="{FF2B5EF4-FFF2-40B4-BE49-F238E27FC236}">
-                <a16:creationId xmlns:a16="http://schemas.microsoft.com/office/drawing/2014/main" id="{3FEFE388-CD0B-9671-4D4E-D6D8004C8851}"/>
-              </a:ext>
-            </a:extLst>
-          </p:cNvPr>
-          <p:cNvSpPr>
-            <a:spLocks noGrp="1"/>
-          </p:cNvSpPr>
-          <p:nvPr>
-            <p:ph type="title"/>
-          </p:nvPr>
-        </p:nvSpPr>
-        <p:spPr>
-          <a:xfrm>
-            <a:off x="799891" y="511762"/>
-            <a:ext cx="4960830" cy="2785158"/>
-          </a:xfrm>
-        </p:spPr>
-        <p:txBody>
-          <a:bodyPr/>
-          <a:lstStyle/>
-          <a:p>
-            <a:r>
-              <a:rPr lang="en-US" dirty="0"/>
-              <a:t>Overcoming </a:t>
-            </a:r>
-          </a:p>
-        </p:txBody>
-      </p:sp>
-      <p:sp>
-        <p:nvSpPr>
-          <p:cNvPr id="5" name="Subtitle 4">
-            <a:extLst>
-              <a:ext uri="{FF2B5EF4-FFF2-40B4-BE49-F238E27FC236}">
-                <a16:creationId xmlns:a16="http://schemas.microsoft.com/office/drawing/2014/main" id="{BE4E0F37-0AD5-833C-CBE5-EAE02EC46069}"/>
-              </a:ext>
-            </a:extLst>
-          </p:cNvPr>
-          <p:cNvSpPr>
-            <a:spLocks noGrp="1"/>
-          </p:cNvSpPr>
-          <p:nvPr>
-            <p:ph type="subTitle" idx="1"/>
-          </p:nvPr>
-        </p:nvSpPr>
-        <p:spPr>
-          <a:xfrm>
-            <a:off x="802640" y="3484615"/>
-            <a:ext cx="4958081" cy="2387865"/>
-          </a:xfrm>
-        </p:spPr>
-        <p:txBody>
-          <a:bodyPr/>
-          <a:lstStyle/>
-          <a:p>
-            <a:r>
-              <a:rPr lang="en-US" dirty="0"/>
-              <a:t>Nervousness</a:t>
-            </a:r>
-          </a:p>
-        </p:txBody>
-      </p:sp>
-      <p:pic>
-        <p:nvPicPr>
-          <p:cNvPr id="8" name="Picture Placeholder 7" descr="A blue and purple spirals">
-            <a:extLst>
-              <a:ext uri="{FF2B5EF4-FFF2-40B4-BE49-F238E27FC236}">
-                <a16:creationId xmlns:a16="http://schemas.microsoft.com/office/drawing/2014/main" id="{E1DBD4C7-D952-4426-40FD-8799F80F821F}"/>
-              </a:ext>
-            </a:extLst>
-          </p:cNvPr>
-          <p:cNvPicPr>
-            <a:picLocks noGrp="1" noChangeAspect="1"/>
-          </p:cNvPicPr>
-          <p:nvPr>
-            <p:ph type="pic" sz="quarter" idx="13"/>
-          </p:nvPr>
-        </p:nvPicPr>
-        <p:blipFill>
-          <a:blip r:embed="rId3"/>
-          <a:srcRect t="31" b="31"/>
-          <a:stretch/>
-        </p:blipFill>
-        <p:spPr>
-          <a:xfrm>
-            <a:off x="6497638" y="336550"/>
-            <a:ext cx="5322887" cy="6184900"/>
-          </a:xfrm>
-        </p:spPr>
-      </p:pic>
-      <p:sp>
-        <p:nvSpPr>
-          <p:cNvPr id="4" name="Slide Number Placeholder 3">
-            <a:extLst>
-              <a:ext uri="{FF2B5EF4-FFF2-40B4-BE49-F238E27FC236}">
-                <a16:creationId xmlns:a16="http://schemas.microsoft.com/office/drawing/2014/main" id="{67D6EA54-3083-FB0D-9011-2353791B0495}"/>
-              </a:ext>
-            </a:extLst>
-          </p:cNvPr>
-          <p:cNvSpPr>
-            <a:spLocks noGrp="1"/>
-          </p:cNvSpPr>
-          <p:nvPr>
-            <p:ph type="sldNum" sz="quarter" idx="12"/>
-          </p:nvPr>
-        </p:nvSpPr>
-        <p:spPr>
-          <a:xfrm>
-            <a:off x="9140971" y="6226198"/>
-            <a:ext cx="2743200" cy="365125"/>
-          </a:xfrm>
-        </p:spPr>
-        <p:txBody>
-          <a:bodyPr/>
-          <a:lstStyle/>
-          <a:p>
-            <a:fld id="{FE024F78-56A6-7740-B68D-8D4D026EDF3F}" type="slidenum">
-              <a:rPr lang="en-US" smtClean="0"/>
-              <a:pPr/>
-              <a:t>6</a:t>
-            </a:fld>
-            <a:endParaRPr lang="en-US" dirty="0"/>
-          </a:p>
-        </p:txBody>
-      </p:sp>
-    </p:spTree>
-    <p:extLst>
-      <p:ext uri="{BB962C8B-B14F-4D97-AF65-F5344CB8AC3E}">
-        <p14:creationId xmlns:p14="http://schemas.microsoft.com/office/powerpoint/2010/main" val="598144966"/>
-      </p:ext>
-    </p:extLst>
-  </p:cSld>
-  <p:clrMapOvr>
-    <a:masterClrMapping/>
-  </p:clrMapOvr>
-</p:sld>
-</file>
-
-<file path=ppt/slides/slide7.xml><?xml version="1.0" encoding="utf-8"?>
-<p:sld xmlns:a="http://schemas.openxmlformats.org/drawingml/2006/main" xmlns:r="http://schemas.openxmlformats.org/officeDocument/2006/relationships" xmlns:p="http://schemas.openxmlformats.org/presentationml/2006/main" show="0">
-  <p:cSld>
-    <p:spTree>
-      <p:nvGrpSpPr>
-        <p:cNvPr id="1" name=""/>
-        <p:cNvGrpSpPr/>
-        <p:nvPr/>
-      </p:nvGrpSpPr>
-      <p:grpSpPr>
-        <a:xfrm>
-          <a:off x="0" y="0"/>
-          <a:ext cx="0" cy="0"/>
-          <a:chOff x="0" y="0"/>
-          <a:chExt cx="0" cy="0"/>
-        </a:xfrm>
-      </p:grpSpPr>
-      <p:sp>
-        <p:nvSpPr>
-          <p:cNvPr id="2" name="Title 1">
-            <a:extLst>
-              <a:ext uri="{FF2B5EF4-FFF2-40B4-BE49-F238E27FC236}">
-                <a16:creationId xmlns:a16="http://schemas.microsoft.com/office/drawing/2014/main" id="{D9F60903-003B-273E-3584-5312F76C3EF3}"/>
-              </a:ext>
-            </a:extLst>
-          </p:cNvPr>
-          <p:cNvSpPr>
-            <a:spLocks noGrp="1"/>
-          </p:cNvSpPr>
-          <p:nvPr>
-            <p:ph type="title"/>
-          </p:nvPr>
-        </p:nvSpPr>
-        <p:spPr>
-          <a:xfrm>
-            <a:off x="3305669" y="113097"/>
-            <a:ext cx="7420819" cy="1656304"/>
-          </a:xfrm>
-        </p:spPr>
-        <p:txBody>
-          <a:bodyPr/>
-          <a:lstStyle/>
-          <a:p>
-            <a:r>
-              <a:rPr lang="en-US" dirty="0"/>
-              <a:t>ENGAGING THE AUDIENCE</a:t>
-            </a:r>
-          </a:p>
-        </p:txBody>
-      </p:sp>
-      <p:sp>
-        <p:nvSpPr>
-          <p:cNvPr id="4" name="Content Placeholder 3">
-            <a:extLst>
-              <a:ext uri="{FF2B5EF4-FFF2-40B4-BE49-F238E27FC236}">
-                <a16:creationId xmlns:a16="http://schemas.microsoft.com/office/drawing/2014/main" id="{74160DFF-2E7E-7A22-819A-C011020DFF01}"/>
-              </a:ext>
-            </a:extLst>
-          </p:cNvPr>
-          <p:cNvSpPr>
-            <a:spLocks noGrp="1"/>
-          </p:cNvSpPr>
-          <p:nvPr>
-            <p:ph sz="quarter" idx="31"/>
-          </p:nvPr>
-        </p:nvSpPr>
-        <p:spPr>
-          <a:xfrm>
-            <a:off x="3305669" y="2470150"/>
-            <a:ext cx="7420819" cy="3676649"/>
-          </a:xfrm>
-        </p:spPr>
-        <p:txBody>
-          <a:bodyPr/>
-          <a:lstStyle/>
-          <a:p>
-            <a:r>
-              <a:rPr lang="en-US" dirty="0"/>
-              <a:t>Make eye contact with your audience to create a sense of intimacy and involvement</a:t>
-            </a:r>
-          </a:p>
-          <a:p>
-            <a:r>
-              <a:rPr lang="en-US" dirty="0"/>
-              <a:t>Weave relatable stories into your presentation using narratives that make your message memorable and impactful</a:t>
-            </a:r>
-          </a:p>
-          <a:p>
-            <a:r>
-              <a:rPr lang="en-US" dirty="0"/>
-              <a:t>Encourage questions and provide thoughtful responses to enhance audience participation</a:t>
-            </a:r>
-          </a:p>
-          <a:p>
-            <a:r>
-              <a:rPr lang="en-US" dirty="0"/>
-              <a:t>Use live polls or surveys to gather audience opinions, promoting engagement and making sure the audience feel involved</a:t>
-            </a:r>
-          </a:p>
-        </p:txBody>
-      </p:sp>
-      <p:sp>
-        <p:nvSpPr>
-          <p:cNvPr id="3" name="Slide Number Placeholder 2">
-            <a:extLst>
-              <a:ext uri="{FF2B5EF4-FFF2-40B4-BE49-F238E27FC236}">
-                <a16:creationId xmlns:a16="http://schemas.microsoft.com/office/drawing/2014/main" id="{64347AE7-D6A2-42FB-3D58-6297742FC352}"/>
-              </a:ext>
-            </a:extLst>
-          </p:cNvPr>
-          <p:cNvSpPr>
-            <a:spLocks noGrp="1"/>
-          </p:cNvSpPr>
-          <p:nvPr>
-            <p:ph type="sldNum" sz="quarter" idx="12"/>
-          </p:nvPr>
-        </p:nvSpPr>
-        <p:spPr>
-          <a:xfrm>
-            <a:off x="9140971" y="6226198"/>
-            <a:ext cx="2743200" cy="365125"/>
-          </a:xfrm>
-        </p:spPr>
-        <p:txBody>
-          <a:bodyPr/>
-          <a:lstStyle/>
-          <a:p>
-            <a:fld id="{FE024F78-56A6-7740-B68D-8D4D026EDF3F}" type="slidenum">
-              <a:rPr lang="en-US" smtClean="0"/>
-              <a:pPr/>
-              <a:t>7</a:t>
-            </a:fld>
-            <a:endParaRPr lang="en-US" dirty="0"/>
-          </a:p>
-        </p:txBody>
-      </p:sp>
-    </p:spTree>
-    <p:extLst>
-      <p:ext uri="{BB962C8B-B14F-4D97-AF65-F5344CB8AC3E}">
-        <p14:creationId xmlns:p14="http://schemas.microsoft.com/office/powerpoint/2010/main" val="1962637282"/>
-      </p:ext>
-    </p:extLst>
-  </p:cSld>
-  <p:clrMapOvr>
-    <a:masterClrMapping/>
-  </p:clrMapOvr>
-</p:sld>
-</file>
-
-<file path=ppt/slides/slide8.xml><?xml version="1.0" encoding="utf-8"?>
-<p:sld xmlns:a="http://schemas.openxmlformats.org/drawingml/2006/main" xmlns:r="http://schemas.openxmlformats.org/officeDocument/2006/relationships" xmlns:p="http://schemas.openxmlformats.org/presentationml/2006/main" show="0">
-  <p:cSld>
-    <p:spTree>
-      <p:nvGrpSpPr>
-        <p:cNvPr id="1" name=""/>
-        <p:cNvGrpSpPr/>
-        <p:nvPr/>
-      </p:nvGrpSpPr>
-      <p:grpSpPr>
-        <a:xfrm>
-          <a:off x="0" y="0"/>
-          <a:ext cx="0" cy="0"/>
-          <a:chOff x="0" y="0"/>
-          <a:chExt cx="0" cy="0"/>
-        </a:xfrm>
-      </p:grpSpPr>
-      <p:sp>
-        <p:nvSpPr>
-          <p:cNvPr id="3" name="Rectangle 2" hidden="1">
-            <a:extLst>
-              <a:ext uri="{FF2B5EF4-FFF2-40B4-BE49-F238E27FC236}">
-                <a16:creationId xmlns:a16="http://schemas.microsoft.com/office/drawing/2014/main" id="{8692FC88-DAD7-F5AD-7831-DE54322108F6}"/>
-              </a:ext>
-              <a:ext uri="{C183D7F6-B498-43B3-948B-1728B52AA6E4}">
-                <adec:decorative xmlns:adec="http://schemas.microsoft.com/office/drawing/2017/decorative" val="1"/>
-              </a:ext>
-            </a:extLst>
-          </p:cNvPr>
-          <p:cNvSpPr/>
-          <p:nvPr/>
-        </p:nvSpPr>
-        <p:spPr>
-          <a:xfrm>
-            <a:off x="1" y="2"/>
-            <a:ext cx="12227942" cy="6857997"/>
-          </a:xfrm>
-          <a:prstGeom prst="rect">
-            <a:avLst/>
-          </a:prstGeom>
-          <a:solidFill>
-            <a:schemeClr val="tx1">
-              <a:alpha val="70000"/>
-            </a:schemeClr>
-          </a:solidFill>
-          <a:ln>
-            <a:noFill/>
-          </a:ln>
-        </p:spPr>
-        <p:style>
-          <a:lnRef idx="2">
-            <a:schemeClr val="accent1">
-              <a:shade val="50000"/>
-            </a:schemeClr>
-          </a:lnRef>
-          <a:fillRef idx="1">
-            <a:schemeClr val="accent1"/>
-          </a:fillRef>
-          <a:effectRef idx="0">
-            <a:schemeClr val="accent1"/>
-          </a:effectRef>
-          <a:fontRef idx="minor">
-            <a:schemeClr val="lt1"/>
-          </a:fontRef>
-        </p:style>
-        <p:txBody>
-          <a:bodyPr rtlCol="0" anchor="ctr">
-            <a:noAutofit/>
-          </a:bodyPr>
-          <a:lstStyle/>
-          <a:p>
-            <a:pPr algn="ctr"/>
-            <a:endParaRPr lang="en-US" dirty="0"/>
-          </a:p>
-        </p:txBody>
-      </p:sp>
-      <p:sp>
-        <p:nvSpPr>
-          <p:cNvPr id="9" name="Title 1">
-            <a:extLst>
-              <a:ext uri="{FF2B5EF4-FFF2-40B4-BE49-F238E27FC236}">
-                <a16:creationId xmlns:a16="http://schemas.microsoft.com/office/drawing/2014/main" id="{0FD6A3FE-1BF6-4C1A-0553-EBD497A69F2D}"/>
-              </a:ext>
-            </a:extLst>
-          </p:cNvPr>
-          <p:cNvSpPr>
-            <a:spLocks noGrp="1"/>
-          </p:cNvSpPr>
-          <p:nvPr>
-            <p:ph type="title"/>
-          </p:nvPr>
-        </p:nvSpPr>
-        <p:spPr>
-          <a:xfrm>
-            <a:off x="2932448" y="264160"/>
-            <a:ext cx="6327105" cy="3373973"/>
-          </a:xfrm>
-        </p:spPr>
-        <p:txBody>
-          <a:bodyPr anchor="b"/>
-          <a:lstStyle/>
-          <a:p>
-            <a:r>
-              <a:rPr lang="en-US" dirty="0"/>
-              <a:t>SELECTING</a:t>
-            </a:r>
-            <a:br>
-              <a:rPr lang="en-US" dirty="0"/>
-            </a:br>
-            <a:r>
-              <a:rPr lang="en-US" dirty="0"/>
-              <a:t>VISUAL AIDS</a:t>
-            </a:r>
-          </a:p>
-        </p:txBody>
-      </p:sp>
-      <p:sp>
-        <p:nvSpPr>
-          <p:cNvPr id="6" name="Subtitle 5">
-            <a:extLst>
-              <a:ext uri="{FF2B5EF4-FFF2-40B4-BE49-F238E27FC236}">
-                <a16:creationId xmlns:a16="http://schemas.microsoft.com/office/drawing/2014/main" id="{C15774B0-D971-67D7-27EB-FDB82B3A58CD}"/>
-              </a:ext>
-            </a:extLst>
-          </p:cNvPr>
-          <p:cNvSpPr>
-            <a:spLocks noGrp="1"/>
-          </p:cNvSpPr>
-          <p:nvPr>
-            <p:ph type="subTitle" idx="1"/>
-          </p:nvPr>
-        </p:nvSpPr>
-        <p:spPr>
-          <a:xfrm>
-            <a:off x="2932448" y="3962135"/>
-            <a:ext cx="6327105" cy="2653771"/>
-          </a:xfrm>
-        </p:spPr>
-        <p:txBody>
-          <a:bodyPr/>
-          <a:lstStyle/>
-          <a:p>
-            <a:r>
-              <a:rPr lang="en-US" dirty="0"/>
-              <a:t>ENHANCING YOUR PRESENTATION</a:t>
-            </a:r>
-          </a:p>
-        </p:txBody>
-      </p:sp>
-    </p:spTree>
-    <p:extLst>
-      <p:ext uri="{BB962C8B-B14F-4D97-AF65-F5344CB8AC3E}">
-        <p14:creationId xmlns:p14="http://schemas.microsoft.com/office/powerpoint/2010/main" val="1330733909"/>
-      </p:ext>
-    </p:extLst>
-  </p:cSld>
-  <p:clrMapOvr>
-    <a:masterClrMapping/>
-  </p:clrMapOvr>
-</p:sld>
-</file>
-
-<file path=ppt/slides/slide9.xml><?xml version="1.0" encoding="utf-8"?>
-<p:sld xmlns:a="http://schemas.openxmlformats.org/drawingml/2006/main" xmlns:r="http://schemas.openxmlformats.org/officeDocument/2006/relationships" xmlns:p="http://schemas.openxmlformats.org/presentationml/2006/main" show="0">
-  <p:cSld>
-    <p:spTree>
-      <p:nvGrpSpPr>
-        <p:cNvPr id="1" name=""/>
-        <p:cNvGrpSpPr/>
-        <p:nvPr/>
-      </p:nvGrpSpPr>
-      <p:grpSpPr>
-        <a:xfrm>
-          <a:off x="0" y="0"/>
-          <a:ext cx="0" cy="0"/>
-          <a:chOff x="0" y="0"/>
-          <a:chExt cx="0" cy="0"/>
-        </a:xfrm>
-      </p:grpSpPr>
-      <p:sp>
-        <p:nvSpPr>
-          <p:cNvPr id="2" name="Title 1">
-            <a:extLst>
-              <a:ext uri="{FF2B5EF4-FFF2-40B4-BE49-F238E27FC236}">
-                <a16:creationId xmlns:a16="http://schemas.microsoft.com/office/drawing/2014/main" id="{6CCA29A4-AAFD-04EE-0732-0671E83D5EF1}"/>
-              </a:ext>
-            </a:extLst>
-          </p:cNvPr>
-          <p:cNvSpPr>
-            <a:spLocks noGrp="1"/>
-          </p:cNvSpPr>
-          <p:nvPr>
-            <p:ph type="title"/>
-          </p:nvPr>
-        </p:nvSpPr>
-        <p:spPr>
-          <a:xfrm>
-            <a:off x="2399620" y="162560"/>
-            <a:ext cx="8843050" cy="1616904"/>
-          </a:xfrm>
-        </p:spPr>
-        <p:txBody>
-          <a:bodyPr/>
-          <a:lstStyle/>
-          <a:p>
-            <a:r>
-              <a:rPr lang="en-US" dirty="0"/>
-              <a:t>EFFECTIVE DELIVERY TECHNIQUES</a:t>
-            </a:r>
-          </a:p>
-        </p:txBody>
-      </p:sp>
-      <p:sp>
-        <p:nvSpPr>
-          <p:cNvPr id="3" name="Content Placeholder 2">
-            <a:extLst>
-              <a:ext uri="{FF2B5EF4-FFF2-40B4-BE49-F238E27FC236}">
-                <a16:creationId xmlns:a16="http://schemas.microsoft.com/office/drawing/2014/main" id="{F09FEE91-E849-1CB0-9E51-A58B99C631C5}"/>
-              </a:ext>
-            </a:extLst>
-          </p:cNvPr>
-          <p:cNvSpPr>
-            <a:spLocks noGrp="1"/>
-          </p:cNvSpPr>
-          <p:nvPr>
-            <p:ph sz="quarter" idx="35"/>
-          </p:nvPr>
-        </p:nvSpPr>
-        <p:spPr>
-          <a:xfrm>
-            <a:off x="2373002" y="2474811"/>
-            <a:ext cx="4015098" cy="3528397"/>
-          </a:xfrm>
-        </p:spPr>
-        <p:txBody>
-          <a:bodyPr/>
-          <a:lstStyle/>
-          <a:p>
-            <a:r>
-              <a:rPr lang="en-US" dirty="0"/>
-              <a:t>This is a powerful tool in public speaking. It involves varying pitch, tone, and volume to convey emotion, emphasize points, and maintain interest.</a:t>
-            </a:r>
-          </a:p>
-          <a:p>
-            <a:pPr lvl="1"/>
-            <a:r>
-              <a:rPr lang="en-US" dirty="0"/>
-              <a:t>Pitch variation</a:t>
-            </a:r>
-          </a:p>
-          <a:p>
-            <a:pPr lvl="1"/>
-            <a:r>
-              <a:rPr lang="en-US" dirty="0"/>
-              <a:t>Tone inflection</a:t>
-            </a:r>
-          </a:p>
-          <a:p>
-            <a:pPr lvl="1"/>
-            <a:r>
-              <a:rPr lang="en-US" dirty="0"/>
-              <a:t>Volume control</a:t>
-            </a:r>
-          </a:p>
-        </p:txBody>
-      </p:sp>
-      <p:sp>
-        <p:nvSpPr>
-          <p:cNvPr id="4" name="Content Placeholder 3">
-            <a:extLst>
-              <a:ext uri="{FF2B5EF4-FFF2-40B4-BE49-F238E27FC236}">
-                <a16:creationId xmlns:a16="http://schemas.microsoft.com/office/drawing/2014/main" id="{9B774F1A-D233-C240-B22D-F82C6161FAC1}"/>
-              </a:ext>
-            </a:extLst>
-          </p:cNvPr>
-          <p:cNvSpPr>
-            <a:spLocks noGrp="1"/>
-          </p:cNvSpPr>
-          <p:nvPr>
-            <p:ph sz="quarter" idx="36"/>
-          </p:nvPr>
-        </p:nvSpPr>
-        <p:spPr>
-          <a:xfrm>
-            <a:off x="6995159" y="2474811"/>
-            <a:ext cx="4227332" cy="3528397"/>
-          </a:xfrm>
-        </p:spPr>
-        <p:txBody>
-          <a:bodyPr/>
-          <a:lstStyle/>
-          <a:p>
-            <a:r>
-              <a:rPr lang="en-US" dirty="0"/>
-              <a:t>Effective body language enhances your message, making it more impactful and memorable.</a:t>
-            </a:r>
-          </a:p>
-          <a:p>
-            <a:pPr lvl="1"/>
-            <a:r>
-              <a:rPr lang="en-US" dirty="0"/>
-              <a:t>Meaningful eye contact</a:t>
-            </a:r>
-          </a:p>
-          <a:p>
-            <a:pPr lvl="1"/>
-            <a:r>
-              <a:rPr lang="en-US" dirty="0"/>
-              <a:t>Purposeful gestures</a:t>
-            </a:r>
-          </a:p>
-          <a:p>
-            <a:pPr lvl="1"/>
-            <a:r>
-              <a:rPr lang="en-US" dirty="0"/>
-              <a:t>Maintain good posture</a:t>
-            </a:r>
-          </a:p>
-          <a:p>
-            <a:pPr lvl="1"/>
-            <a:r>
-              <a:rPr lang="en-US" dirty="0"/>
-              <a:t>Control your expressions</a:t>
-            </a:r>
-          </a:p>
-        </p:txBody>
-      </p:sp>
-      <p:sp>
-        <p:nvSpPr>
-          <p:cNvPr id="5" name="Slide Number Placeholder 4">
-            <a:extLst>
-              <a:ext uri="{FF2B5EF4-FFF2-40B4-BE49-F238E27FC236}">
-                <a16:creationId xmlns:a16="http://schemas.microsoft.com/office/drawing/2014/main" id="{23E23533-91C6-420C-B7D7-4977ACF73ACF}"/>
-              </a:ext>
-            </a:extLst>
-          </p:cNvPr>
-          <p:cNvSpPr>
-            <a:spLocks noGrp="1"/>
-          </p:cNvSpPr>
-          <p:nvPr>
-            <p:ph type="sldNum" sz="quarter" idx="12"/>
-          </p:nvPr>
-        </p:nvSpPr>
-        <p:spPr>
-          <a:xfrm>
-            <a:off x="9140971" y="6226198"/>
-            <a:ext cx="2743200" cy="365125"/>
-          </a:xfrm>
-        </p:spPr>
-        <p:txBody>
-          <a:bodyPr/>
-          <a:lstStyle/>
-          <a:p>
-            <a:fld id="{FE024F78-56A6-7740-B68D-8D4D026EDF3F}" type="slidenum">
-              <a:rPr lang="en-US" smtClean="0"/>
-              <a:pPr/>
-              <a:t>9</a:t>
-            </a:fld>
-            <a:endParaRPr lang="en-US" dirty="0"/>
-          </a:p>
-        </p:txBody>
-      </p:sp>
-    </p:spTree>
-    <p:extLst>
-      <p:ext uri="{BB962C8B-B14F-4D97-AF65-F5344CB8AC3E}">
-        <p14:creationId xmlns:p14="http://schemas.microsoft.com/office/powerpoint/2010/main" val="1073601555"/>
       </p:ext>
     </p:extLst>
   </p:cSld>
@@ -16973,6 +18121,15 @@
 </file>
 
 <file path=customXml/item1.xml><?xml version="1.0" encoding="utf-8"?>
+<?mso-contentType ?>
+<FormTemplates xmlns="http://schemas.microsoft.com/sharepoint/v3/contenttype/forms">
+  <Display>DocumentLibraryForm</Display>
+  <Edit>DocumentLibraryForm</Edit>
+  <New>DocumentLibraryForm</New>
+</FormTemplates>
+</file>
+
+<file path=customXml/item2.xml><?xml version="1.0" encoding="utf-8"?>
 <p:properties xmlns:p="http://schemas.microsoft.com/office/2006/metadata/properties" xmlns:xsi="http://www.w3.org/2001/XMLSchema-instance" xmlns:pc="http://schemas.microsoft.com/office/infopath/2007/PartnerControls">
   <documentManagement>
     <_ip_UnifiedCompliancePolicyUIAction xmlns="http://schemas.microsoft.com/sharepoint/v3" xsi:nil="true"/>
@@ -16990,15 +18147,6 @@
     <MediaServiceKeyPoints xmlns="71af3243-3dd4-4a8d-8c0d-dd76da1f02a5" xsi:nil="true"/>
   </documentManagement>
 </p:properties>
-</file>
-
-<file path=customXml/item2.xml><?xml version="1.0" encoding="utf-8"?>
-<?mso-contentType ?>
-<FormTemplates xmlns="http://schemas.microsoft.com/sharepoint/v3/contenttype/forms">
-  <Display>DocumentLibraryForm</Display>
-  <Edit>DocumentLibraryForm</Edit>
-  <New>DocumentLibraryForm</New>
-</FormTemplates>
 </file>
 
 <file path=customXml/item3.xml><?xml version="1.0" encoding="utf-8"?>
@@ -17314,6 +18462,14 @@
 </file>
 
 <file path=customXml/itemProps1.xml><?xml version="1.0" encoding="utf-8"?>
+<ds:datastoreItem xmlns:ds="http://schemas.openxmlformats.org/officeDocument/2006/customXml" ds:itemID="{44137456-21FC-4AE2-8A94-BF06CAF2EB9B}">
+  <ds:schemaRefs>
+    <ds:schemaRef ds:uri="http://schemas.microsoft.com/sharepoint/v3/contenttype/forms"/>
+  </ds:schemaRefs>
+</ds:datastoreItem>
+</file>
+
+<file path=customXml/itemProps2.xml><?xml version="1.0" encoding="utf-8"?>
 <ds:datastoreItem xmlns:ds="http://schemas.openxmlformats.org/officeDocument/2006/customXml" ds:itemID="{E305301E-11B3-4B9D-A588-21F3C9809371}">
   <ds:schemaRefs>
     <ds:schemaRef ds:uri="http://schemas.microsoft.com/office/2006/metadata/properties"/>
@@ -17321,14 +18477,6 @@
     <ds:schemaRef ds:uri="http://schemas.microsoft.com/sharepoint/v3"/>
     <ds:schemaRef ds:uri="71af3243-3dd4-4a8d-8c0d-dd76da1f02a5"/>
     <ds:schemaRef ds:uri="230e9df3-be65-4c73-a93b-d1236ebd677e"/>
-  </ds:schemaRefs>
-</ds:datastoreItem>
-</file>
-
-<file path=customXml/itemProps2.xml><?xml version="1.0" encoding="utf-8"?>
-<ds:datastoreItem xmlns:ds="http://schemas.openxmlformats.org/officeDocument/2006/customXml" ds:itemID="{44137456-21FC-4AE2-8A94-BF06CAF2EB9B}">
-  <ds:schemaRefs>
-    <ds:schemaRef ds:uri="http://schemas.microsoft.com/sharepoint/v3/contenttype/forms"/>
   </ds:schemaRefs>
 </ds:datastoreItem>
 </file>

</xml_diff>

<commit_message>
updates from run thru
Update session from run thru
</commit_message>
<xml_diff>
--- a/PSSUG_202511.pptx
+++ b/PSSUG_202511.pptx
@@ -5,24 +5,29 @@
     <p:sldMasterId id="2147483648" r:id="rId4"/>
   </p:sldMasterIdLst>
   <p:notesMasterIdLst>
-    <p:notesMasterId r:id="rId17"/>
+    <p:notesMasterId r:id="rId22"/>
   </p:notesMasterIdLst>
   <p:handoutMasterIdLst>
-    <p:handoutMasterId r:id="rId18"/>
+    <p:handoutMasterId r:id="rId23"/>
   </p:handoutMasterIdLst>
   <p:sldIdLst>
     <p:sldId id="342" r:id="rId5"/>
     <p:sldId id="389" r:id="rId6"/>
     <p:sldId id="359" r:id="rId7"/>
-    <p:sldId id="384" r:id="rId8"/>
-    <p:sldId id="386" r:id="rId9"/>
-    <p:sldId id="387" r:id="rId10"/>
-    <p:sldId id="385" r:id="rId11"/>
-    <p:sldId id="373" r:id="rId12"/>
-    <p:sldId id="383" r:id="rId13"/>
-    <p:sldId id="382" r:id="rId14"/>
-    <p:sldId id="388" r:id="rId15"/>
-    <p:sldId id="372" r:id="rId16"/>
+    <p:sldId id="390" r:id="rId8"/>
+    <p:sldId id="391" r:id="rId9"/>
+    <p:sldId id="392" r:id="rId10"/>
+    <p:sldId id="393" r:id="rId11"/>
+    <p:sldId id="394" r:id="rId12"/>
+    <p:sldId id="395" r:id="rId13"/>
+    <p:sldId id="396" r:id="rId14"/>
+    <p:sldId id="386" r:id="rId15"/>
+    <p:sldId id="387" r:id="rId16"/>
+    <p:sldId id="385" r:id="rId17"/>
+    <p:sldId id="373" r:id="rId18"/>
+    <p:sldId id="382" r:id="rId19"/>
+    <p:sldId id="388" r:id="rId20"/>
+    <p:sldId id="372" r:id="rId21"/>
   </p:sldIdLst>
   <p:sldSz cx="12192000" cy="6858000"/>
   <p:notesSz cx="6858000" cy="9144000"/>
@@ -149,12 +154,20 @@
 </p188:authorLst>
 </file>
 
+<file path=ppt/revisionInfo.xml><?xml version="1.0" encoding="utf-8"?>
+<p1510:revInfo xmlns:a="http://schemas.openxmlformats.org/drawingml/2006/main" xmlns:r="http://schemas.openxmlformats.org/officeDocument/2006/relationships" xmlns:p1510="http://schemas.microsoft.com/office/powerpoint/2015/10/main">
+  <p1510:revLst>
+    <p1510:client id="{6ECFA789-22A6-40F7-8B88-D439181DFBD0}" v="57" dt="2025-12-08T02:14:55.336"/>
+  </p1510:revLst>
+</p1510:revInfo>
+</file>
+
 <file path=ppt/changesInfos/changesInfo1.xml><?xml version="1.0" encoding="utf-8"?>
 <pc:chgInfo xmlns:a="http://schemas.openxmlformats.org/drawingml/2006/main" xmlns:r="http://schemas.openxmlformats.org/officeDocument/2006/relationships" xmlns:ac="http://schemas.microsoft.com/office/drawing/2013/main/command" xmlns:pc="http://schemas.microsoft.com/office/powerpoint/2013/main/command">
   <pc:docChgLst>
     <pc:chgData name="Said Salomon" userId="eac27f7e7e547993" providerId="LiveId" clId="{5C6D2034-25CF-4C21-B599-846C40023CBB}"/>
     <pc:docChg chg="undo custSel addSld delSld modSld sldOrd">
-      <pc:chgData name="Said Salomon" userId="eac27f7e7e547993" providerId="LiveId" clId="{5C6D2034-25CF-4C21-B599-846C40023CBB}" dt="2025-12-07T20:19:14.819" v="2126" actId="20577"/>
+      <pc:chgData name="Said Salomon" userId="eac27f7e7e547993" providerId="LiveId" clId="{5C6D2034-25CF-4C21-B599-846C40023CBB}" dt="2025-12-08T02:14:55.336" v="5388"/>
       <pc:docMkLst>
         <pc:docMk/>
       </pc:docMkLst>
@@ -188,8 +201,84 @@
           </ac:spMkLst>
         </pc:spChg>
       </pc:sldChg>
+      <pc:sldChg chg="modSp del mod">
+        <pc:chgData name="Said Salomon" userId="eac27f7e7e547993" providerId="LiveId" clId="{5C6D2034-25CF-4C21-B599-846C40023CBB}" dt="2025-12-08T02:13:15.084" v="5354" actId="2696"/>
+        <pc:sldMkLst>
+          <pc:docMk/>
+          <pc:sldMk cId="3587703786" sldId="383"/>
+        </pc:sldMkLst>
+        <pc:spChg chg="mod">
+          <ac:chgData name="Said Salomon" userId="eac27f7e7e547993" providerId="LiveId" clId="{5C6D2034-25CF-4C21-B599-846C40023CBB}" dt="2025-12-08T02:13:02.393" v="5353" actId="20577"/>
+          <ac:spMkLst>
+            <pc:docMk/>
+            <pc:sldMk cId="3587703786" sldId="383"/>
+            <ac:spMk id="6" creationId="{B501F9F2-6D3B-BC2E-57E0-E63F5B004867}"/>
+          </ac:spMkLst>
+        </pc:spChg>
+      </pc:sldChg>
+      <pc:sldChg chg="delSp modSp del mod">
+        <pc:chgData name="Said Salomon" userId="eac27f7e7e547993" providerId="LiveId" clId="{5C6D2034-25CF-4C21-B599-846C40023CBB}" dt="2025-12-07T23:44:23.735" v="5296" actId="2696"/>
+        <pc:sldMkLst>
+          <pc:docMk/>
+          <pc:sldMk cId="2130301932" sldId="384"/>
+        </pc:sldMkLst>
+        <pc:picChg chg="del mod">
+          <ac:chgData name="Said Salomon" userId="eac27f7e7e547993" providerId="LiveId" clId="{5C6D2034-25CF-4C21-B599-846C40023CBB}" dt="2025-12-07T23:42:37.294" v="5279" actId="21"/>
+          <ac:picMkLst>
+            <pc:docMk/>
+            <pc:sldMk cId="2130301932" sldId="384"/>
+            <ac:picMk id="6" creationId="{52A77FBD-8FB8-2A23-4739-9D0134E791F2}"/>
+          </ac:picMkLst>
+        </pc:picChg>
+      </pc:sldChg>
+      <pc:sldChg chg="addSp modSp mod">
+        <pc:chgData name="Said Salomon" userId="eac27f7e7e547993" providerId="LiveId" clId="{5C6D2034-25CF-4C21-B599-846C40023CBB}" dt="2025-12-07T23:52:18.414" v="5328" actId="20577"/>
+        <pc:sldMkLst>
+          <pc:docMk/>
+          <pc:sldMk cId="1155694617" sldId="386"/>
+        </pc:sldMkLst>
+        <pc:spChg chg="add">
+          <ac:chgData name="Said Salomon" userId="eac27f7e7e547993" providerId="LiveId" clId="{5C6D2034-25CF-4C21-B599-846C40023CBB}" dt="2025-12-07T23:50:06.620" v="5297"/>
+          <ac:spMkLst>
+            <pc:docMk/>
+            <pc:sldMk cId="1155694617" sldId="386"/>
+            <ac:spMk id="3" creationId="{CB613453-5DCA-C09B-CD99-EC4A4019DD26}"/>
+          </ac:spMkLst>
+        </pc:spChg>
+        <pc:spChg chg="mod">
+          <ac:chgData name="Said Salomon" userId="eac27f7e7e547993" providerId="LiveId" clId="{5C6D2034-25CF-4C21-B599-846C40023CBB}" dt="2025-12-07T23:52:18.414" v="5328" actId="20577"/>
+          <ac:spMkLst>
+            <pc:docMk/>
+            <pc:sldMk cId="1155694617" sldId="386"/>
+            <ac:spMk id="5" creationId="{90E73C3C-1218-55F2-4019-5749C7676374}"/>
+          </ac:spMkLst>
+        </pc:spChg>
+        <pc:spChg chg="add">
+          <ac:chgData name="Said Salomon" userId="eac27f7e7e547993" providerId="LiveId" clId="{5C6D2034-25CF-4C21-B599-846C40023CBB}" dt="2025-12-07T23:50:40.057" v="5298"/>
+          <ac:spMkLst>
+            <pc:docMk/>
+            <pc:sldMk cId="1155694617" sldId="386"/>
+            <ac:spMk id="6" creationId="{98C29FC6-25A0-BD8B-E103-E6D24CB8CF5B}"/>
+          </ac:spMkLst>
+        </pc:spChg>
+      </pc:sldChg>
+      <pc:sldChg chg="modSp mod">
+        <pc:chgData name="Said Salomon" userId="eac27f7e7e547993" providerId="LiveId" clId="{5C6D2034-25CF-4C21-B599-846C40023CBB}" dt="2025-12-08T01:33:39.647" v="5348" actId="20577"/>
+        <pc:sldMkLst>
+          <pc:docMk/>
+          <pc:sldMk cId="582232591" sldId="387"/>
+        </pc:sldMkLst>
+        <pc:spChg chg="mod">
+          <ac:chgData name="Said Salomon" userId="eac27f7e7e547993" providerId="LiveId" clId="{5C6D2034-25CF-4C21-B599-846C40023CBB}" dt="2025-12-08T01:33:39.647" v="5348" actId="20577"/>
+          <ac:spMkLst>
+            <pc:docMk/>
+            <pc:sldMk cId="582232591" sldId="387"/>
+            <ac:spMk id="5" creationId="{CC18A7CB-7F3C-A6AF-4739-CDEC843331B5}"/>
+          </ac:spMkLst>
+        </pc:spChg>
+      </pc:sldChg>
       <pc:sldChg chg="addSp delSp modSp new mod">
-        <pc:chgData name="Said Salomon" userId="eac27f7e7e547993" providerId="LiveId" clId="{5C6D2034-25CF-4C21-B599-846C40023CBB}" dt="2025-11-08T21:04:41.827" v="2101" actId="14100"/>
+        <pc:chgData name="Said Salomon" userId="eac27f7e7e547993" providerId="LiveId" clId="{5C6D2034-25CF-4C21-B599-846C40023CBB}" dt="2025-12-08T02:14:55.336" v="5388"/>
         <pc:sldMkLst>
           <pc:docMk/>
           <pc:sldMk cId="2819636666" sldId="388"/>
@@ -203,7 +292,7 @@
           </ac:spMkLst>
         </pc:spChg>
         <pc:graphicFrameChg chg="add mod modGraphic">
-          <ac:chgData name="Said Salomon" userId="eac27f7e7e547993" providerId="LiveId" clId="{5C6D2034-25CF-4C21-B599-846C40023CBB}" dt="2025-11-08T21:04:41.827" v="2101" actId="14100"/>
+          <ac:chgData name="Said Salomon" userId="eac27f7e7e547993" providerId="LiveId" clId="{5C6D2034-25CF-4C21-B599-846C40023CBB}" dt="2025-12-08T02:14:55.336" v="5388"/>
           <ac:graphicFrameMkLst>
             <pc:docMk/>
             <pc:sldMk cId="2819636666" sldId="388"/>
@@ -295,6 +384,223 @@
             <pc:docMk/>
             <pc:sldMk cId="2953413240" sldId="389"/>
             <ac:picMk id="15" creationId="{D40B09BF-D42B-A429-CC48-1B99A155437D}"/>
+          </ac:picMkLst>
+        </pc:picChg>
+      </pc:sldChg>
+      <pc:sldChg chg="addSp delSp modSp new mod ord">
+        <pc:chgData name="Said Salomon" userId="eac27f7e7e547993" providerId="LiveId" clId="{5C6D2034-25CF-4C21-B599-846C40023CBB}" dt="2025-12-07T20:39:24.288" v="2883" actId="313"/>
+        <pc:sldMkLst>
+          <pc:docMk/>
+          <pc:sldMk cId="875799815" sldId="390"/>
+        </pc:sldMkLst>
+        <pc:spChg chg="mod">
+          <ac:chgData name="Said Salomon" userId="eac27f7e7e547993" providerId="LiveId" clId="{5C6D2034-25CF-4C21-B599-846C40023CBB}" dt="2025-12-07T20:24:20.822" v="2133" actId="14100"/>
+          <ac:spMkLst>
+            <pc:docMk/>
+            <pc:sldMk cId="875799815" sldId="390"/>
+            <ac:spMk id="2" creationId="{BAA82DF2-ED38-9831-16BC-5C7E79C73C55}"/>
+          </ac:spMkLst>
+        </pc:spChg>
+        <pc:spChg chg="del mod">
+          <ac:chgData name="Said Salomon" userId="eac27f7e7e547993" providerId="LiveId" clId="{5C6D2034-25CF-4C21-B599-846C40023CBB}" dt="2025-12-07T20:24:41.100" v="2152" actId="478"/>
+          <ac:spMkLst>
+            <pc:docMk/>
+            <pc:sldMk cId="875799815" sldId="390"/>
+            <ac:spMk id="3" creationId="{7102383E-A6F6-30AC-7408-7ECEA85DFA39}"/>
+          </ac:spMkLst>
+        </pc:spChg>
+        <pc:spChg chg="add del mod">
+          <ac:chgData name="Said Salomon" userId="eac27f7e7e547993" providerId="LiveId" clId="{5C6D2034-25CF-4C21-B599-846C40023CBB}" dt="2025-12-07T20:25:35.711" v="2201" actId="478"/>
+          <ac:spMkLst>
+            <pc:docMk/>
+            <pc:sldMk cId="875799815" sldId="390"/>
+            <ac:spMk id="5" creationId="{BE25BC2A-0DF7-FDAB-2B07-CEDA43424308}"/>
+          </ac:spMkLst>
+        </pc:spChg>
+        <pc:spChg chg="add mod">
+          <ac:chgData name="Said Salomon" userId="eac27f7e7e547993" providerId="LiveId" clId="{5C6D2034-25CF-4C21-B599-846C40023CBB}" dt="2025-12-07T20:39:24.288" v="2883" actId="313"/>
+          <ac:spMkLst>
+            <pc:docMk/>
+            <pc:sldMk cId="875799815" sldId="390"/>
+            <ac:spMk id="6" creationId="{47590441-593A-7056-F595-BD16B454B222}"/>
+          </ac:spMkLst>
+        </pc:spChg>
+      </pc:sldChg>
+      <pc:sldChg chg="addSp delSp modSp new mod">
+        <pc:chgData name="Said Salomon" userId="eac27f7e7e547993" providerId="LiveId" clId="{5C6D2034-25CF-4C21-B599-846C40023CBB}" dt="2025-12-07T21:24:42.575" v="3250" actId="20577"/>
+        <pc:sldMkLst>
+          <pc:docMk/>
+          <pc:sldMk cId="3168296403" sldId="391"/>
+        </pc:sldMkLst>
+        <pc:spChg chg="mod">
+          <ac:chgData name="Said Salomon" userId="eac27f7e7e547993" providerId="LiveId" clId="{5C6D2034-25CF-4C21-B599-846C40023CBB}" dt="2025-12-07T20:50:19.654" v="2943" actId="14100"/>
+          <ac:spMkLst>
+            <pc:docMk/>
+            <pc:sldMk cId="3168296403" sldId="391"/>
+            <ac:spMk id="2" creationId="{23FC8790-3D17-9E6C-C553-633802A1FCEF}"/>
+          </ac:spMkLst>
+        </pc:spChg>
+        <pc:spChg chg="del">
+          <ac:chgData name="Said Salomon" userId="eac27f7e7e547993" providerId="LiveId" clId="{5C6D2034-25CF-4C21-B599-846C40023CBB}" dt="2025-12-07T20:50:13.785" v="2942" actId="478"/>
+          <ac:spMkLst>
+            <pc:docMk/>
+            <pc:sldMk cId="3168296403" sldId="391"/>
+            <ac:spMk id="3" creationId="{6F30F919-B2A8-AF91-36C5-CD5DD90049B4}"/>
+          </ac:spMkLst>
+        </pc:spChg>
+        <pc:spChg chg="add mod">
+          <ac:chgData name="Said Salomon" userId="eac27f7e7e547993" providerId="LiveId" clId="{5C6D2034-25CF-4C21-B599-846C40023CBB}" dt="2025-12-07T21:24:42.575" v="3250" actId="20577"/>
+          <ac:spMkLst>
+            <pc:docMk/>
+            <pc:sldMk cId="3168296403" sldId="391"/>
+            <ac:spMk id="5" creationId="{38BB43CE-1391-6A36-7C1E-CB71EBB93955}"/>
+          </ac:spMkLst>
+        </pc:spChg>
+      </pc:sldChg>
+      <pc:sldChg chg="addSp delSp modSp new mod">
+        <pc:chgData name="Said Salomon" userId="eac27f7e7e547993" providerId="LiveId" clId="{5C6D2034-25CF-4C21-B599-846C40023CBB}" dt="2025-12-07T23:14:53.552" v="4957" actId="20577"/>
+        <pc:sldMkLst>
+          <pc:docMk/>
+          <pc:sldMk cId="1570997669" sldId="392"/>
+        </pc:sldMkLst>
+        <pc:spChg chg="mod">
+          <ac:chgData name="Said Salomon" userId="eac27f7e7e547993" providerId="LiveId" clId="{5C6D2034-25CF-4C21-B599-846C40023CBB}" dt="2025-12-07T21:25:40.405" v="3271" actId="14100"/>
+          <ac:spMkLst>
+            <pc:docMk/>
+            <pc:sldMk cId="1570997669" sldId="392"/>
+            <ac:spMk id="2" creationId="{DD6A76EF-5A06-FFE1-EED2-DE7710D097F3}"/>
+          </ac:spMkLst>
+        </pc:spChg>
+        <pc:spChg chg="del">
+          <ac:chgData name="Said Salomon" userId="eac27f7e7e547993" providerId="LiveId" clId="{5C6D2034-25CF-4C21-B599-846C40023CBB}" dt="2025-12-07T21:25:49.086" v="3272" actId="478"/>
+          <ac:spMkLst>
+            <pc:docMk/>
+            <pc:sldMk cId="1570997669" sldId="392"/>
+            <ac:spMk id="3" creationId="{5AF8B389-76DE-0612-84AD-1C1AAD975D17}"/>
+          </ac:spMkLst>
+        </pc:spChg>
+        <pc:spChg chg="add mod">
+          <ac:chgData name="Said Salomon" userId="eac27f7e7e547993" providerId="LiveId" clId="{5C6D2034-25CF-4C21-B599-846C40023CBB}" dt="2025-12-07T23:14:53.552" v="4957" actId="20577"/>
+          <ac:spMkLst>
+            <pc:docMk/>
+            <pc:sldMk cId="1570997669" sldId="392"/>
+            <ac:spMk id="5" creationId="{7BE4701A-3100-A0FF-C2AB-9F0E8CF73B2A}"/>
+          </ac:spMkLst>
+        </pc:spChg>
+      </pc:sldChg>
+      <pc:sldChg chg="addSp delSp modSp new mod">
+        <pc:chgData name="Said Salomon" userId="eac27f7e7e547993" providerId="LiveId" clId="{5C6D2034-25CF-4C21-B599-846C40023CBB}" dt="2025-12-07T22:32:33.439" v="4358" actId="20577"/>
+        <pc:sldMkLst>
+          <pc:docMk/>
+          <pc:sldMk cId="392237563" sldId="393"/>
+        </pc:sldMkLst>
+        <pc:spChg chg="mod">
+          <ac:chgData name="Said Salomon" userId="eac27f7e7e547993" providerId="LiveId" clId="{5C6D2034-25CF-4C21-B599-846C40023CBB}" dt="2025-12-07T22:07:45.531" v="3821" actId="14100"/>
+          <ac:spMkLst>
+            <pc:docMk/>
+            <pc:sldMk cId="392237563" sldId="393"/>
+            <ac:spMk id="2" creationId="{A9E63497-A1B5-F0CD-CA49-3A269F4069FD}"/>
+          </ac:spMkLst>
+        </pc:spChg>
+        <pc:spChg chg="del">
+          <ac:chgData name="Said Salomon" userId="eac27f7e7e547993" providerId="LiveId" clId="{5C6D2034-25CF-4C21-B599-846C40023CBB}" dt="2025-12-07T22:07:52.030" v="3822" actId="478"/>
+          <ac:spMkLst>
+            <pc:docMk/>
+            <pc:sldMk cId="392237563" sldId="393"/>
+            <ac:spMk id="3" creationId="{5E5C083C-010F-BDEE-B522-08B2CB055FA4}"/>
+          </ac:spMkLst>
+        </pc:spChg>
+        <pc:spChg chg="add mod">
+          <ac:chgData name="Said Salomon" userId="eac27f7e7e547993" providerId="LiveId" clId="{5C6D2034-25CF-4C21-B599-846C40023CBB}" dt="2025-12-07T22:32:33.439" v="4358" actId="20577"/>
+          <ac:spMkLst>
+            <pc:docMk/>
+            <pc:sldMk cId="392237563" sldId="393"/>
+            <ac:spMk id="5" creationId="{60B2FC84-A612-D481-0035-36C79F5BB1AF}"/>
+          </ac:spMkLst>
+        </pc:spChg>
+      </pc:sldChg>
+      <pc:sldChg chg="addSp modSp add mod">
+        <pc:chgData name="Said Salomon" userId="eac27f7e7e547993" providerId="LiveId" clId="{5C6D2034-25CF-4C21-B599-846C40023CBB}" dt="2025-12-07T22:49:12.621" v="4505" actId="20577"/>
+        <pc:sldMkLst>
+          <pc:docMk/>
+          <pc:sldMk cId="1217385805" sldId="394"/>
+        </pc:sldMkLst>
+        <pc:spChg chg="mod">
+          <ac:chgData name="Said Salomon" userId="eac27f7e7e547993" providerId="LiveId" clId="{5C6D2034-25CF-4C21-B599-846C40023CBB}" dt="2025-12-07T22:49:12.621" v="4505" actId="20577"/>
+          <ac:spMkLst>
+            <pc:docMk/>
+            <pc:sldMk cId="1217385805" sldId="394"/>
+            <ac:spMk id="2" creationId="{CAB82E68-7125-029C-989C-AA6DC59D22C5}"/>
+          </ac:spMkLst>
+        </pc:spChg>
+        <pc:spChg chg="mod">
+          <ac:chgData name="Said Salomon" userId="eac27f7e7e547993" providerId="LiveId" clId="{5C6D2034-25CF-4C21-B599-846C40023CBB}" dt="2025-12-07T22:48:26.525" v="4500" actId="14100"/>
+          <ac:spMkLst>
+            <pc:docMk/>
+            <pc:sldMk cId="1217385805" sldId="394"/>
+            <ac:spMk id="5" creationId="{105E2372-65B0-C4F4-C33F-9E6AB9C5C63A}"/>
+          </ac:spMkLst>
+        </pc:spChg>
+        <pc:picChg chg="add mod">
+          <ac:chgData name="Said Salomon" userId="eac27f7e7e547993" providerId="LiveId" clId="{5C6D2034-25CF-4C21-B599-846C40023CBB}" dt="2025-12-07T22:47:39.976" v="4478" actId="14100"/>
+          <ac:picMkLst>
+            <pc:docMk/>
+            <pc:sldMk cId="1217385805" sldId="394"/>
+            <ac:picMk id="6" creationId="{A08D6B74-17C4-A824-601E-62521008AAA9}"/>
+          </ac:picMkLst>
+        </pc:picChg>
+      </pc:sldChg>
+      <pc:sldChg chg="modSp add mod ord">
+        <pc:chgData name="Said Salomon" userId="eac27f7e7e547993" providerId="LiveId" clId="{5C6D2034-25CF-4C21-B599-846C40023CBB}" dt="2025-12-07T23:37:52.337" v="5261" actId="6549"/>
+        <pc:sldMkLst>
+          <pc:docMk/>
+          <pc:sldMk cId="1970751310" sldId="395"/>
+        </pc:sldMkLst>
+        <pc:spChg chg="mod">
+          <ac:chgData name="Said Salomon" userId="eac27f7e7e547993" providerId="LiveId" clId="{5C6D2034-25CF-4C21-B599-846C40023CBB}" dt="2025-12-07T22:49:20.295" v="4507" actId="20577"/>
+          <ac:spMkLst>
+            <pc:docMk/>
+            <pc:sldMk cId="1970751310" sldId="395"/>
+            <ac:spMk id="2" creationId="{2B95760D-3614-86EC-BD65-8AE9B33D9DF7}"/>
+          </ac:spMkLst>
+        </pc:spChg>
+        <pc:spChg chg="mod">
+          <ac:chgData name="Said Salomon" userId="eac27f7e7e547993" providerId="LiveId" clId="{5C6D2034-25CF-4C21-B599-846C40023CBB}" dt="2025-12-07T23:37:52.337" v="5261" actId="6549"/>
+          <ac:spMkLst>
+            <pc:docMk/>
+            <pc:sldMk cId="1970751310" sldId="395"/>
+            <ac:spMk id="5" creationId="{6198BE56-0DF9-8DF3-46BF-21B798917A3A}"/>
+          </ac:spMkLst>
+        </pc:spChg>
+      </pc:sldChg>
+      <pc:sldChg chg="addSp delSp modSp new mod">
+        <pc:chgData name="Said Salomon" userId="eac27f7e7e547993" providerId="LiveId" clId="{5C6D2034-25CF-4C21-B599-846C40023CBB}" dt="2025-12-08T01:25:29.707" v="5329" actId="313"/>
+        <pc:sldMkLst>
+          <pc:docMk/>
+          <pc:sldMk cId="835815923" sldId="396"/>
+        </pc:sldMkLst>
+        <pc:spChg chg="mod">
+          <ac:chgData name="Said Salomon" userId="eac27f7e7e547993" providerId="LiveId" clId="{5C6D2034-25CF-4C21-B599-846C40023CBB}" dt="2025-12-08T01:25:29.707" v="5329" actId="313"/>
+          <ac:spMkLst>
+            <pc:docMk/>
+            <pc:sldMk cId="835815923" sldId="396"/>
+            <ac:spMk id="2" creationId="{528FE7AF-EC6E-8D8B-177C-CDA5E2ACC7BA}"/>
+          </ac:spMkLst>
+        </pc:spChg>
+        <pc:spChg chg="del">
+          <ac:chgData name="Said Salomon" userId="eac27f7e7e547993" providerId="LiveId" clId="{5C6D2034-25CF-4C21-B599-846C40023CBB}" dt="2025-12-07T23:42:05.985" v="5278" actId="478"/>
+          <ac:spMkLst>
+            <pc:docMk/>
+            <pc:sldMk cId="835815923" sldId="396"/>
+            <ac:spMk id="3" creationId="{DC16AB6F-5B14-027D-DBCA-143AC2EFA631}"/>
+          </ac:spMkLst>
+        </pc:spChg>
+        <pc:picChg chg="add mod">
+          <ac:chgData name="Said Salomon" userId="eac27f7e7e547993" providerId="LiveId" clId="{5C6D2034-25CF-4C21-B599-846C40023CBB}" dt="2025-12-07T23:43:46.784" v="5282" actId="1076"/>
+          <ac:picMkLst>
+            <pc:docMk/>
+            <pc:sldMk cId="835815923" sldId="396"/>
+            <ac:picMk id="6" creationId="{52A77FBD-8FB8-2A23-4739-9D0134E791F2}"/>
           </ac:picMkLst>
         </pc:picChg>
       </pc:sldChg>
@@ -876,6 +1182,13 @@
           </p:nvPr>
         </p:nvSpPr>
         <p:spPr/>
+        <p:txBody>
+          <a:bodyPr/>
+          <a:lstStyle/>
+          <a:p>
+            <a:endParaRPr lang="en-US"/>
+          </a:p>
+        </p:txBody>
       </p:sp>
       <p:sp>
         <p:nvSpPr>
@@ -960,6 +1273,13 @@
           </p:nvPr>
         </p:nvSpPr>
         <p:spPr/>
+        <p:txBody>
+          <a:bodyPr/>
+          <a:lstStyle/>
+          <a:p>
+            <a:endParaRPr lang="en-US"/>
+          </a:p>
+        </p:txBody>
       </p:sp>
       <p:sp>
         <p:nvSpPr>
@@ -1104,6 +1424,13 @@
           </p:nvPr>
         </p:nvSpPr>
         <p:spPr/>
+        <p:txBody>
+          <a:bodyPr/>
+          <a:lstStyle/>
+          <a:p>
+            <a:endParaRPr lang="en-US"/>
+          </a:p>
+        </p:txBody>
       </p:sp>
       <p:sp>
         <p:nvSpPr>
@@ -1141,7 +1468,7 @@
           <a:p>
             <a:fld id="{DEF75CB5-5666-5049-9AE0-38EFD385C21E}" type="slidenum">
               <a:rPr lang="en-US" smtClean="0"/>
-              <a:t>8</a:t>
+              <a:t>14</a:t>
             </a:fld>
             <a:endParaRPr lang="en-US" dirty="0"/>
           </a:p>
@@ -1161,114 +1488,6 @@
 </file>
 
 <file path=ppt/notesSlides/notesSlide4.xml><?xml version="1.0" encoding="utf-8"?>
-<p:notes xmlns:a="http://schemas.openxmlformats.org/drawingml/2006/main" xmlns:r="http://schemas.openxmlformats.org/officeDocument/2006/relationships" xmlns:p="http://schemas.openxmlformats.org/presentationml/2006/main">
-  <p:cSld>
-    <p:spTree>
-      <p:nvGrpSpPr>
-        <p:cNvPr id="1" name="">
-          <a:extLst>
-            <a:ext uri="{FF2B5EF4-FFF2-40B4-BE49-F238E27FC236}">
-              <a16:creationId xmlns:a16="http://schemas.microsoft.com/office/drawing/2014/main" id="{02D0E9C6-F662-A757-0D97-BEFCB008E1D3}"/>
-            </a:ext>
-          </a:extLst>
-        </p:cNvPr>
-        <p:cNvGrpSpPr/>
-        <p:nvPr/>
-      </p:nvGrpSpPr>
-      <p:grpSpPr>
-        <a:xfrm>
-          <a:off x="0" y="0"/>
-          <a:ext cx="0" cy="0"/>
-          <a:chOff x="0" y="0"/>
-          <a:chExt cx="0" cy="0"/>
-        </a:xfrm>
-      </p:grpSpPr>
-      <p:sp>
-        <p:nvSpPr>
-          <p:cNvPr id="2" name="Slide Image Placeholder 1">
-            <a:extLst>
-              <a:ext uri="{FF2B5EF4-FFF2-40B4-BE49-F238E27FC236}">
-                <a16:creationId xmlns:a16="http://schemas.microsoft.com/office/drawing/2014/main" id="{5B6DB57E-A79D-D677-07CC-0153DE4A807A}"/>
-              </a:ext>
-            </a:extLst>
-          </p:cNvPr>
-          <p:cNvSpPr>
-            <a:spLocks noGrp="1" noRot="1" noChangeAspect="1"/>
-          </p:cNvSpPr>
-          <p:nvPr>
-            <p:ph type="sldImg"/>
-          </p:nvPr>
-        </p:nvSpPr>
-        <p:spPr/>
-      </p:sp>
-      <p:sp>
-        <p:nvSpPr>
-          <p:cNvPr id="3" name="Notes Placeholder 2">
-            <a:extLst>
-              <a:ext uri="{FF2B5EF4-FFF2-40B4-BE49-F238E27FC236}">
-                <a16:creationId xmlns:a16="http://schemas.microsoft.com/office/drawing/2014/main" id="{DA0446D6-BFF0-9740-65F1-EF1A0FF6A819}"/>
-              </a:ext>
-            </a:extLst>
-          </p:cNvPr>
-          <p:cNvSpPr>
-            <a:spLocks noGrp="1"/>
-          </p:cNvSpPr>
-          <p:nvPr>
-            <p:ph type="body" idx="1"/>
-          </p:nvPr>
-        </p:nvSpPr>
-        <p:spPr/>
-        <p:txBody>
-          <a:bodyPr/>
-          <a:lstStyle/>
-          <a:p>
-            <a:endParaRPr lang="en-US" dirty="0"/>
-          </a:p>
-        </p:txBody>
-      </p:sp>
-      <p:sp>
-        <p:nvSpPr>
-          <p:cNvPr id="4" name="Slide Number Placeholder 3">
-            <a:extLst>
-              <a:ext uri="{FF2B5EF4-FFF2-40B4-BE49-F238E27FC236}">
-                <a16:creationId xmlns:a16="http://schemas.microsoft.com/office/drawing/2014/main" id="{74E10CF5-027A-3630-B0F0-70CF38295A01}"/>
-              </a:ext>
-            </a:extLst>
-          </p:cNvPr>
-          <p:cNvSpPr>
-            <a:spLocks noGrp="1"/>
-          </p:cNvSpPr>
-          <p:nvPr>
-            <p:ph type="sldNum" sz="quarter" idx="5"/>
-          </p:nvPr>
-        </p:nvSpPr>
-        <p:spPr/>
-        <p:txBody>
-          <a:bodyPr/>
-          <a:lstStyle/>
-          <a:p>
-            <a:fld id="{DEF75CB5-5666-5049-9AE0-38EFD385C21E}" type="slidenum">
-              <a:rPr lang="en-US" smtClean="0"/>
-              <a:t>9</a:t>
-            </a:fld>
-            <a:endParaRPr lang="en-US" dirty="0"/>
-          </a:p>
-        </p:txBody>
-      </p:sp>
-    </p:spTree>
-    <p:extLst>
-      <p:ext uri="{BB962C8B-B14F-4D97-AF65-F5344CB8AC3E}">
-        <p14:creationId xmlns:p14="http://schemas.microsoft.com/office/powerpoint/2010/main" val="3869718467"/>
-      </p:ext>
-    </p:extLst>
-  </p:cSld>
-  <p:clrMapOvr>
-    <a:masterClrMapping/>
-  </p:clrMapOvr>
-</p:notes>
-</file>
-
-<file path=ppt/notesSlides/notesSlide5.xml><?xml version="1.0" encoding="utf-8"?>
 <p:notes xmlns:a="http://schemas.openxmlformats.org/drawingml/2006/main" xmlns:r="http://schemas.openxmlformats.org/officeDocument/2006/relationships" xmlns:p="http://schemas.openxmlformats.org/presentationml/2006/main">
   <p:cSld>
     <p:spTree>
@@ -1308,6 +1527,13 @@
           </p:nvPr>
         </p:nvSpPr>
         <p:spPr/>
+        <p:txBody>
+          <a:bodyPr/>
+          <a:lstStyle/>
+          <a:p>
+            <a:endParaRPr lang="en-US"/>
+          </a:p>
+        </p:txBody>
       </p:sp>
       <p:sp>
         <p:nvSpPr>
@@ -1357,7 +1583,7 @@
           <a:p>
             <a:fld id="{DEF75CB5-5666-5049-9AE0-38EFD385C21E}" type="slidenum">
               <a:rPr lang="en-US" smtClean="0"/>
-              <a:t>10</a:t>
+              <a:t>15</a:t>
             </a:fld>
             <a:endParaRPr lang="en-US" dirty="0"/>
           </a:p>
@@ -1376,7 +1602,7 @@
 </p:notes>
 </file>
 
-<file path=ppt/notesSlides/notesSlide6.xml><?xml version="1.0" encoding="utf-8"?>
+<file path=ppt/notesSlides/notesSlide5.xml><?xml version="1.0" encoding="utf-8"?>
 <p:notes xmlns:a="http://schemas.openxmlformats.org/drawingml/2006/main" xmlns:r="http://schemas.openxmlformats.org/officeDocument/2006/relationships" xmlns:p="http://schemas.openxmlformats.org/presentationml/2006/main">
   <p:cSld>
     <p:spTree>
@@ -1404,6 +1630,13 @@
           </p:nvPr>
         </p:nvSpPr>
         <p:spPr/>
+        <p:txBody>
+          <a:bodyPr/>
+          <a:lstStyle/>
+          <a:p>
+            <a:endParaRPr lang="en-US"/>
+          </a:p>
+        </p:txBody>
       </p:sp>
       <p:sp>
         <p:nvSpPr>
@@ -1441,7 +1674,7 @@
           <a:p>
             <a:fld id="{DEF75CB5-5666-5049-9AE0-38EFD385C21E}" type="slidenum">
               <a:rPr lang="en-US" smtClean="0"/>
-              <a:t>12</a:t>
+              <a:t>17</a:t>
             </a:fld>
             <a:endParaRPr lang="en-US" dirty="0"/>
           </a:p>
@@ -10235,13 +10468,7 @@
   <p:cSld>
     <p:spTree>
       <p:nvGrpSpPr>
-        <p:cNvPr id="1" name="">
-          <a:extLst>
-            <a:ext uri="{FF2B5EF4-FFF2-40B4-BE49-F238E27FC236}">
-              <a16:creationId xmlns:a16="http://schemas.microsoft.com/office/drawing/2014/main" id="{1D506955-8A65-AC52-2B81-EAAD15928D81}"/>
-            </a:ext>
-          </a:extLst>
-        </p:cNvPr>
+        <p:cNvPr id="1" name=""/>
         <p:cNvGrpSpPr/>
         <p:nvPr/>
       </p:nvGrpSpPr>
@@ -10255,10 +10482,10 @@
       </p:grpSpPr>
       <p:sp>
         <p:nvSpPr>
-          <p:cNvPr id="4" name="Subtitle 3">
+          <p:cNvPr id="2" name="Title 1">
             <a:extLst>
               <a:ext uri="{FF2B5EF4-FFF2-40B4-BE49-F238E27FC236}">
-                <a16:creationId xmlns:a16="http://schemas.microsoft.com/office/drawing/2014/main" id="{4722C5E9-86A7-4A8C-1E8F-91180A5771B3}"/>
+                <a16:creationId xmlns:a16="http://schemas.microsoft.com/office/drawing/2014/main" id="{528FE7AF-EC6E-8D8B-177C-CDA5E2ACC7BA}"/>
               </a:ext>
             </a:extLst>
           </p:cNvPr>
@@ -10266,13 +10493,13 @@
             <a:spLocks noGrp="1"/>
           </p:cNvSpPr>
           <p:nvPr>
-            <p:ph type="subTitle" idx="1"/>
+            <p:ph type="title"/>
           </p:nvPr>
         </p:nvSpPr>
         <p:spPr>
           <a:xfrm>
-            <a:off x="321868" y="3484615"/>
-            <a:ext cx="11562303" cy="2387865"/>
+            <a:off x="321869" y="579120"/>
+            <a:ext cx="11548261" cy="689241"/>
           </a:xfrm>
         </p:spPr>
         <p:txBody>
@@ -10281,17 +10508,17 @@
           <a:p>
             <a:r>
               <a:rPr lang="en-US" dirty="0"/>
-              <a:t>Vector Demo</a:t>
+              <a:t>AI and Vectors</a:t>
             </a:r>
           </a:p>
         </p:txBody>
       </p:sp>
       <p:sp>
         <p:nvSpPr>
-          <p:cNvPr id="3" name="Slide Number Placeholder 2">
+          <p:cNvPr id="4" name="Slide Number Placeholder 3">
             <a:extLst>
               <a:ext uri="{FF2B5EF4-FFF2-40B4-BE49-F238E27FC236}">
-                <a16:creationId xmlns:a16="http://schemas.microsoft.com/office/drawing/2014/main" id="{A4C6E5DB-2FBF-DBCF-9FC7-5DFDE7D4CD58}"/>
+                <a16:creationId xmlns:a16="http://schemas.microsoft.com/office/drawing/2014/main" id="{EAD6FD4A-CC37-65FF-74AD-0A57D88DEC11}"/>
               </a:ext>
             </a:extLst>
           </p:cNvPr>
@@ -10302,12 +10529,7 @@
             <p:ph type="sldNum" sz="quarter" idx="12"/>
           </p:nvPr>
         </p:nvSpPr>
-        <p:spPr>
-          <a:xfrm>
-            <a:off x="9140971" y="6226198"/>
-            <a:ext cx="2743200" cy="365125"/>
-          </a:xfrm>
-        </p:spPr>
+        <p:spPr/>
         <p:txBody>
           <a:bodyPr/>
           <a:lstStyle/>
@@ -10321,38 +10543,43 @@
           </a:p>
         </p:txBody>
       </p:sp>
-      <p:sp>
-        <p:nvSpPr>
-          <p:cNvPr id="6" name="Title 5">
+      <p:pic>
+        <p:nvPicPr>
+          <p:cNvPr id="6" name="Picture 5" descr="A screenshot of a computer&#10;&#10;AI-generated content may be incorrect.">
             <a:extLst>
               <a:ext uri="{FF2B5EF4-FFF2-40B4-BE49-F238E27FC236}">
-                <a16:creationId xmlns:a16="http://schemas.microsoft.com/office/drawing/2014/main" id="{71E7E31B-C6C2-4E6B-6592-038441F8BBB5}"/>
+                <a16:creationId xmlns:a16="http://schemas.microsoft.com/office/drawing/2014/main" id="{52A77FBD-8FB8-2A23-4739-9D0134E791F2}"/>
               </a:ext>
             </a:extLst>
           </p:cNvPr>
-          <p:cNvSpPr>
-            <a:spLocks noGrp="1"/>
-          </p:cNvSpPr>
-          <p:nvPr>
-            <p:ph type="title"/>
-          </p:nvPr>
-        </p:nvSpPr>
-        <p:spPr/>
-        <p:txBody>
-          <a:bodyPr/>
-          <a:lstStyle/>
-          <a:p>
-            <a:r>
-              <a:rPr lang="en-US" dirty="0"/>
-              <a:t>Advance</a:t>
-            </a:r>
-          </a:p>
-        </p:txBody>
-      </p:sp>
+          <p:cNvPicPr>
+            <a:picLocks noChangeAspect="1"/>
+          </p:cNvPicPr>
+          <p:nvPr/>
+        </p:nvPicPr>
+        <p:blipFill>
+          <a:blip r:embed="rId2"/>
+          <a:stretch>
+            <a:fillRect/>
+          </a:stretch>
+        </p:blipFill>
+        <p:spPr>
+          <a:xfrm>
+            <a:off x="2309789" y="1839170"/>
+            <a:ext cx="6971863" cy="4270140"/>
+          </a:xfrm>
+          <a:prstGeom prst="rect">
+            <a:avLst/>
+          </a:prstGeom>
+          <a:solidFill>
+            <a:schemeClr val="bg1"/>
+          </a:solidFill>
+        </p:spPr>
+      </p:pic>
     </p:spTree>
     <p:extLst>
       <p:ext uri="{BB962C8B-B14F-4D97-AF65-F5344CB8AC3E}">
-        <p14:creationId xmlns:p14="http://schemas.microsoft.com/office/powerpoint/2010/main" val="1684862160"/>
+        <p14:creationId xmlns:p14="http://schemas.microsoft.com/office/powerpoint/2010/main" val="835815923"/>
       </p:ext>
     </p:extLst>
   </p:cSld>
@@ -10384,7 +10611,719 @@
           <p:cNvPr id="2" name="Title 1">
             <a:extLst>
               <a:ext uri="{FF2B5EF4-FFF2-40B4-BE49-F238E27FC236}">
-                <a16:creationId xmlns:a16="http://schemas.microsoft.com/office/drawing/2014/main" id="{328F6BEE-2C99-F73D-2CAA-751771FB196A}"/>
+                <a16:creationId xmlns:a16="http://schemas.microsoft.com/office/drawing/2014/main" id="{88FE15A4-FDF7-E1B4-5A0D-4CD83B494A82}"/>
+              </a:ext>
+            </a:extLst>
+          </p:cNvPr>
+          <p:cNvSpPr>
+            <a:spLocks noGrp="1"/>
+          </p:cNvSpPr>
+          <p:nvPr>
+            <p:ph type="title"/>
+          </p:nvPr>
+        </p:nvSpPr>
+        <p:spPr>
+          <a:xfrm>
+            <a:off x="321869" y="579120"/>
+            <a:ext cx="11548261" cy="590919"/>
+          </a:xfrm>
+        </p:spPr>
+        <p:txBody>
+          <a:bodyPr/>
+          <a:lstStyle/>
+          <a:p>
+            <a:r>
+              <a:rPr lang="en-US" dirty="0"/>
+              <a:t>What is a Vector</a:t>
+            </a:r>
+          </a:p>
+        </p:txBody>
+      </p:sp>
+      <p:sp>
+        <p:nvSpPr>
+          <p:cNvPr id="4" name="Slide Number Placeholder 3">
+            <a:extLst>
+              <a:ext uri="{FF2B5EF4-FFF2-40B4-BE49-F238E27FC236}">
+                <a16:creationId xmlns:a16="http://schemas.microsoft.com/office/drawing/2014/main" id="{54453AE4-A5D7-889B-A7F5-30CC298DB7CB}"/>
+              </a:ext>
+            </a:extLst>
+          </p:cNvPr>
+          <p:cNvSpPr>
+            <a:spLocks noGrp="1"/>
+          </p:cNvSpPr>
+          <p:nvPr>
+            <p:ph type="sldNum" sz="quarter" idx="12"/>
+          </p:nvPr>
+        </p:nvSpPr>
+        <p:spPr/>
+        <p:txBody>
+          <a:bodyPr/>
+          <a:lstStyle/>
+          <a:p>
+            <a:fld id="{FE024F78-56A6-7740-B68D-8D4D026EDF3F}" type="slidenum">
+              <a:rPr lang="en-US" smtClean="0"/>
+              <a:pPr/>
+              <a:t>11</a:t>
+            </a:fld>
+            <a:endParaRPr lang="en-US" dirty="0"/>
+          </a:p>
+        </p:txBody>
+      </p:sp>
+      <p:sp>
+        <p:nvSpPr>
+          <p:cNvPr id="5" name="TextBox 4">
+            <a:extLst>
+              <a:ext uri="{FF2B5EF4-FFF2-40B4-BE49-F238E27FC236}">
+                <a16:creationId xmlns:a16="http://schemas.microsoft.com/office/drawing/2014/main" id="{90E73C3C-1218-55F2-4019-5749C7676374}"/>
+              </a:ext>
+            </a:extLst>
+          </p:cNvPr>
+          <p:cNvSpPr txBox="1"/>
+          <p:nvPr/>
+        </p:nvSpPr>
+        <p:spPr>
+          <a:xfrm>
+            <a:off x="904569" y="1406014"/>
+            <a:ext cx="9389806" cy="3970318"/>
+          </a:xfrm>
+          <a:prstGeom prst="rect">
+            <a:avLst/>
+          </a:prstGeom>
+          <a:noFill/>
+        </p:spPr>
+        <p:txBody>
+          <a:bodyPr wrap="square" rtlCol="0">
+            <a:spAutoFit/>
+          </a:bodyPr>
+          <a:lstStyle/>
+          <a:p>
+            <a:r>
+              <a:rPr lang="en-US" dirty="0">
+                <a:solidFill>
+                  <a:schemeClr val="accent2">
+                    <a:lumMod val="20000"/>
+                    <a:lumOff val="80000"/>
+                  </a:schemeClr>
+                </a:solidFill>
+              </a:rPr>
+              <a:t>A vector is a mathematical and physical object that has both </a:t>
+            </a:r>
+            <a:r>
+              <a:rPr lang="en-US" b="1" dirty="0">
+                <a:solidFill>
+                  <a:schemeClr val="accent2">
+                    <a:lumMod val="20000"/>
+                    <a:lumOff val="80000"/>
+                  </a:schemeClr>
+                </a:solidFill>
+              </a:rPr>
+              <a:t>magnitude</a:t>
+            </a:r>
+            <a:r>
+              <a:rPr lang="en-US" dirty="0">
+                <a:solidFill>
+                  <a:schemeClr val="accent2">
+                    <a:lumMod val="20000"/>
+                    <a:lumOff val="80000"/>
+                  </a:schemeClr>
+                </a:solidFill>
+              </a:rPr>
+              <a:t> and </a:t>
+            </a:r>
+            <a:r>
+              <a:rPr lang="en-US" b="1" dirty="0">
+                <a:solidFill>
+                  <a:schemeClr val="accent2">
+                    <a:lumMod val="20000"/>
+                    <a:lumOff val="80000"/>
+                  </a:schemeClr>
+                </a:solidFill>
+              </a:rPr>
+              <a:t>direction</a:t>
+            </a:r>
+            <a:r>
+              <a:rPr lang="en-US" dirty="0">
+                <a:solidFill>
+                  <a:schemeClr val="accent2">
+                    <a:lumMod val="20000"/>
+                    <a:lumOff val="80000"/>
+                  </a:schemeClr>
+                </a:solidFill>
+              </a:rPr>
+              <a:t>.</a:t>
+            </a:r>
+          </a:p>
+          <a:p>
+            <a:endParaRPr lang="en-US" dirty="0">
+              <a:solidFill>
+                <a:schemeClr val="accent2">
+                  <a:lumMod val="20000"/>
+                  <a:lumOff val="80000"/>
+                </a:schemeClr>
+              </a:solidFill>
+            </a:endParaRPr>
+          </a:p>
+          <a:p>
+            <a:r>
+              <a:rPr lang="en-US" dirty="0">
+                <a:solidFill>
+                  <a:schemeClr val="accent2">
+                    <a:lumMod val="20000"/>
+                    <a:lumOff val="80000"/>
+                  </a:schemeClr>
+                </a:solidFill>
+              </a:rPr>
+              <a:t>In SQL 2025:</a:t>
+            </a:r>
+          </a:p>
+          <a:p>
+            <a:endParaRPr lang="en-US" dirty="0">
+              <a:solidFill>
+                <a:schemeClr val="accent2">
+                  <a:lumMod val="20000"/>
+                  <a:lumOff val="80000"/>
+                </a:schemeClr>
+              </a:solidFill>
+            </a:endParaRPr>
+          </a:p>
+          <a:p>
+            <a:pPr lvl="1"/>
+            <a:r>
+              <a:rPr lang="en-US" dirty="0">
+                <a:solidFill>
+                  <a:schemeClr val="accent2">
+                    <a:lumMod val="20000"/>
+                    <a:lumOff val="80000"/>
+                  </a:schemeClr>
+                </a:solidFill>
+              </a:rPr>
+              <a:t>In SQL Server 2025, a vector refers to a new data type designed to store and manage numerical representations of data, particularly for AI and machine learning applications. These numerical representations are often called embeddings.  Used to do similarity search and or logical distance.</a:t>
+            </a:r>
+          </a:p>
+          <a:p>
+            <a:pPr lvl="1"/>
+            <a:endParaRPr lang="en-US" dirty="0">
+              <a:solidFill>
+                <a:schemeClr val="accent2">
+                  <a:lumMod val="20000"/>
+                  <a:lumOff val="80000"/>
+                </a:schemeClr>
+              </a:solidFill>
+            </a:endParaRPr>
+          </a:p>
+          <a:p>
+            <a:pPr lvl="1"/>
+            <a:r>
+              <a:rPr lang="en-US" dirty="0">
+                <a:solidFill>
+                  <a:schemeClr val="accent2">
+                    <a:lumMod val="20000"/>
+                    <a:lumOff val="80000"/>
+                  </a:schemeClr>
+                </a:solidFill>
+              </a:rPr>
+              <a:t>Ref on Vector Similarity</a:t>
+            </a:r>
+          </a:p>
+          <a:p>
+            <a:pPr lvl="1"/>
+            <a:r>
+              <a:rPr lang="en-US" dirty="0">
+                <a:solidFill>
+                  <a:schemeClr val="accent2">
+                    <a:lumMod val="20000"/>
+                    <a:lumOff val="80000"/>
+                  </a:schemeClr>
+                </a:solidFill>
+                <a:hlinkClick r:id="rId2"/>
+              </a:rPr>
+              <a:t>https://dev.to/pavanbelagatti/what-is-vector-similarity-search-2b6g</a:t>
+            </a:r>
+            <a:endParaRPr lang="en-US" dirty="0">
+              <a:solidFill>
+                <a:schemeClr val="accent2">
+                  <a:lumMod val="20000"/>
+                  <a:lumOff val="80000"/>
+                </a:schemeClr>
+              </a:solidFill>
+            </a:endParaRPr>
+          </a:p>
+          <a:p>
+            <a:pPr lvl="1"/>
+            <a:endParaRPr lang="en-US" dirty="0">
+              <a:solidFill>
+                <a:schemeClr val="accent2">
+                  <a:lumMod val="20000"/>
+                  <a:lumOff val="80000"/>
+                </a:schemeClr>
+              </a:solidFill>
+            </a:endParaRPr>
+          </a:p>
+          <a:p>
+            <a:pPr lvl="1"/>
+            <a:endParaRPr lang="en-US" dirty="0">
+              <a:solidFill>
+                <a:schemeClr val="accent2">
+                  <a:lumMod val="20000"/>
+                  <a:lumOff val="80000"/>
+                </a:schemeClr>
+              </a:solidFill>
+            </a:endParaRPr>
+          </a:p>
+          <a:p>
+            <a:endParaRPr lang="en-US" dirty="0"/>
+          </a:p>
+        </p:txBody>
+      </p:sp>
+    </p:spTree>
+    <p:extLst>
+      <p:ext uri="{BB962C8B-B14F-4D97-AF65-F5344CB8AC3E}">
+        <p14:creationId xmlns:p14="http://schemas.microsoft.com/office/powerpoint/2010/main" val="1155694617"/>
+      </p:ext>
+    </p:extLst>
+  </p:cSld>
+  <p:clrMapOvr>
+    <a:masterClrMapping/>
+  </p:clrMapOvr>
+</p:sld>
+</file>
+
+<file path=ppt/slides/slide12.xml><?xml version="1.0" encoding="utf-8"?>
+<p:sld xmlns:a="http://schemas.openxmlformats.org/drawingml/2006/main" xmlns:r="http://schemas.openxmlformats.org/officeDocument/2006/relationships" xmlns:p="http://schemas.openxmlformats.org/presentationml/2006/main">
+  <p:cSld>
+    <p:spTree>
+      <p:nvGrpSpPr>
+        <p:cNvPr id="1" name="">
+          <a:extLst>
+            <a:ext uri="{FF2B5EF4-FFF2-40B4-BE49-F238E27FC236}">
+              <a16:creationId xmlns:a16="http://schemas.microsoft.com/office/drawing/2014/main" id="{C84C1D80-19AE-9AD7-9544-1EF4566EFCA7}"/>
+            </a:ext>
+          </a:extLst>
+        </p:cNvPr>
+        <p:cNvGrpSpPr/>
+        <p:nvPr/>
+      </p:nvGrpSpPr>
+      <p:grpSpPr>
+        <a:xfrm>
+          <a:off x="0" y="0"/>
+          <a:ext cx="0" cy="0"/>
+          <a:chOff x="0" y="0"/>
+          <a:chExt cx="0" cy="0"/>
+        </a:xfrm>
+      </p:grpSpPr>
+      <p:sp>
+        <p:nvSpPr>
+          <p:cNvPr id="2" name="Title 1">
+            <a:extLst>
+              <a:ext uri="{FF2B5EF4-FFF2-40B4-BE49-F238E27FC236}">
+                <a16:creationId xmlns:a16="http://schemas.microsoft.com/office/drawing/2014/main" id="{D23A2242-E41D-DCE7-E2FA-0F228DB5A5C9}"/>
+              </a:ext>
+            </a:extLst>
+          </p:cNvPr>
+          <p:cNvSpPr>
+            <a:spLocks noGrp="1"/>
+          </p:cNvSpPr>
+          <p:nvPr>
+            <p:ph type="title"/>
+          </p:nvPr>
+        </p:nvSpPr>
+        <p:spPr>
+          <a:xfrm>
+            <a:off x="321869" y="579120"/>
+            <a:ext cx="11548261" cy="590919"/>
+          </a:xfrm>
+        </p:spPr>
+        <p:txBody>
+          <a:bodyPr/>
+          <a:lstStyle/>
+          <a:p>
+            <a:r>
+              <a:rPr lang="en-US" dirty="0"/>
+              <a:t>Vector Data type</a:t>
+            </a:r>
+          </a:p>
+        </p:txBody>
+      </p:sp>
+      <p:sp>
+        <p:nvSpPr>
+          <p:cNvPr id="4" name="Slide Number Placeholder 3">
+            <a:extLst>
+              <a:ext uri="{FF2B5EF4-FFF2-40B4-BE49-F238E27FC236}">
+                <a16:creationId xmlns:a16="http://schemas.microsoft.com/office/drawing/2014/main" id="{C1DA1988-30A1-BAE5-E8B0-CF491831A3FB}"/>
+              </a:ext>
+            </a:extLst>
+          </p:cNvPr>
+          <p:cNvSpPr>
+            <a:spLocks noGrp="1"/>
+          </p:cNvSpPr>
+          <p:nvPr>
+            <p:ph type="sldNum" sz="quarter" idx="12"/>
+          </p:nvPr>
+        </p:nvSpPr>
+        <p:spPr/>
+        <p:txBody>
+          <a:bodyPr/>
+          <a:lstStyle/>
+          <a:p>
+            <a:fld id="{FE024F78-56A6-7740-B68D-8D4D026EDF3F}" type="slidenum">
+              <a:rPr lang="en-US" smtClean="0"/>
+              <a:pPr/>
+              <a:t>12</a:t>
+            </a:fld>
+            <a:endParaRPr lang="en-US" dirty="0"/>
+          </a:p>
+        </p:txBody>
+      </p:sp>
+      <p:sp>
+        <p:nvSpPr>
+          <p:cNvPr id="5" name="TextBox 4">
+            <a:extLst>
+              <a:ext uri="{FF2B5EF4-FFF2-40B4-BE49-F238E27FC236}">
+                <a16:creationId xmlns:a16="http://schemas.microsoft.com/office/drawing/2014/main" id="{CC18A7CB-7F3C-A6AF-4739-CDEC843331B5}"/>
+              </a:ext>
+            </a:extLst>
+          </p:cNvPr>
+          <p:cNvSpPr txBox="1"/>
+          <p:nvPr/>
+        </p:nvSpPr>
+        <p:spPr>
+          <a:xfrm>
+            <a:off x="904569" y="1406014"/>
+            <a:ext cx="9389806" cy="5078313"/>
+          </a:xfrm>
+          <a:prstGeom prst="rect">
+            <a:avLst/>
+          </a:prstGeom>
+          <a:noFill/>
+        </p:spPr>
+        <p:txBody>
+          <a:bodyPr wrap="square" rtlCol="0">
+            <a:spAutoFit/>
+          </a:bodyPr>
+          <a:lstStyle/>
+          <a:p>
+            <a:pPr lvl="1"/>
+            <a:r>
+              <a:rPr lang="en-US" dirty="0">
+                <a:solidFill>
+                  <a:schemeClr val="accent2">
+                    <a:lumMod val="20000"/>
+                    <a:lumOff val="80000"/>
+                  </a:schemeClr>
+                </a:solidFill>
+              </a:rPr>
+              <a:t>Stored as a </a:t>
+            </a:r>
+            <a:r>
+              <a:rPr lang="en-US" dirty="0" err="1">
+                <a:solidFill>
+                  <a:schemeClr val="accent2">
+                    <a:lumMod val="20000"/>
+                    <a:lumOff val="80000"/>
+                  </a:schemeClr>
+                </a:solidFill>
+              </a:rPr>
+              <a:t>varbinary</a:t>
+            </a:r>
+            <a:endParaRPr lang="en-US" dirty="0">
+              <a:solidFill>
+                <a:schemeClr val="accent2">
+                  <a:lumMod val="20000"/>
+                  <a:lumOff val="80000"/>
+                </a:schemeClr>
+              </a:solidFill>
+            </a:endParaRPr>
+          </a:p>
+          <a:p>
+            <a:pPr lvl="1"/>
+            <a:r>
+              <a:rPr lang="en-US" dirty="0">
+                <a:solidFill>
+                  <a:schemeClr val="accent2">
+                    <a:lumMod val="20000"/>
+                    <a:lumOff val="80000"/>
+                  </a:schemeClr>
+                </a:solidFill>
+              </a:rPr>
+              <a:t>Looks like an array of floating point (float32 or float16)</a:t>
+            </a:r>
+          </a:p>
+          <a:p>
+            <a:pPr lvl="1"/>
+            <a:r>
+              <a:rPr lang="en-US" dirty="0">
+                <a:solidFill>
+                  <a:schemeClr val="accent2">
+                    <a:lumMod val="20000"/>
+                    <a:lumOff val="80000"/>
+                  </a:schemeClr>
+                </a:solidFill>
+              </a:rPr>
+              <a:t>JSON format used</a:t>
+            </a:r>
+          </a:p>
+          <a:p>
+            <a:pPr lvl="1"/>
+            <a:endParaRPr lang="en-US" dirty="0">
+              <a:solidFill>
+                <a:schemeClr val="accent2">
+                  <a:lumMod val="20000"/>
+                  <a:lumOff val="80000"/>
+                </a:schemeClr>
+              </a:solidFill>
+            </a:endParaRPr>
+          </a:p>
+          <a:p>
+            <a:pPr lvl="1"/>
+            <a:r>
+              <a:rPr lang="en-US" dirty="0">
+                <a:solidFill>
+                  <a:schemeClr val="accent2">
+                    <a:lumMod val="20000"/>
+                    <a:lumOff val="80000"/>
+                  </a:schemeClr>
+                </a:solidFill>
+              </a:rPr>
+              <a:t>Limitations </a:t>
+            </a:r>
+          </a:p>
+          <a:p>
+            <a:pPr marL="1200150" lvl="2" indent="-285750">
+              <a:buFont typeface="Arial" panose="020B0604020202020204" pitchFamily="34" charset="0"/>
+              <a:buChar char="•"/>
+            </a:pPr>
+            <a:r>
+              <a:rPr lang="en-US" dirty="0">
+                <a:solidFill>
+                  <a:schemeClr val="accent2">
+                    <a:lumMod val="20000"/>
+                    <a:lumOff val="80000"/>
+                  </a:schemeClr>
+                </a:solidFill>
+              </a:rPr>
+              <a:t>Holds up to 1998 dimensions (in float32)</a:t>
+            </a:r>
+          </a:p>
+          <a:p>
+            <a:pPr marL="1200150" lvl="2" indent="-285750">
+              <a:buFont typeface="Arial" panose="020B0604020202020204" pitchFamily="34" charset="0"/>
+              <a:buChar char="•"/>
+            </a:pPr>
+            <a:r>
+              <a:rPr lang="en-US" dirty="0">
+                <a:solidFill>
+                  <a:schemeClr val="accent2">
+                    <a:lumMod val="20000"/>
+                    <a:lumOff val="80000"/>
+                  </a:schemeClr>
+                </a:solidFill>
+              </a:rPr>
+              <a:t>Check and Default constraints are not support for Vector columns</a:t>
+            </a:r>
+          </a:p>
+          <a:p>
+            <a:pPr marL="1200150" lvl="2" indent="-285750">
+              <a:buFont typeface="Arial" panose="020B0604020202020204" pitchFamily="34" charset="0"/>
+              <a:buChar char="•"/>
+            </a:pPr>
+            <a:r>
+              <a:rPr lang="en-US" dirty="0">
+                <a:solidFill>
+                  <a:schemeClr val="accent2">
+                    <a:lumMod val="20000"/>
+                    <a:lumOff val="80000"/>
+                  </a:schemeClr>
+                </a:solidFill>
+              </a:rPr>
+              <a:t>Foreign key and primary key constraints not supported</a:t>
+            </a:r>
+          </a:p>
+          <a:p>
+            <a:pPr marL="1200150" lvl="2" indent="-285750">
+              <a:buFont typeface="Arial" panose="020B0604020202020204" pitchFamily="34" charset="0"/>
+              <a:buChar char="•"/>
+            </a:pPr>
+            <a:r>
+              <a:rPr lang="en-US" dirty="0">
+                <a:solidFill>
+                  <a:schemeClr val="accent2">
+                    <a:lumMod val="20000"/>
+                    <a:lumOff val="80000"/>
+                  </a:schemeClr>
+                </a:solidFill>
+              </a:rPr>
+              <a:t>Most function other than the new Vector type functions will not work correctly</a:t>
+            </a:r>
+          </a:p>
+          <a:p>
+            <a:pPr marL="1200150" lvl="2" indent="-285750">
+              <a:buFont typeface="Arial" panose="020B0604020202020204" pitchFamily="34" charset="0"/>
+              <a:buChar char="•"/>
+            </a:pPr>
+            <a:r>
+              <a:rPr lang="en-US" dirty="0">
+                <a:solidFill>
+                  <a:schemeClr val="accent2">
+                    <a:lumMod val="20000"/>
+                    <a:lumOff val="80000"/>
+                  </a:schemeClr>
+                </a:solidFill>
+              </a:rPr>
+              <a:t>Memory-Optimized table not support</a:t>
+            </a:r>
+          </a:p>
+          <a:p>
+            <a:pPr marL="1200150" lvl="2" indent="-285750">
+              <a:buFont typeface="Arial" panose="020B0604020202020204" pitchFamily="34" charset="0"/>
+              <a:buChar char="•"/>
+            </a:pPr>
+            <a:r>
+              <a:rPr lang="en-US" dirty="0">
+                <a:solidFill>
+                  <a:schemeClr val="accent2">
+                    <a:lumMod val="20000"/>
+                    <a:lumOff val="80000"/>
+                  </a:schemeClr>
+                </a:solidFill>
+              </a:rPr>
+              <a:t>Always Encrypted not support</a:t>
+            </a:r>
+          </a:p>
+          <a:p>
+            <a:pPr marL="1200150" lvl="2" indent="-285750">
+              <a:buFont typeface="Arial" panose="020B0604020202020204" pitchFamily="34" charset="0"/>
+              <a:buChar char="•"/>
+            </a:pPr>
+            <a:r>
+              <a:rPr lang="en-US" dirty="0">
+                <a:solidFill>
+                  <a:schemeClr val="accent2">
+                    <a:lumMod val="20000"/>
+                    <a:lumOff val="80000"/>
+                  </a:schemeClr>
+                </a:solidFill>
+              </a:rPr>
+              <a:t>No indexes expect for new vector index type on vector columns</a:t>
+            </a:r>
+          </a:p>
+          <a:p>
+            <a:pPr lvl="1"/>
+            <a:endParaRPr lang="en-US" dirty="0">
+              <a:solidFill>
+                <a:schemeClr val="accent2">
+                  <a:lumMod val="20000"/>
+                  <a:lumOff val="80000"/>
+                </a:schemeClr>
+              </a:solidFill>
+            </a:endParaRPr>
+          </a:p>
+          <a:p>
+            <a:pPr lvl="1"/>
+            <a:r>
+              <a:rPr lang="en-US" dirty="0">
+                <a:solidFill>
+                  <a:schemeClr val="accent2">
+                    <a:lumMod val="20000"/>
+                    <a:lumOff val="80000"/>
+                  </a:schemeClr>
+                </a:solidFill>
+              </a:rPr>
+              <a:t>New Vector index using </a:t>
+            </a:r>
+            <a:r>
+              <a:rPr lang="en-US" dirty="0" err="1">
+                <a:solidFill>
+                  <a:schemeClr val="accent2">
+                    <a:lumMod val="20000"/>
+                    <a:lumOff val="80000"/>
+                  </a:schemeClr>
+                </a:solidFill>
+              </a:rPr>
+              <a:t>DiskANN</a:t>
+            </a:r>
+            <a:endParaRPr lang="en-US" dirty="0">
+              <a:solidFill>
+                <a:schemeClr val="accent2">
+                  <a:lumMod val="20000"/>
+                  <a:lumOff val="80000"/>
+                </a:schemeClr>
+              </a:solidFill>
+            </a:endParaRPr>
+          </a:p>
+          <a:p>
+            <a:pPr lvl="1"/>
+            <a:endParaRPr lang="en-US" dirty="0">
+              <a:solidFill>
+                <a:schemeClr val="accent2">
+                  <a:lumMod val="20000"/>
+                  <a:lumOff val="80000"/>
+                </a:schemeClr>
+              </a:solidFill>
+            </a:endParaRPr>
+          </a:p>
+          <a:p>
+            <a:pPr lvl="1"/>
+            <a:endParaRPr lang="en-US" dirty="0">
+              <a:solidFill>
+                <a:schemeClr val="accent2">
+                  <a:lumMod val="20000"/>
+                  <a:lumOff val="80000"/>
+                </a:schemeClr>
+              </a:solidFill>
+            </a:endParaRPr>
+          </a:p>
+          <a:p>
+            <a:pPr lvl="1"/>
+            <a:endParaRPr lang="en-US" dirty="0">
+              <a:solidFill>
+                <a:schemeClr val="accent2">
+                  <a:lumMod val="20000"/>
+                  <a:lumOff val="80000"/>
+                </a:schemeClr>
+              </a:solidFill>
+            </a:endParaRPr>
+          </a:p>
+          <a:p>
+            <a:endParaRPr lang="en-US" dirty="0"/>
+          </a:p>
+        </p:txBody>
+      </p:sp>
+    </p:spTree>
+    <p:extLst>
+      <p:ext uri="{BB962C8B-B14F-4D97-AF65-F5344CB8AC3E}">
+        <p14:creationId xmlns:p14="http://schemas.microsoft.com/office/powerpoint/2010/main" val="582232591"/>
+      </p:ext>
+    </p:extLst>
+  </p:cSld>
+  <p:clrMapOvr>
+    <a:masterClrMapping/>
+  </p:clrMapOvr>
+</p:sld>
+</file>
+
+<file path=ppt/slides/slide13.xml><?xml version="1.0" encoding="utf-8"?>
+<p:sld xmlns:a="http://schemas.openxmlformats.org/drawingml/2006/main" xmlns:r="http://schemas.openxmlformats.org/officeDocument/2006/relationships" xmlns:p="http://schemas.openxmlformats.org/presentationml/2006/main">
+  <p:cSld>
+    <p:spTree>
+      <p:nvGrpSpPr>
+        <p:cNvPr id="1" name=""/>
+        <p:cNvGrpSpPr/>
+        <p:nvPr/>
+      </p:nvGrpSpPr>
+      <p:grpSpPr>
+        <a:xfrm>
+          <a:off x="0" y="0"/>
+          <a:ext cx="0" cy="0"/>
+          <a:chOff x="0" y="0"/>
+          <a:chExt cx="0" cy="0"/>
+        </a:xfrm>
+      </p:grpSpPr>
+      <p:sp>
+        <p:nvSpPr>
+          <p:cNvPr id="2" name="Title 1">
+            <a:extLst>
+              <a:ext uri="{FF2B5EF4-FFF2-40B4-BE49-F238E27FC236}">
+                <a16:creationId xmlns:a16="http://schemas.microsoft.com/office/drawing/2014/main" id="{718C5A32-2572-96A5-EBB3-09019F61350F}"/>
               </a:ext>
             </a:extLst>
           </p:cNvPr>
@@ -10407,7 +11346,7 @@
           <a:p>
             <a:r>
               <a:rPr lang="en-US" dirty="0"/>
-              <a:t>Resources</a:t>
+              <a:t>Demo Setup</a:t>
             </a:r>
           </a:p>
         </p:txBody>
@@ -10417,7 +11356,7 @@
           <p:cNvPr id="4" name="Slide Number Placeholder 3">
             <a:extLst>
               <a:ext uri="{FF2B5EF4-FFF2-40B4-BE49-F238E27FC236}">
-                <a16:creationId xmlns:a16="http://schemas.microsoft.com/office/drawing/2014/main" id="{18E0EC23-84B4-4DEC-6A15-37945305D152}"/>
+                <a16:creationId xmlns:a16="http://schemas.microsoft.com/office/drawing/2014/main" id="{2A810734-4519-D94F-D397-E200457B763D}"/>
               </a:ext>
             </a:extLst>
           </p:cNvPr>
@@ -10436,7 +11375,560 @@
             <a:fld id="{FE024F78-56A6-7740-B68D-8D4D026EDF3F}" type="slidenum">
               <a:rPr lang="en-US" smtClean="0"/>
               <a:pPr/>
-              <a:t>11</a:t>
+              <a:t>13</a:t>
+            </a:fld>
+            <a:endParaRPr lang="en-US" dirty="0"/>
+          </a:p>
+        </p:txBody>
+      </p:sp>
+      <p:sp>
+        <p:nvSpPr>
+          <p:cNvPr id="5" name="TextBox 4">
+            <a:extLst>
+              <a:ext uri="{FF2B5EF4-FFF2-40B4-BE49-F238E27FC236}">
+                <a16:creationId xmlns:a16="http://schemas.microsoft.com/office/drawing/2014/main" id="{96D9EF59-16FB-1C65-3A5C-E878ADEA2979}"/>
+              </a:ext>
+            </a:extLst>
+          </p:cNvPr>
+          <p:cNvSpPr txBox="1"/>
+          <p:nvPr/>
+        </p:nvSpPr>
+        <p:spPr>
+          <a:xfrm>
+            <a:off x="924231" y="1297858"/>
+            <a:ext cx="7806813" cy="3139321"/>
+          </a:xfrm>
+          <a:prstGeom prst="rect">
+            <a:avLst/>
+          </a:prstGeom>
+          <a:noFill/>
+        </p:spPr>
+        <p:txBody>
+          <a:bodyPr wrap="square" rtlCol="0">
+            <a:spAutoFit/>
+          </a:bodyPr>
+          <a:lstStyle/>
+          <a:p>
+            <a:pPr marL="285750" indent="-285750">
+              <a:buFont typeface="Arial" panose="020B0604020202020204" pitchFamily="34" charset="0"/>
+              <a:buChar char="•"/>
+            </a:pPr>
+            <a:r>
+              <a:rPr lang="en-US" u="sng" dirty="0">
+                <a:solidFill>
+                  <a:schemeClr val="accent2">
+                    <a:lumMod val="20000"/>
+                    <a:lumOff val="80000"/>
+                  </a:schemeClr>
+                </a:solidFill>
+              </a:rPr>
+              <a:t>SQL 2025 Developer Edition</a:t>
+            </a:r>
+          </a:p>
+          <a:p>
+            <a:pPr marL="285750" indent="-285750">
+              <a:buFont typeface="Arial" panose="020B0604020202020204" pitchFamily="34" charset="0"/>
+              <a:buChar char="•"/>
+            </a:pPr>
+            <a:r>
+              <a:rPr lang="en-US" u="sng" dirty="0">
+                <a:solidFill>
+                  <a:schemeClr val="accent2">
+                    <a:lumMod val="20000"/>
+                    <a:lumOff val="80000"/>
+                  </a:schemeClr>
+                </a:solidFill>
+              </a:rPr>
+              <a:t>SQL Server Management Studio version 22</a:t>
+            </a:r>
+          </a:p>
+          <a:p>
+            <a:pPr marL="285750" indent="-285750">
+              <a:buFont typeface="Arial" panose="020B0604020202020204" pitchFamily="34" charset="0"/>
+              <a:buChar char="•"/>
+            </a:pPr>
+            <a:r>
+              <a:rPr lang="en-US" u="sng" dirty="0">
+                <a:solidFill>
+                  <a:schemeClr val="accent2">
+                    <a:lumMod val="20000"/>
+                    <a:lumOff val="80000"/>
+                  </a:schemeClr>
+                </a:solidFill>
+              </a:rPr>
+              <a:t>Ollama (local model)</a:t>
+            </a:r>
+          </a:p>
+          <a:p>
+            <a:pPr marL="285750" indent="-285750">
+              <a:buFont typeface="Arial" panose="020B0604020202020204" pitchFamily="34" charset="0"/>
+              <a:buChar char="•"/>
+            </a:pPr>
+            <a:r>
+              <a:rPr lang="en-US" u="sng" dirty="0">
+                <a:solidFill>
+                  <a:schemeClr val="accent2">
+                    <a:lumMod val="20000"/>
+                    <a:lumOff val="80000"/>
+                  </a:schemeClr>
+                </a:solidFill>
+              </a:rPr>
+              <a:t>OpenSSL (generate certificate)</a:t>
+            </a:r>
+          </a:p>
+          <a:p>
+            <a:pPr marL="285750" indent="-285750">
+              <a:buFont typeface="Arial" panose="020B0604020202020204" pitchFamily="34" charset="0"/>
+              <a:buChar char="•"/>
+            </a:pPr>
+            <a:r>
+              <a:rPr lang="en-US" u="sng" dirty="0">
+                <a:solidFill>
+                  <a:schemeClr val="accent2">
+                    <a:lumMod val="20000"/>
+                    <a:lumOff val="80000"/>
+                  </a:schemeClr>
+                </a:solidFill>
+              </a:rPr>
+              <a:t>NGINX (HTTPS service)</a:t>
+            </a:r>
+          </a:p>
+          <a:p>
+            <a:pPr marL="285750" indent="-285750">
+              <a:buFont typeface="Arial" panose="020B0604020202020204" pitchFamily="34" charset="0"/>
+              <a:buChar char="•"/>
+            </a:pPr>
+            <a:r>
+              <a:rPr lang="en-US" u="sng" dirty="0">
+                <a:solidFill>
+                  <a:schemeClr val="accent2">
+                    <a:lumMod val="20000"/>
+                    <a:lumOff val="80000"/>
+                  </a:schemeClr>
+                </a:solidFill>
+              </a:rPr>
+              <a:t>POSTMAN (test https post)</a:t>
+            </a:r>
+          </a:p>
+          <a:p>
+            <a:pPr marL="285750" indent="-285750">
+              <a:buFont typeface="Arial" panose="020B0604020202020204" pitchFamily="34" charset="0"/>
+              <a:buChar char="•"/>
+            </a:pPr>
+            <a:r>
+              <a:rPr lang="en-US" u="sng" dirty="0">
+                <a:solidFill>
+                  <a:schemeClr val="accent2">
+                    <a:lumMod val="20000"/>
+                    <a:lumOff val="80000"/>
+                  </a:schemeClr>
+                </a:solidFill>
+              </a:rPr>
+              <a:t>SP_CONFIGURE</a:t>
+            </a:r>
+          </a:p>
+          <a:p>
+            <a:pPr marL="285750" indent="-285750">
+              <a:buFont typeface="Arial" panose="020B0604020202020204" pitchFamily="34" charset="0"/>
+              <a:buChar char="•"/>
+            </a:pPr>
+            <a:r>
+              <a:rPr lang="en-US" u="sng" dirty="0">
+                <a:solidFill>
+                  <a:schemeClr val="accent2">
+                    <a:lumMod val="20000"/>
+                    <a:lumOff val="80000"/>
+                  </a:schemeClr>
+                </a:solidFill>
+              </a:rPr>
+              <a:t>	external rest endpoint enabled</a:t>
+            </a:r>
+          </a:p>
+          <a:p>
+            <a:pPr marL="285750" indent="-285750">
+              <a:buFont typeface="Arial" panose="020B0604020202020204" pitchFamily="34" charset="0"/>
+              <a:buChar char="•"/>
+            </a:pPr>
+            <a:r>
+              <a:rPr lang="en-US" u="sng" dirty="0">
+                <a:solidFill>
+                  <a:schemeClr val="accent2">
+                    <a:lumMod val="20000"/>
+                    <a:lumOff val="80000"/>
+                  </a:schemeClr>
+                </a:solidFill>
+              </a:rPr>
+              <a:t>Create External Model</a:t>
+            </a:r>
+          </a:p>
+          <a:p>
+            <a:pPr marL="285750" indent="-285750">
+              <a:buFont typeface="Arial" panose="020B0604020202020204" pitchFamily="34" charset="0"/>
+              <a:buChar char="•"/>
+            </a:pPr>
+            <a:r>
+              <a:rPr lang="en-US" u="sng" dirty="0">
+                <a:solidFill>
+                  <a:schemeClr val="accent2">
+                    <a:lumMod val="20000"/>
+                    <a:lumOff val="80000"/>
+                  </a:schemeClr>
+                </a:solidFill>
+              </a:rPr>
+              <a:t>AI_GENERATE_EMBEDDINGS (test model)</a:t>
+            </a:r>
+          </a:p>
+          <a:p>
+            <a:endParaRPr lang="en-US" dirty="0"/>
+          </a:p>
+        </p:txBody>
+      </p:sp>
+    </p:spTree>
+    <p:extLst>
+      <p:ext uri="{BB962C8B-B14F-4D97-AF65-F5344CB8AC3E}">
+        <p14:creationId xmlns:p14="http://schemas.microsoft.com/office/powerpoint/2010/main" val="1587207474"/>
+      </p:ext>
+    </p:extLst>
+  </p:cSld>
+  <p:clrMapOvr>
+    <a:masterClrMapping/>
+  </p:clrMapOvr>
+</p:sld>
+</file>
+
+<file path=ppt/slides/slide14.xml><?xml version="1.0" encoding="utf-8"?>
+<p:sld xmlns:a="http://schemas.openxmlformats.org/drawingml/2006/main" xmlns:r="http://schemas.openxmlformats.org/officeDocument/2006/relationships" xmlns:p="http://schemas.openxmlformats.org/presentationml/2006/main">
+  <p:cSld>
+    <p:spTree>
+      <p:nvGrpSpPr>
+        <p:cNvPr id="1" name=""/>
+        <p:cNvGrpSpPr/>
+        <p:nvPr/>
+      </p:nvGrpSpPr>
+      <p:grpSpPr>
+        <a:xfrm>
+          <a:off x="0" y="0"/>
+          <a:ext cx="0" cy="0"/>
+          <a:chOff x="0" y="0"/>
+          <a:chExt cx="0" cy="0"/>
+        </a:xfrm>
+      </p:grpSpPr>
+      <p:sp>
+        <p:nvSpPr>
+          <p:cNvPr id="4" name="Subtitle 3">
+            <a:extLst>
+              <a:ext uri="{FF2B5EF4-FFF2-40B4-BE49-F238E27FC236}">
+                <a16:creationId xmlns:a16="http://schemas.microsoft.com/office/drawing/2014/main" id="{260D053B-A40A-3228-B6D5-3371B9EE2E56}"/>
+              </a:ext>
+            </a:extLst>
+          </p:cNvPr>
+          <p:cNvSpPr>
+            <a:spLocks noGrp="1"/>
+          </p:cNvSpPr>
+          <p:nvPr>
+            <p:ph type="subTitle" idx="1"/>
+          </p:nvPr>
+        </p:nvSpPr>
+        <p:spPr>
+          <a:xfrm>
+            <a:off x="321868" y="3484615"/>
+            <a:ext cx="11562303" cy="2387865"/>
+          </a:xfrm>
+        </p:spPr>
+        <p:txBody>
+          <a:bodyPr/>
+          <a:lstStyle/>
+          <a:p>
+            <a:r>
+              <a:rPr lang="en-US" dirty="0"/>
+              <a:t>Vector Demo</a:t>
+            </a:r>
+          </a:p>
+        </p:txBody>
+      </p:sp>
+      <p:sp>
+        <p:nvSpPr>
+          <p:cNvPr id="3" name="Slide Number Placeholder 2">
+            <a:extLst>
+              <a:ext uri="{FF2B5EF4-FFF2-40B4-BE49-F238E27FC236}">
+                <a16:creationId xmlns:a16="http://schemas.microsoft.com/office/drawing/2014/main" id="{A6A971A9-0C5C-DDFC-67F9-2E5A55F12F67}"/>
+              </a:ext>
+            </a:extLst>
+          </p:cNvPr>
+          <p:cNvSpPr>
+            <a:spLocks noGrp="1"/>
+          </p:cNvSpPr>
+          <p:nvPr>
+            <p:ph type="sldNum" sz="quarter" idx="12"/>
+          </p:nvPr>
+        </p:nvSpPr>
+        <p:spPr>
+          <a:xfrm>
+            <a:off x="9140971" y="6226198"/>
+            <a:ext cx="2743200" cy="365125"/>
+          </a:xfrm>
+        </p:spPr>
+        <p:txBody>
+          <a:bodyPr/>
+          <a:lstStyle/>
+          <a:p>
+            <a:fld id="{FE024F78-56A6-7740-B68D-8D4D026EDF3F}" type="slidenum">
+              <a:rPr lang="en-US" smtClean="0"/>
+              <a:pPr/>
+              <a:t>14</a:t>
+            </a:fld>
+            <a:endParaRPr lang="en-US" dirty="0"/>
+          </a:p>
+        </p:txBody>
+      </p:sp>
+      <p:sp>
+        <p:nvSpPr>
+          <p:cNvPr id="6" name="Title 5">
+            <a:extLst>
+              <a:ext uri="{FF2B5EF4-FFF2-40B4-BE49-F238E27FC236}">
+                <a16:creationId xmlns:a16="http://schemas.microsoft.com/office/drawing/2014/main" id="{C4899B60-87A1-1D6B-E090-52C6F97BCC72}"/>
+              </a:ext>
+            </a:extLst>
+          </p:cNvPr>
+          <p:cNvSpPr>
+            <a:spLocks noGrp="1"/>
+          </p:cNvSpPr>
+          <p:nvPr>
+            <p:ph type="title"/>
+          </p:nvPr>
+        </p:nvSpPr>
+        <p:spPr/>
+        <p:txBody>
+          <a:bodyPr/>
+          <a:lstStyle/>
+          <a:p>
+            <a:r>
+              <a:rPr lang="en-US" dirty="0"/>
+              <a:t>Basic</a:t>
+            </a:r>
+          </a:p>
+        </p:txBody>
+      </p:sp>
+    </p:spTree>
+    <p:extLst>
+      <p:ext uri="{BB962C8B-B14F-4D97-AF65-F5344CB8AC3E}">
+        <p14:creationId xmlns:p14="http://schemas.microsoft.com/office/powerpoint/2010/main" val="1397193754"/>
+      </p:ext>
+    </p:extLst>
+  </p:cSld>
+  <p:clrMapOvr>
+    <a:masterClrMapping/>
+  </p:clrMapOvr>
+</p:sld>
+</file>
+
+<file path=ppt/slides/slide15.xml><?xml version="1.0" encoding="utf-8"?>
+<p:sld xmlns:a="http://schemas.openxmlformats.org/drawingml/2006/main" xmlns:r="http://schemas.openxmlformats.org/officeDocument/2006/relationships" xmlns:p="http://schemas.openxmlformats.org/presentationml/2006/main">
+  <p:cSld>
+    <p:spTree>
+      <p:nvGrpSpPr>
+        <p:cNvPr id="1" name="">
+          <a:extLst>
+            <a:ext uri="{FF2B5EF4-FFF2-40B4-BE49-F238E27FC236}">
+              <a16:creationId xmlns:a16="http://schemas.microsoft.com/office/drawing/2014/main" id="{1D506955-8A65-AC52-2B81-EAAD15928D81}"/>
+            </a:ext>
+          </a:extLst>
+        </p:cNvPr>
+        <p:cNvGrpSpPr/>
+        <p:nvPr/>
+      </p:nvGrpSpPr>
+      <p:grpSpPr>
+        <a:xfrm>
+          <a:off x="0" y="0"/>
+          <a:ext cx="0" cy="0"/>
+          <a:chOff x="0" y="0"/>
+          <a:chExt cx="0" cy="0"/>
+        </a:xfrm>
+      </p:grpSpPr>
+      <p:sp>
+        <p:nvSpPr>
+          <p:cNvPr id="4" name="Subtitle 3">
+            <a:extLst>
+              <a:ext uri="{FF2B5EF4-FFF2-40B4-BE49-F238E27FC236}">
+                <a16:creationId xmlns:a16="http://schemas.microsoft.com/office/drawing/2014/main" id="{4722C5E9-86A7-4A8C-1E8F-91180A5771B3}"/>
+              </a:ext>
+            </a:extLst>
+          </p:cNvPr>
+          <p:cNvSpPr>
+            <a:spLocks noGrp="1"/>
+          </p:cNvSpPr>
+          <p:nvPr>
+            <p:ph type="subTitle" idx="1"/>
+          </p:nvPr>
+        </p:nvSpPr>
+        <p:spPr>
+          <a:xfrm>
+            <a:off x="321868" y="3484615"/>
+            <a:ext cx="11562303" cy="2387865"/>
+          </a:xfrm>
+        </p:spPr>
+        <p:txBody>
+          <a:bodyPr/>
+          <a:lstStyle/>
+          <a:p>
+            <a:r>
+              <a:rPr lang="en-US" dirty="0"/>
+              <a:t>Vector Demo</a:t>
+            </a:r>
+          </a:p>
+        </p:txBody>
+      </p:sp>
+      <p:sp>
+        <p:nvSpPr>
+          <p:cNvPr id="3" name="Slide Number Placeholder 2">
+            <a:extLst>
+              <a:ext uri="{FF2B5EF4-FFF2-40B4-BE49-F238E27FC236}">
+                <a16:creationId xmlns:a16="http://schemas.microsoft.com/office/drawing/2014/main" id="{A4C6E5DB-2FBF-DBCF-9FC7-5DFDE7D4CD58}"/>
+              </a:ext>
+            </a:extLst>
+          </p:cNvPr>
+          <p:cNvSpPr>
+            <a:spLocks noGrp="1"/>
+          </p:cNvSpPr>
+          <p:nvPr>
+            <p:ph type="sldNum" sz="quarter" idx="12"/>
+          </p:nvPr>
+        </p:nvSpPr>
+        <p:spPr>
+          <a:xfrm>
+            <a:off x="9140971" y="6226198"/>
+            <a:ext cx="2743200" cy="365125"/>
+          </a:xfrm>
+        </p:spPr>
+        <p:txBody>
+          <a:bodyPr/>
+          <a:lstStyle/>
+          <a:p>
+            <a:fld id="{FE024F78-56A6-7740-B68D-8D4D026EDF3F}" type="slidenum">
+              <a:rPr lang="en-US" smtClean="0"/>
+              <a:pPr/>
+              <a:t>15</a:t>
+            </a:fld>
+            <a:endParaRPr lang="en-US" dirty="0"/>
+          </a:p>
+        </p:txBody>
+      </p:sp>
+      <p:sp>
+        <p:nvSpPr>
+          <p:cNvPr id="6" name="Title 5">
+            <a:extLst>
+              <a:ext uri="{FF2B5EF4-FFF2-40B4-BE49-F238E27FC236}">
+                <a16:creationId xmlns:a16="http://schemas.microsoft.com/office/drawing/2014/main" id="{71E7E31B-C6C2-4E6B-6592-038441F8BBB5}"/>
+              </a:ext>
+            </a:extLst>
+          </p:cNvPr>
+          <p:cNvSpPr>
+            <a:spLocks noGrp="1"/>
+          </p:cNvSpPr>
+          <p:nvPr>
+            <p:ph type="title"/>
+          </p:nvPr>
+        </p:nvSpPr>
+        <p:spPr/>
+        <p:txBody>
+          <a:bodyPr/>
+          <a:lstStyle/>
+          <a:p>
+            <a:r>
+              <a:rPr lang="en-US" dirty="0"/>
+              <a:t>Advance</a:t>
+            </a:r>
+          </a:p>
+        </p:txBody>
+      </p:sp>
+    </p:spTree>
+    <p:extLst>
+      <p:ext uri="{BB962C8B-B14F-4D97-AF65-F5344CB8AC3E}">
+        <p14:creationId xmlns:p14="http://schemas.microsoft.com/office/powerpoint/2010/main" val="1684862160"/>
+      </p:ext>
+    </p:extLst>
+  </p:cSld>
+  <p:clrMapOvr>
+    <a:masterClrMapping/>
+  </p:clrMapOvr>
+</p:sld>
+</file>
+
+<file path=ppt/slides/slide16.xml><?xml version="1.0" encoding="utf-8"?>
+<p:sld xmlns:a="http://schemas.openxmlformats.org/drawingml/2006/main" xmlns:r="http://schemas.openxmlformats.org/officeDocument/2006/relationships" xmlns:p="http://schemas.openxmlformats.org/presentationml/2006/main">
+  <p:cSld>
+    <p:spTree>
+      <p:nvGrpSpPr>
+        <p:cNvPr id="1" name=""/>
+        <p:cNvGrpSpPr/>
+        <p:nvPr/>
+      </p:nvGrpSpPr>
+      <p:grpSpPr>
+        <a:xfrm>
+          <a:off x="0" y="0"/>
+          <a:ext cx="0" cy="0"/>
+          <a:chOff x="0" y="0"/>
+          <a:chExt cx="0" cy="0"/>
+        </a:xfrm>
+      </p:grpSpPr>
+      <p:sp>
+        <p:nvSpPr>
+          <p:cNvPr id="2" name="Title 1">
+            <a:extLst>
+              <a:ext uri="{FF2B5EF4-FFF2-40B4-BE49-F238E27FC236}">
+                <a16:creationId xmlns:a16="http://schemas.microsoft.com/office/drawing/2014/main" id="{328F6BEE-2C99-F73D-2CAA-751771FB196A}"/>
+              </a:ext>
+            </a:extLst>
+          </p:cNvPr>
+          <p:cNvSpPr>
+            <a:spLocks noGrp="1"/>
+          </p:cNvSpPr>
+          <p:nvPr>
+            <p:ph type="title"/>
+          </p:nvPr>
+        </p:nvSpPr>
+        <p:spPr>
+          <a:xfrm>
+            <a:off x="321869" y="579120"/>
+            <a:ext cx="11548261" cy="482764"/>
+          </a:xfrm>
+        </p:spPr>
+        <p:txBody>
+          <a:bodyPr/>
+          <a:lstStyle/>
+          <a:p>
+            <a:r>
+              <a:rPr lang="en-US" dirty="0"/>
+              <a:t>Resources</a:t>
+            </a:r>
+          </a:p>
+        </p:txBody>
+      </p:sp>
+      <p:sp>
+        <p:nvSpPr>
+          <p:cNvPr id="4" name="Slide Number Placeholder 3">
+            <a:extLst>
+              <a:ext uri="{FF2B5EF4-FFF2-40B4-BE49-F238E27FC236}">
+                <a16:creationId xmlns:a16="http://schemas.microsoft.com/office/drawing/2014/main" id="{18E0EC23-84B4-4DEC-6A15-37945305D152}"/>
+              </a:ext>
+            </a:extLst>
+          </p:cNvPr>
+          <p:cNvSpPr>
+            <a:spLocks noGrp="1"/>
+          </p:cNvSpPr>
+          <p:nvPr>
+            <p:ph type="sldNum" sz="quarter" idx="12"/>
+          </p:nvPr>
+        </p:nvSpPr>
+        <p:spPr/>
+        <p:txBody>
+          <a:bodyPr/>
+          <a:lstStyle/>
+          <a:p>
+            <a:fld id="{FE024F78-56A6-7740-B68D-8D4D026EDF3F}" type="slidenum">
+              <a:rPr lang="en-US" smtClean="0"/>
+              <a:pPr/>
+              <a:t>16</a:t>
             </a:fld>
             <a:endParaRPr lang="en-US" dirty="0"/>
           </a:p>
@@ -10457,14 +11949,14 @@
           <p:nvPr>
             <p:extLst>
               <p:ext uri="{D42A27DB-BD31-4B8C-83A1-F6EECF244321}">
-                <p14:modId xmlns:p14="http://schemas.microsoft.com/office/powerpoint/2010/main" val="1646016210"/>
+                <p14:modId xmlns:p14="http://schemas.microsoft.com/office/powerpoint/2010/main" val="4292493202"/>
               </p:ext>
             </p:extLst>
           </p:nvPr>
         </p:nvGraphicFramePr>
         <p:xfrm>
           <a:off x="816076" y="1198005"/>
-          <a:ext cx="10628671" cy="4480560"/>
+          <a:ext cx="10628671" cy="4846320"/>
         </p:xfrm>
         <a:graphic>
           <a:graphicData uri="http://schemas.openxmlformats.org/drawingml/2006/table">
@@ -10820,6 +12312,40 @@
                   </a:ext>
                 </a:extLst>
               </a:tr>
+              <a:tr h="289223">
+                <a:tc>
+                  <a:txBody>
+                    <a:bodyPr/>
+                    <a:lstStyle/>
+                    <a:p>
+                      <a:r>
+                        <a:rPr lang="en-US" dirty="0"/>
+                        <a:t>What is a Vector</a:t>
+                      </a:r>
+                    </a:p>
+                  </a:txBody>
+                  <a:tcPr/>
+                </a:tc>
+                <a:tc>
+                  <a:txBody>
+                    <a:bodyPr/>
+                    <a:lstStyle/>
+                    <a:p>
+                      <a:r>
+                        <a:rPr lang="en-US"/>
+                        <a:t>https://dev.to/pavanbelagatti/what-is-vector-similarity-search-2b6g</a:t>
+                      </a:r>
+                      <a:endParaRPr lang="en-US" dirty="0"/>
+                    </a:p>
+                  </a:txBody>
+                  <a:tcPr/>
+                </a:tc>
+                <a:extLst>
+                  <a:ext uri="{0D108BD9-81ED-4DB2-BD59-A6C34878D82A}">
+                    <a16:rowId xmlns:a16="http://schemas.microsoft.com/office/drawing/2014/main" val="1302689012"/>
+                  </a:ext>
+                </a:extLst>
+              </a:tr>
             </a:tbl>
           </a:graphicData>
         </a:graphic>
@@ -10837,7 +12363,7 @@
 </p:sld>
 </file>
 
-<file path=ppt/slides/slide12.xml><?xml version="1.0" encoding="utf-8"?>
+<file path=ppt/slides/slide17.xml><?xml version="1.0" encoding="utf-8"?>
 <p:sld xmlns:a="http://schemas.openxmlformats.org/drawingml/2006/main" xmlns:r="http://schemas.openxmlformats.org/officeDocument/2006/relationships" xmlns:p="http://schemas.openxmlformats.org/presentationml/2006/main">
   <p:cSld>
     <p:bg>
@@ -11085,14 +12611,14 @@
           </a:ln>
           <a:extLst>
             <a:ext uri="{909E8E84-426E-40dd-AFC4-6F175D3DCCD1}">
-              <a14:hiddenFill xmlns:a14="http://schemas.microsoft.com/office/drawing/2010/main" xmlns="">
+              <a14:hiddenFill xmlns="" xmlns:a14="http://schemas.microsoft.com/office/drawing/2010/main">
                 <a:solidFill>
                   <a:srgbClr val="FFFFFF"/>
                 </a:solidFill>
               </a14:hiddenFill>
             </a:ext>
             <a:ext uri="{91240B29-F687-4f45-9708-019B960494DF}">
-              <a14:hiddenLine xmlns:a14="http://schemas.microsoft.com/office/drawing/2010/main" xmlns="" w="9525">
+              <a14:hiddenLine xmlns="" xmlns:a14="http://schemas.microsoft.com/office/drawing/2010/main" w="9525">
                 <a:solidFill>
                   <a:srgbClr val="000000"/>
                 </a:solidFill>
@@ -12595,10 +14121,43 @@
       </p:grpSpPr>
       <p:sp>
         <p:nvSpPr>
+          <p:cNvPr id="2" name="Title 1">
+            <a:extLst>
+              <a:ext uri="{FF2B5EF4-FFF2-40B4-BE49-F238E27FC236}">
+                <a16:creationId xmlns:a16="http://schemas.microsoft.com/office/drawing/2014/main" id="{BAA82DF2-ED38-9831-16BC-5C7E79C73C55}"/>
+              </a:ext>
+            </a:extLst>
+          </p:cNvPr>
+          <p:cNvSpPr>
+            <a:spLocks noGrp="1"/>
+          </p:cNvSpPr>
+          <p:nvPr>
+            <p:ph type="title"/>
+          </p:nvPr>
+        </p:nvSpPr>
+        <p:spPr>
+          <a:xfrm>
+            <a:off x="321869" y="579120"/>
+            <a:ext cx="11548261" cy="541757"/>
+          </a:xfrm>
+        </p:spPr>
+        <p:txBody>
+          <a:bodyPr/>
+          <a:lstStyle/>
+          <a:p>
+            <a:r>
+              <a:rPr lang="en-US" dirty="0"/>
+              <a:t>PSA</a:t>
+            </a:r>
+          </a:p>
+        </p:txBody>
+      </p:sp>
+      <p:sp>
+        <p:nvSpPr>
           <p:cNvPr id="4" name="Slide Number Placeholder 3">
             <a:extLst>
               <a:ext uri="{FF2B5EF4-FFF2-40B4-BE49-F238E27FC236}">
-                <a16:creationId xmlns:a16="http://schemas.microsoft.com/office/drawing/2014/main" id="{25204BED-8881-888B-6A82-3BD7E1305D39}"/>
+                <a16:creationId xmlns:a16="http://schemas.microsoft.com/office/drawing/2014/main" id="{D34F525C-BF1A-359D-AB64-69C551CAB1D3}"/>
               </a:ext>
             </a:extLst>
           </p:cNvPr>
@@ -12623,43 +14182,83 @@
           </a:p>
         </p:txBody>
       </p:sp>
-      <p:pic>
-        <p:nvPicPr>
-          <p:cNvPr id="6" name="Picture 5" descr="A screenshot of a computer&#10;&#10;AI-generated content may be incorrect.">
+      <p:sp>
+        <p:nvSpPr>
+          <p:cNvPr id="6" name="TextBox 5">
             <a:extLst>
               <a:ext uri="{FF2B5EF4-FFF2-40B4-BE49-F238E27FC236}">
-                <a16:creationId xmlns:a16="http://schemas.microsoft.com/office/drawing/2014/main" id="{52A77FBD-8FB8-2A23-4739-9D0134E791F2}"/>
+                <a16:creationId xmlns:a16="http://schemas.microsoft.com/office/drawing/2014/main" id="{47590441-593A-7056-F595-BD16B454B222}"/>
               </a:ext>
             </a:extLst>
           </p:cNvPr>
-          <p:cNvPicPr>
-            <a:picLocks noChangeAspect="1"/>
-          </p:cNvPicPr>
+          <p:cNvSpPr txBox="1"/>
           <p:nvPr/>
-        </p:nvPicPr>
-        <p:blipFill>
-          <a:blip r:embed="rId2"/>
-          <a:stretch>
-            <a:fillRect/>
-          </a:stretch>
-        </p:blipFill>
+        </p:nvSpPr>
         <p:spPr>
           <a:xfrm>
-            <a:off x="1719853" y="748689"/>
-            <a:ext cx="8752294" cy="5360621"/>
+            <a:off x="875071" y="1809135"/>
+            <a:ext cx="7688826" cy="2308324"/>
           </a:xfrm>
           <a:prstGeom prst="rect">
             <a:avLst/>
           </a:prstGeom>
-          <a:solidFill>
-            <a:schemeClr val="bg1"/>
-          </a:solidFill>
+          <a:noFill/>
         </p:spPr>
-      </p:pic>
+        <p:txBody>
+          <a:bodyPr wrap="square" rtlCol="0">
+            <a:spAutoFit/>
+          </a:bodyPr>
+          <a:lstStyle/>
+          <a:p>
+            <a:r>
+              <a:rPr lang="en-US" dirty="0">
+                <a:solidFill>
+                  <a:schemeClr val="bg1"/>
+                </a:solidFill>
+              </a:rPr>
+              <a:t>AI and Deep Fake Technology has gotten to the point where can be difficult for even technology professionals identify fakes. </a:t>
+            </a:r>
+          </a:p>
+          <a:p>
+            <a:endParaRPr lang="en-US" dirty="0">
+              <a:solidFill>
+                <a:schemeClr val="bg1"/>
+              </a:solidFill>
+            </a:endParaRPr>
+          </a:p>
+          <a:p>
+            <a:r>
+              <a:rPr lang="en-US" dirty="0">
+                <a:solidFill>
+                  <a:schemeClr val="bg1"/>
+                </a:solidFill>
+              </a:rPr>
+              <a:t>Scammers are starting to use this technology to trick people.</a:t>
+            </a:r>
+          </a:p>
+          <a:p>
+            <a:endParaRPr lang="en-US" dirty="0">
+              <a:solidFill>
+                <a:schemeClr val="bg1"/>
+              </a:solidFill>
+            </a:endParaRPr>
+          </a:p>
+          <a:p>
+            <a:r>
+              <a:rPr lang="en-US" dirty="0">
+                <a:solidFill>
+                  <a:schemeClr val="bg1"/>
+                </a:solidFill>
+              </a:rPr>
+              <a:t>We all have friends and loved ones that are not technically versed as we are.  Please take time to warn them this technology exists and to be extra skeptical when seeing and hear things from the internet.</a:t>
+            </a:r>
+          </a:p>
+        </p:txBody>
+      </p:sp>
     </p:spTree>
     <p:extLst>
       <p:ext uri="{BB962C8B-B14F-4D97-AF65-F5344CB8AC3E}">
-        <p14:creationId xmlns:p14="http://schemas.microsoft.com/office/powerpoint/2010/main" val="2130301932"/>
+        <p14:creationId xmlns:p14="http://schemas.microsoft.com/office/powerpoint/2010/main" val="875799815"/>
       </p:ext>
     </p:extLst>
   </p:cSld>
@@ -12691,7 +14290,7 @@
           <p:cNvPr id="2" name="Title 1">
             <a:extLst>
               <a:ext uri="{FF2B5EF4-FFF2-40B4-BE49-F238E27FC236}">
-                <a16:creationId xmlns:a16="http://schemas.microsoft.com/office/drawing/2014/main" id="{88FE15A4-FDF7-E1B4-5A0D-4CD83B494A82}"/>
+                <a16:creationId xmlns:a16="http://schemas.microsoft.com/office/drawing/2014/main" id="{23FC8790-3D17-9E6C-C553-633802A1FCEF}"/>
               </a:ext>
             </a:extLst>
           </p:cNvPr>
@@ -12705,7 +14304,7 @@
         <p:spPr>
           <a:xfrm>
             <a:off x="321869" y="579120"/>
-            <a:ext cx="11548261" cy="590919"/>
+            <a:ext cx="11548261" cy="689241"/>
           </a:xfrm>
         </p:spPr>
         <p:txBody>
@@ -12714,7 +14313,7 @@
           <a:p>
             <a:r>
               <a:rPr lang="en-US" dirty="0"/>
-              <a:t>What is a Vector</a:t>
+              <a:t>What’s New SQL 2025 01</a:t>
             </a:r>
           </a:p>
         </p:txBody>
@@ -12724,7 +14323,7 @@
           <p:cNvPr id="4" name="Slide Number Placeholder 3">
             <a:extLst>
               <a:ext uri="{FF2B5EF4-FFF2-40B4-BE49-F238E27FC236}">
-                <a16:creationId xmlns:a16="http://schemas.microsoft.com/office/drawing/2014/main" id="{54453AE4-A5D7-889B-A7F5-30CC298DB7CB}"/>
+                <a16:creationId xmlns:a16="http://schemas.microsoft.com/office/drawing/2014/main" id="{94222919-A657-9D14-99D3-94BE5C121E32}"/>
               </a:ext>
             </a:extLst>
           </p:cNvPr>
@@ -12754,7 +14353,7 @@
           <p:cNvPr id="5" name="TextBox 4">
             <a:extLst>
               <a:ext uri="{FF2B5EF4-FFF2-40B4-BE49-F238E27FC236}">
-                <a16:creationId xmlns:a16="http://schemas.microsoft.com/office/drawing/2014/main" id="{90E73C3C-1218-55F2-4019-5749C7676374}"/>
+                <a16:creationId xmlns:a16="http://schemas.microsoft.com/office/drawing/2014/main" id="{38BB43CE-1391-6A36-7C1E-CB71EBB93955}"/>
               </a:ext>
             </a:extLst>
           </p:cNvPr>
@@ -12763,8 +14362,8 @@
         </p:nvSpPr>
         <p:spPr>
           <a:xfrm>
-            <a:off x="904569" y="1406014"/>
-            <a:ext cx="9389806" cy="3139321"/>
+            <a:off x="737419" y="2045110"/>
+            <a:ext cx="9379975" cy="4801314"/>
           </a:xfrm>
           <a:prstGeom prst="rect">
             <a:avLst/>
@@ -12777,128 +14376,217 @@
           </a:bodyPr>
           <a:lstStyle/>
           <a:p>
+            <a:pPr marL="285750" indent="-285750">
+              <a:buFont typeface="Arial" panose="020B0604020202020204" pitchFamily="34" charset="0"/>
+              <a:buChar char="•"/>
+            </a:pPr>
             <a:r>
               <a:rPr lang="en-US" dirty="0">
                 <a:solidFill>
-                  <a:schemeClr val="accent2">
-                    <a:lumMod val="20000"/>
-                    <a:lumOff val="80000"/>
-                  </a:schemeClr>
+                  <a:schemeClr val="bg1"/>
                 </a:solidFill>
               </a:rPr>
-              <a:t>A vector is a mathematical and physical object that has both </a:t>
-            </a:r>
-            <a:r>
-              <a:rPr lang="en-US" b="1" dirty="0">
-                <a:solidFill>
-                  <a:schemeClr val="accent2">
-                    <a:lumMod val="20000"/>
-                    <a:lumOff val="80000"/>
-                  </a:schemeClr>
+              <a:t>Edition Changes</a:t>
+            </a:r>
+          </a:p>
+          <a:p>
+            <a:pPr marL="285750" indent="-285750">
+              <a:buFont typeface="Arial" panose="020B0604020202020204" pitchFamily="34" charset="0"/>
+              <a:buChar char="•"/>
+            </a:pPr>
+            <a:r>
+              <a:rPr lang="en-US" dirty="0">
+                <a:solidFill>
+                  <a:schemeClr val="bg1"/>
                 </a:solidFill>
               </a:rPr>
-              <a:t>magnitude</a:t>
-            </a:r>
+              <a:t>AI</a:t>
+            </a:r>
+          </a:p>
+          <a:p>
+            <a:pPr marL="742950" lvl="1" indent="-285750">
+              <a:buFont typeface="Arial" panose="020B0604020202020204" pitchFamily="34" charset="0"/>
+              <a:buChar char="•"/>
+            </a:pPr>
             <a:r>
               <a:rPr lang="en-US" dirty="0">
                 <a:solidFill>
-                  <a:schemeClr val="accent2">
-                    <a:lumMod val="20000"/>
-                    <a:lumOff val="80000"/>
-                  </a:schemeClr>
+                  <a:schemeClr val="bg1"/>
                 </a:solidFill>
               </a:rPr>
-              <a:t> and </a:t>
-            </a:r>
-            <a:r>
-              <a:rPr lang="en-US" b="1" dirty="0">
-                <a:solidFill>
-                  <a:schemeClr val="accent2">
-                    <a:lumMod val="20000"/>
-                    <a:lumOff val="80000"/>
-                  </a:schemeClr>
+              <a:t>Copilot for SSMS</a:t>
+            </a:r>
+          </a:p>
+          <a:p>
+            <a:pPr marL="742950" lvl="1" indent="-285750">
+              <a:buFont typeface="Arial" panose="020B0604020202020204" pitchFamily="34" charset="0"/>
+              <a:buChar char="•"/>
+            </a:pPr>
+            <a:r>
+              <a:rPr lang="en-US" dirty="0">
+                <a:solidFill>
+                  <a:schemeClr val="bg1"/>
                 </a:solidFill>
               </a:rPr>
-              <a:t>direction</a:t>
-            </a:r>
+              <a:t>Vector data type (coming up)</a:t>
+            </a:r>
+          </a:p>
+          <a:p>
+            <a:pPr marL="285750" indent="-285750">
+              <a:buFont typeface="Arial" panose="020B0604020202020204" pitchFamily="34" charset="0"/>
+              <a:buChar char="•"/>
+            </a:pPr>
             <a:r>
               <a:rPr lang="en-US" dirty="0">
                 <a:solidFill>
-                  <a:schemeClr val="accent2">
-                    <a:lumMod val="20000"/>
-                    <a:lumOff val="80000"/>
-                  </a:schemeClr>
+                  <a:schemeClr val="bg1"/>
                 </a:solidFill>
               </a:rPr>
-              <a:t>.</a:t>
-            </a:r>
-          </a:p>
-          <a:p>
+              <a:t>Developer</a:t>
+            </a:r>
+          </a:p>
+          <a:p>
+            <a:pPr marL="742950" lvl="1" indent="-285750">
+              <a:buFont typeface="Arial" panose="020B0604020202020204" pitchFamily="34" charset="0"/>
+              <a:buChar char="•"/>
+            </a:pPr>
+            <a:r>
+              <a:rPr lang="en-US" dirty="0">
+                <a:solidFill>
+                  <a:schemeClr val="bg1"/>
+                </a:solidFill>
+              </a:rPr>
+              <a:t>CES (Change Event Streaming)</a:t>
+            </a:r>
+          </a:p>
+          <a:p>
+            <a:pPr marL="742950" lvl="1" indent="-285750">
+              <a:buFont typeface="Arial" panose="020B0604020202020204" pitchFamily="34" charset="0"/>
+              <a:buChar char="•"/>
+            </a:pPr>
+            <a:r>
+              <a:rPr lang="en-US" dirty="0">
+                <a:solidFill>
+                  <a:schemeClr val="bg1"/>
+                </a:solidFill>
+              </a:rPr>
+              <a:t>Fuzzy string matching</a:t>
+            </a:r>
+          </a:p>
+          <a:p>
+            <a:pPr marL="742950" lvl="1" indent="-285750">
+              <a:buFont typeface="Arial" panose="020B0604020202020204" pitchFamily="34" charset="0"/>
+              <a:buChar char="•"/>
+            </a:pPr>
+            <a:r>
+              <a:rPr lang="en-US" dirty="0">
+                <a:solidFill>
+                  <a:schemeClr val="bg1"/>
+                </a:solidFill>
+              </a:rPr>
+              <a:t>Regular Expressions</a:t>
+            </a:r>
+          </a:p>
+          <a:p>
+            <a:pPr marL="742950" lvl="1" indent="-285750">
+              <a:buFont typeface="Arial" panose="020B0604020202020204" pitchFamily="34" charset="0"/>
+              <a:buChar char="•"/>
+            </a:pPr>
+            <a:r>
+              <a:rPr lang="en-US" dirty="0" err="1">
+                <a:solidFill>
+                  <a:schemeClr val="bg1"/>
+                </a:solidFill>
+              </a:rPr>
+              <a:t>Sp_invoke_external_rest_endpoint</a:t>
+            </a:r>
             <a:endParaRPr lang="en-US" dirty="0">
               <a:solidFill>
-                <a:schemeClr val="accent2">
-                  <a:lumMod val="20000"/>
-                  <a:lumOff val="80000"/>
-                </a:schemeClr>
+                <a:schemeClr val="bg1"/>
               </a:solidFill>
             </a:endParaRPr>
           </a:p>
           <a:p>
+            <a:pPr marL="742950" lvl="1" indent="-285750">
+              <a:buFont typeface="Arial" panose="020B0604020202020204" pitchFamily="34" charset="0"/>
+              <a:buChar char="•"/>
+            </a:pPr>
             <a:r>
               <a:rPr lang="en-US" dirty="0">
                 <a:solidFill>
-                  <a:schemeClr val="accent2">
-                    <a:lumMod val="20000"/>
-                    <a:lumOff val="80000"/>
-                  </a:schemeClr>
+                  <a:schemeClr val="bg1"/>
                 </a:solidFill>
               </a:rPr>
-              <a:t>In SQL 2025:</a:t>
-            </a:r>
-          </a:p>
-          <a:p>
+              <a:t>JSON data type (coming up)</a:t>
+            </a:r>
+          </a:p>
+          <a:p>
+            <a:pPr marL="742950" lvl="1" indent="-285750">
+              <a:buFont typeface="Arial" panose="020B0604020202020204" pitchFamily="34" charset="0"/>
+              <a:buChar char="•"/>
+            </a:pPr>
+            <a:r>
+              <a:rPr lang="en-US" dirty="0">
+                <a:solidFill>
+                  <a:schemeClr val="bg1"/>
+                </a:solidFill>
+              </a:rPr>
+              <a:t>Performance on math functions</a:t>
+            </a:r>
+          </a:p>
+          <a:p>
+            <a:pPr marL="742950" lvl="1" indent="-285750">
+              <a:buFont typeface="Arial" panose="020B0604020202020204" pitchFamily="34" charset="0"/>
+              <a:buChar char="•"/>
+            </a:pPr>
+            <a:r>
+              <a:rPr lang="en-US" dirty="0">
+                <a:solidFill>
+                  <a:schemeClr val="bg1"/>
+                </a:solidFill>
+              </a:rPr>
+              <a:t>DATETRUNC</a:t>
+            </a:r>
+          </a:p>
+          <a:p>
+            <a:pPr marL="742950" lvl="1" indent="-285750">
+              <a:buFont typeface="Arial" panose="020B0604020202020204" pitchFamily="34" charset="0"/>
+              <a:buChar char="•"/>
+            </a:pPr>
+            <a:r>
+              <a:rPr lang="en-US" dirty="0">
+                <a:solidFill>
+                  <a:schemeClr val="bg1"/>
+                </a:solidFill>
+              </a:rPr>
+              <a:t>New Chinese collations</a:t>
+            </a:r>
+          </a:p>
+          <a:p>
+            <a:pPr marL="742950" lvl="1" indent="-285750">
+              <a:buFont typeface="Arial" panose="020B0604020202020204" pitchFamily="34" charset="0"/>
+              <a:buChar char="•"/>
+            </a:pPr>
             <a:endParaRPr lang="en-US" dirty="0">
               <a:solidFill>
-                <a:schemeClr val="accent2">
-                  <a:lumMod val="20000"/>
-                  <a:lumOff val="80000"/>
-                </a:schemeClr>
+                <a:schemeClr val="bg1"/>
               </a:solidFill>
             </a:endParaRPr>
           </a:p>
           <a:p>
-            <a:pPr lvl="1"/>
             <a:r>
               <a:rPr lang="en-US" dirty="0">
                 <a:solidFill>
-                  <a:schemeClr val="accent2">
-                    <a:lumMod val="20000"/>
-                    <a:lumOff val="80000"/>
-                  </a:schemeClr>
+                  <a:schemeClr val="bg1"/>
                 </a:solidFill>
               </a:rPr>
-              <a:t>In SQL Server 2025, a vector refers to a new data type designed to store and manage numerical representations of data, particularly for AI and machine learning applications. These numerical representations are often called embeddings.  Used to do similarity search and or logical distance.</a:t>
-            </a:r>
-          </a:p>
-          <a:p>
-            <a:pPr lvl="1"/>
+              <a:t>	</a:t>
+            </a:r>
+          </a:p>
+          <a:p>
             <a:endParaRPr lang="en-US" dirty="0">
               <a:solidFill>
-                <a:schemeClr val="accent2">
-                  <a:lumMod val="20000"/>
-                  <a:lumOff val="80000"/>
-                </a:schemeClr>
-              </a:solidFill>
-            </a:endParaRPr>
-          </a:p>
-          <a:p>
-            <a:pPr lvl="1"/>
-            <a:endParaRPr lang="en-US" dirty="0">
-              <a:solidFill>
-                <a:schemeClr val="accent2">
-                  <a:lumMod val="20000"/>
-                  <a:lumOff val="80000"/>
-                </a:schemeClr>
+                <a:schemeClr val="bg1"/>
               </a:solidFill>
             </a:endParaRPr>
           </a:p>
@@ -12910,7 +14598,7 @@
     </p:spTree>
     <p:extLst>
       <p:ext uri="{BB962C8B-B14F-4D97-AF65-F5344CB8AC3E}">
-        <p14:creationId xmlns:p14="http://schemas.microsoft.com/office/powerpoint/2010/main" val="1155694617"/>
+        <p14:creationId xmlns:p14="http://schemas.microsoft.com/office/powerpoint/2010/main" val="3168296403"/>
       </p:ext>
     </p:extLst>
   </p:cSld>
@@ -12925,13 +14613,7 @@
   <p:cSld>
     <p:spTree>
       <p:nvGrpSpPr>
-        <p:cNvPr id="1" name="">
-          <a:extLst>
-            <a:ext uri="{FF2B5EF4-FFF2-40B4-BE49-F238E27FC236}">
-              <a16:creationId xmlns:a16="http://schemas.microsoft.com/office/drawing/2014/main" id="{C84C1D80-19AE-9AD7-9544-1EF4566EFCA7}"/>
-            </a:ext>
-          </a:extLst>
-        </p:cNvPr>
+        <p:cNvPr id="1" name=""/>
         <p:cNvGrpSpPr/>
         <p:nvPr/>
       </p:nvGrpSpPr>
@@ -12948,7 +14630,7 @@
           <p:cNvPr id="2" name="Title 1">
             <a:extLst>
               <a:ext uri="{FF2B5EF4-FFF2-40B4-BE49-F238E27FC236}">
-                <a16:creationId xmlns:a16="http://schemas.microsoft.com/office/drawing/2014/main" id="{D23A2242-E41D-DCE7-E2FA-0F228DB5A5C9}"/>
+                <a16:creationId xmlns:a16="http://schemas.microsoft.com/office/drawing/2014/main" id="{DD6A76EF-5A06-FFE1-EED2-DE7710D097F3}"/>
               </a:ext>
             </a:extLst>
           </p:cNvPr>
@@ -12962,7 +14644,7 @@
         <p:spPr>
           <a:xfrm>
             <a:off x="321869" y="579120"/>
-            <a:ext cx="11548261" cy="590919"/>
+            <a:ext cx="11548261" cy="531925"/>
           </a:xfrm>
         </p:spPr>
         <p:txBody>
@@ -12971,7 +14653,7 @@
           <a:p>
             <a:r>
               <a:rPr lang="en-US" dirty="0"/>
-              <a:t>Vector Data type</a:t>
+              <a:t>What’s New 2025 02</a:t>
             </a:r>
           </a:p>
         </p:txBody>
@@ -12981,7 +14663,7 @@
           <p:cNvPr id="4" name="Slide Number Placeholder 3">
             <a:extLst>
               <a:ext uri="{FF2B5EF4-FFF2-40B4-BE49-F238E27FC236}">
-                <a16:creationId xmlns:a16="http://schemas.microsoft.com/office/drawing/2014/main" id="{C1DA1988-30A1-BAE5-E8B0-CF491831A3FB}"/>
+                <a16:creationId xmlns:a16="http://schemas.microsoft.com/office/drawing/2014/main" id="{CA22DF90-0D09-D013-0A40-B095E5E8A1DF}"/>
               </a:ext>
             </a:extLst>
           </p:cNvPr>
@@ -13011,7 +14693,7 @@
           <p:cNvPr id="5" name="TextBox 4">
             <a:extLst>
               <a:ext uri="{FF2B5EF4-FFF2-40B4-BE49-F238E27FC236}">
-                <a16:creationId xmlns:a16="http://schemas.microsoft.com/office/drawing/2014/main" id="{CC18A7CB-7F3C-A6AF-4739-CDEC843331B5}"/>
+                <a16:creationId xmlns:a16="http://schemas.microsoft.com/office/drawing/2014/main" id="{7BE4701A-3100-A0FF-C2AB-9F0E8CF73B2A}"/>
               </a:ext>
             </a:extLst>
           </p:cNvPr>
@@ -13020,8 +14702,8 @@
         </p:nvSpPr>
         <p:spPr>
           <a:xfrm>
-            <a:off x="904569" y="1406014"/>
-            <a:ext cx="9389806" cy="5078313"/>
+            <a:off x="648929" y="1524000"/>
+            <a:ext cx="9714271" cy="4801314"/>
           </a:xfrm>
           <a:prstGeom prst="rect">
             <a:avLst/>
@@ -13034,89 +14716,59 @@
           </a:bodyPr>
           <a:lstStyle/>
           <a:p>
-            <a:pPr lvl="1"/>
+            <a:pPr marL="285750" indent="-285750">
+              <a:buFont typeface="Arial" panose="020B0604020202020204" pitchFamily="34" charset="0"/>
+              <a:buChar char="•"/>
+            </a:pPr>
             <a:r>
               <a:rPr lang="en-US" dirty="0">
                 <a:solidFill>
-                  <a:schemeClr val="accent2">
-                    <a:lumMod val="20000"/>
-                    <a:lumOff val="80000"/>
-                  </a:schemeClr>
+                  <a:schemeClr val="bg1"/>
                 </a:solidFill>
               </a:rPr>
-              <a:t>Stored as a </a:t>
-            </a:r>
-            <a:r>
-              <a:rPr lang="en-US" dirty="0" err="1">
-                <a:solidFill>
-                  <a:schemeClr val="accent2">
-                    <a:lumMod val="20000"/>
-                    <a:lumOff val="80000"/>
-                  </a:schemeClr>
+              <a:t>Analytics</a:t>
+            </a:r>
+          </a:p>
+          <a:p>
+            <a:pPr marL="742950" lvl="1" indent="-285750">
+              <a:buFont typeface="Arial" panose="020B0604020202020204" pitchFamily="34" charset="0"/>
+              <a:buChar char="•"/>
+            </a:pPr>
+            <a:r>
+              <a:rPr lang="en-US" dirty="0">
+                <a:solidFill>
+                  <a:schemeClr val="bg1"/>
                 </a:solidFill>
               </a:rPr>
-              <a:t>varbinary</a:t>
-            </a:r>
-            <a:endParaRPr lang="en-US" dirty="0">
-              <a:solidFill>
-                <a:schemeClr val="accent2">
-                  <a:lumMod val="20000"/>
-                  <a:lumOff val="80000"/>
-                </a:schemeClr>
-              </a:solidFill>
-            </a:endParaRPr>
-          </a:p>
-          <a:p>
-            <a:pPr lvl="1"/>
+              <a:t>PolyBase enhancements</a:t>
+            </a:r>
+          </a:p>
+          <a:p>
+            <a:pPr marL="285750" indent="-285750">
+              <a:buFont typeface="Arial" panose="020B0604020202020204" pitchFamily="34" charset="0"/>
+              <a:buChar char="•"/>
+            </a:pPr>
             <a:r>
               <a:rPr lang="en-US" dirty="0">
                 <a:solidFill>
-                  <a:schemeClr val="accent2">
-                    <a:lumMod val="20000"/>
-                    <a:lumOff val="80000"/>
-                  </a:schemeClr>
+                  <a:schemeClr val="bg1"/>
                 </a:solidFill>
               </a:rPr>
-              <a:t>Looks like an array of floating point (float32 or float16)</a:t>
-            </a:r>
-          </a:p>
-          <a:p>
-            <a:pPr lvl="1"/>
+              <a:t>Availability and disaster recovery</a:t>
+            </a:r>
+          </a:p>
+          <a:p>
+            <a:pPr marL="742950" lvl="1" indent="-285750">
+              <a:buFont typeface="Arial" panose="020B0604020202020204" pitchFamily="34" charset="0"/>
+              <a:buChar char="•"/>
+            </a:pPr>
             <a:r>
               <a:rPr lang="en-US" dirty="0">
                 <a:solidFill>
-                  <a:schemeClr val="accent2">
-                    <a:lumMod val="20000"/>
-                    <a:lumOff val="80000"/>
-                  </a:schemeClr>
+                  <a:schemeClr val="bg1"/>
                 </a:solidFill>
               </a:rPr>
-              <a:t>JSON format used</a:t>
-            </a:r>
-          </a:p>
-          <a:p>
-            <a:pPr lvl="1"/>
-            <a:endParaRPr lang="en-US" dirty="0">
-              <a:solidFill>
-                <a:schemeClr val="accent2">
-                  <a:lumMod val="20000"/>
-                  <a:lumOff val="80000"/>
-                </a:schemeClr>
-              </a:solidFill>
-            </a:endParaRPr>
-          </a:p>
-          <a:p>
-            <a:pPr lvl="1"/>
-            <a:r>
-              <a:rPr lang="en-US" dirty="0">
-                <a:solidFill>
-                  <a:schemeClr val="accent2">
-                    <a:lumMod val="20000"/>
-                    <a:lumOff val="80000"/>
-                  </a:schemeClr>
-                </a:solidFill>
-              </a:rPr>
-              <a:t>Limitations </a:t>
+              <a:t>Always On availability groups</a:t>
             </a:r>
           </a:p>
           <a:p>
@@ -13127,13 +14779,10 @@
             <a:r>
               <a:rPr lang="en-US" dirty="0">
                 <a:solidFill>
-                  <a:schemeClr val="accent2">
-                    <a:lumMod val="20000"/>
-                    <a:lumOff val="80000"/>
-                  </a:schemeClr>
+                  <a:schemeClr val="bg1"/>
                 </a:solidFill>
               </a:rPr>
-              <a:t>Holds up to 1998 dimensions</a:t>
+              <a:t>Better Performance</a:t>
             </a:r>
           </a:p>
           <a:p>
@@ -13144,13 +14793,10 @@
             <a:r>
               <a:rPr lang="en-US" dirty="0">
                 <a:solidFill>
-                  <a:schemeClr val="accent2">
-                    <a:lumMod val="20000"/>
-                    <a:lumOff val="80000"/>
-                  </a:schemeClr>
+                  <a:schemeClr val="bg1"/>
                 </a:solidFill>
               </a:rPr>
-              <a:t>Check and Default constraints nor not support for Vector columns</a:t>
+              <a:t>LISTENER (remove IP)</a:t>
             </a:r>
           </a:p>
           <a:p>
@@ -13161,13 +14807,24 @@
             <a:r>
               <a:rPr lang="en-US" dirty="0">
                 <a:solidFill>
-                  <a:schemeClr val="accent2">
-                    <a:lumMod val="20000"/>
-                    <a:lumOff val="80000"/>
-                  </a:schemeClr>
+                  <a:schemeClr val="bg1"/>
                 </a:solidFill>
               </a:rPr>
-              <a:t>Foreign key and primary key constraints not supported</a:t>
+              <a:t>TLS 1.3 with TDS 8.0</a:t>
+            </a:r>
+          </a:p>
+          <a:p>
+            <a:pPr marL="742950" lvl="1" indent="-285750">
+              <a:buFont typeface="Arial" panose="020B0604020202020204" pitchFamily="34" charset="0"/>
+              <a:buChar char="•"/>
+            </a:pPr>
+            <a:r>
+              <a:rPr lang="en-US" dirty="0">
+                <a:solidFill>
+                  <a:schemeClr val="bg1"/>
+                </a:solidFill>
+              </a:rPr>
+              <a:t>Backups</a:t>
             </a:r>
           </a:p>
           <a:p>
@@ -13178,13 +14835,10 @@
             <a:r>
               <a:rPr lang="en-US" dirty="0">
                 <a:solidFill>
-                  <a:schemeClr val="accent2">
-                    <a:lumMod val="20000"/>
-                    <a:lumOff val="80000"/>
-                  </a:schemeClr>
+                  <a:schemeClr val="bg1"/>
                 </a:solidFill>
               </a:rPr>
-              <a:t>Most function other than the new Vector type functions will not work correctly</a:t>
+              <a:t>Azure Immutable storage support</a:t>
             </a:r>
           </a:p>
           <a:p>
@@ -13195,13 +14849,10 @@
             <a:r>
               <a:rPr lang="en-US" dirty="0">
                 <a:solidFill>
-                  <a:schemeClr val="accent2">
-                    <a:lumMod val="20000"/>
-                    <a:lumOff val="80000"/>
-                  </a:schemeClr>
+                  <a:schemeClr val="bg1"/>
                 </a:solidFill>
               </a:rPr>
-              <a:t>Memory-Optimized table not support</a:t>
+              <a:t>Full and Differential on secondary</a:t>
             </a:r>
           </a:p>
           <a:p>
@@ -13212,13 +14863,24 @@
             <a:r>
               <a:rPr lang="en-US" dirty="0">
                 <a:solidFill>
-                  <a:schemeClr val="accent2">
-                    <a:lumMod val="20000"/>
-                    <a:lumOff val="80000"/>
-                  </a:schemeClr>
+                  <a:schemeClr val="bg1"/>
                 </a:solidFill>
               </a:rPr>
-              <a:t>Always Encrypted not support</a:t>
+              <a:t>Log shipping supports TLS 1.3 with TDS 8.0</a:t>
+            </a:r>
+          </a:p>
+          <a:p>
+            <a:pPr marL="742950" lvl="1" indent="-285750">
+              <a:buFont typeface="Arial" panose="020B0604020202020204" pitchFamily="34" charset="0"/>
+              <a:buChar char="•"/>
+            </a:pPr>
+            <a:r>
+              <a:rPr lang="en-US" dirty="0">
+                <a:solidFill>
+                  <a:schemeClr val="bg1"/>
+                </a:solidFill>
+              </a:rPr>
+              <a:t>Security</a:t>
             </a:r>
           </a:p>
           <a:p>
@@ -13229,89 +14891,69 @@
             <a:r>
               <a:rPr lang="en-US" dirty="0">
                 <a:solidFill>
-                  <a:schemeClr val="accent2">
-                    <a:lumMod val="20000"/>
-                    <a:lumOff val="80000"/>
-                  </a:schemeClr>
+                  <a:schemeClr val="bg1"/>
                 </a:solidFill>
               </a:rPr>
-              <a:t>No indexes expect for new vector index type on vector columns</a:t>
-            </a:r>
-          </a:p>
-          <a:p>
-            <a:pPr lvl="1"/>
+              <a:t>A number of enhancements</a:t>
+            </a:r>
+          </a:p>
+          <a:p>
+            <a:pPr marL="1200150" lvl="2" indent="-285750">
+              <a:buFont typeface="Arial" panose="020B0604020202020204" pitchFamily="34" charset="0"/>
+              <a:buChar char="•"/>
+            </a:pPr>
+            <a:r>
+              <a:rPr lang="en-US" dirty="0" err="1">
+                <a:solidFill>
+                  <a:schemeClr val="bg1"/>
+                </a:solidFill>
+              </a:rPr>
+              <a:t>Bcp</a:t>
+            </a:r>
+            <a:r>
+              <a:rPr lang="en-US" dirty="0">
+                <a:solidFill>
+                  <a:schemeClr val="bg1"/>
+                </a:solidFill>
+              </a:rPr>
+              <a:t> and </a:t>
+            </a:r>
+            <a:r>
+              <a:rPr lang="en-US" dirty="0" err="1">
+                <a:solidFill>
+                  <a:schemeClr val="bg1"/>
+                </a:solidFill>
+              </a:rPr>
+              <a:t>sqlcmd</a:t>
+            </a:r>
+            <a:r>
+              <a:rPr lang="en-US" dirty="0">
+                <a:solidFill>
+                  <a:schemeClr val="bg1"/>
+                </a:solidFill>
+              </a:rPr>
+              <a:t> Authentication enhancements </a:t>
+            </a:r>
+          </a:p>
+          <a:p>
+            <a:pPr marL="1200150" lvl="2" indent="-285750">
+              <a:buFont typeface="Arial" panose="020B0604020202020204" pitchFamily="34" charset="0"/>
+              <a:buChar char="•"/>
+            </a:pPr>
             <a:endParaRPr lang="en-US" dirty="0">
               <a:solidFill>
-                <a:schemeClr val="accent2">
-                  <a:lumMod val="20000"/>
-                  <a:lumOff val="80000"/>
-                </a:schemeClr>
+                <a:schemeClr val="bg1"/>
               </a:solidFill>
             </a:endParaRPr>
           </a:p>
           <a:p>
-            <a:pPr lvl="1"/>
-            <a:r>
-              <a:rPr lang="en-US" dirty="0">
-                <a:solidFill>
-                  <a:schemeClr val="accent2">
-                    <a:lumMod val="20000"/>
-                    <a:lumOff val="80000"/>
-                  </a:schemeClr>
-                </a:solidFill>
-              </a:rPr>
-              <a:t>New Vector index using </a:t>
-            </a:r>
-            <a:r>
-              <a:rPr lang="en-US" dirty="0" err="1">
-                <a:solidFill>
-                  <a:schemeClr val="accent2">
-                    <a:lumMod val="20000"/>
-                    <a:lumOff val="80000"/>
-                  </a:schemeClr>
-                </a:solidFill>
-              </a:rPr>
-              <a:t>DiskANN</a:t>
-            </a:r>
+            <a:pPr marL="285750" indent="-285750">
+              <a:buFont typeface="Arial" panose="020B0604020202020204" pitchFamily="34" charset="0"/>
+              <a:buChar char="•"/>
+            </a:pPr>
             <a:endParaRPr lang="en-US" dirty="0">
               <a:solidFill>
-                <a:schemeClr val="accent2">
-                  <a:lumMod val="20000"/>
-                  <a:lumOff val="80000"/>
-                </a:schemeClr>
-              </a:solidFill>
-            </a:endParaRPr>
-          </a:p>
-          <a:p>
-            <a:pPr lvl="1"/>
-            <a:endParaRPr lang="en-US" dirty="0">
-              <a:solidFill>
-                <a:schemeClr val="accent2">
-                  <a:lumMod val="20000"/>
-                  <a:lumOff val="80000"/>
-                </a:schemeClr>
-              </a:solidFill>
-            </a:endParaRPr>
-          </a:p>
-          <a:p>
-            <a:pPr lvl="1"/>
-            <a:endParaRPr lang="en-US" dirty="0">
-              <a:solidFill>
-                <a:schemeClr val="accent2">
-                  <a:lumMod val="20000"/>
-                  <a:lumOff val="80000"/>
-                </a:schemeClr>
-              </a:solidFill>
-            </a:endParaRPr>
-          </a:p>
-          <a:p>
-            <a:pPr lvl="1"/>
-            <a:endParaRPr lang="en-US" dirty="0">
-              <a:solidFill>
-                <a:schemeClr val="accent2">
-                  <a:lumMod val="20000"/>
-                  <a:lumOff val="80000"/>
-                </a:schemeClr>
+                <a:schemeClr val="bg1"/>
               </a:solidFill>
             </a:endParaRPr>
           </a:p>
@@ -13323,7 +14965,7 @@
     </p:spTree>
     <p:extLst>
       <p:ext uri="{BB962C8B-B14F-4D97-AF65-F5344CB8AC3E}">
-        <p14:creationId xmlns:p14="http://schemas.microsoft.com/office/powerpoint/2010/main" val="582232591"/>
+        <p14:creationId xmlns:p14="http://schemas.microsoft.com/office/powerpoint/2010/main" val="1570997669"/>
       </p:ext>
     </p:extLst>
   </p:cSld>
@@ -13355,7 +14997,7 @@
           <p:cNvPr id="2" name="Title 1">
             <a:extLst>
               <a:ext uri="{FF2B5EF4-FFF2-40B4-BE49-F238E27FC236}">
-                <a16:creationId xmlns:a16="http://schemas.microsoft.com/office/drawing/2014/main" id="{718C5A32-2572-96A5-EBB3-09019F61350F}"/>
+                <a16:creationId xmlns:a16="http://schemas.microsoft.com/office/drawing/2014/main" id="{A9E63497-A1B5-F0CD-CA49-3A269F4069FD}"/>
               </a:ext>
             </a:extLst>
           </p:cNvPr>
@@ -13369,7 +15011,7 @@
         <p:spPr>
           <a:xfrm>
             <a:off x="321869" y="579120"/>
-            <a:ext cx="11548261" cy="482764"/>
+            <a:ext cx="11548261" cy="492596"/>
           </a:xfrm>
         </p:spPr>
         <p:txBody>
@@ -13378,7 +15020,7 @@
           <a:p>
             <a:r>
               <a:rPr lang="en-US" dirty="0"/>
-              <a:t>Demo Setup</a:t>
+              <a:t>What’s New SQL 2025 03</a:t>
             </a:r>
           </a:p>
         </p:txBody>
@@ -13388,7 +15030,7 @@
           <p:cNvPr id="4" name="Slide Number Placeholder 3">
             <a:extLst>
               <a:ext uri="{FF2B5EF4-FFF2-40B4-BE49-F238E27FC236}">
-                <a16:creationId xmlns:a16="http://schemas.microsoft.com/office/drawing/2014/main" id="{2A810734-4519-D94F-D397-E200457B763D}"/>
+                <a16:creationId xmlns:a16="http://schemas.microsoft.com/office/drawing/2014/main" id="{47D6D380-8F91-B683-E4FD-793894D5764D}"/>
               </a:ext>
             </a:extLst>
           </p:cNvPr>
@@ -13418,7 +15060,7 @@
           <p:cNvPr id="5" name="TextBox 4">
             <a:extLst>
               <a:ext uri="{FF2B5EF4-FFF2-40B4-BE49-F238E27FC236}">
-                <a16:creationId xmlns:a16="http://schemas.microsoft.com/office/drawing/2014/main" id="{96D9EF59-16FB-1C65-3A5C-E878ADEA2979}"/>
+                <a16:creationId xmlns:a16="http://schemas.microsoft.com/office/drawing/2014/main" id="{60B2FC84-A612-D481-0035-36C79F5BB1AF}"/>
               </a:ext>
             </a:extLst>
           </p:cNvPr>
@@ -13427,8 +15069,8 @@
         </p:nvSpPr>
         <p:spPr>
           <a:xfrm>
-            <a:off x="924231" y="1297858"/>
-            <a:ext cx="7806813" cy="3139321"/>
+            <a:off x="688258" y="1632155"/>
+            <a:ext cx="9576619" cy="3693319"/>
           </a:xfrm>
           <a:prstGeom prst="rect">
             <a:avLst/>
@@ -13446,179 +15088,206 @@
               <a:buChar char="•"/>
             </a:pPr>
             <a:r>
-              <a:rPr lang="en-US" u="sng" dirty="0">
-                <a:solidFill>
-                  <a:schemeClr val="accent2">
-                    <a:lumMod val="20000"/>
-                    <a:lumOff val="80000"/>
-                  </a:schemeClr>
+              <a:rPr lang="en-US" dirty="0">
+                <a:solidFill>
+                  <a:schemeClr val="bg1"/>
                 </a:solidFill>
               </a:rPr>
-              <a:t>SQL 2025 Developer Edition</a:t>
-            </a:r>
-          </a:p>
-          <a:p>
-            <a:pPr marL="285750" indent="-285750">
+              <a:t>Database Engine</a:t>
+            </a:r>
+          </a:p>
+          <a:p>
+            <a:pPr marL="742950" lvl="1" indent="-285750">
               <a:buFont typeface="Arial" panose="020B0604020202020204" pitchFamily="34" charset="0"/>
               <a:buChar char="•"/>
             </a:pPr>
             <a:r>
-              <a:rPr lang="en-US" u="sng" dirty="0">
-                <a:solidFill>
-                  <a:schemeClr val="accent2">
-                    <a:lumMod val="20000"/>
-                    <a:lumOff val="80000"/>
-                  </a:schemeClr>
+              <a:rPr lang="en-US" dirty="0">
+                <a:solidFill>
+                  <a:schemeClr val="bg1"/>
                 </a:solidFill>
               </a:rPr>
-              <a:t>SQL Server Management Studio version 22</a:t>
-            </a:r>
-          </a:p>
-          <a:p>
-            <a:pPr marL="285750" indent="-285750">
+              <a:t>Optimized locking</a:t>
+            </a:r>
+          </a:p>
+          <a:p>
+            <a:pPr marL="742950" lvl="1" indent="-285750">
               <a:buFont typeface="Arial" panose="020B0604020202020204" pitchFamily="34" charset="0"/>
               <a:buChar char="•"/>
             </a:pPr>
             <a:r>
-              <a:rPr lang="en-US" u="sng" dirty="0">
-                <a:solidFill>
-                  <a:schemeClr val="accent2">
-                    <a:lumMod val="20000"/>
-                    <a:lumOff val="80000"/>
-                  </a:schemeClr>
+              <a:rPr lang="en-US" dirty="0">
+                <a:solidFill>
+                  <a:schemeClr val="bg1"/>
                 </a:solidFill>
               </a:rPr>
-              <a:t>Ollama (local model)</a:t>
-            </a:r>
-          </a:p>
-          <a:p>
-            <a:pPr marL="285750" indent="-285750">
+              <a:t>TempDB space in resource governance</a:t>
+            </a:r>
+          </a:p>
+          <a:p>
+            <a:pPr marL="742950" lvl="1" indent="-285750">
               <a:buFont typeface="Arial" panose="020B0604020202020204" pitchFamily="34" charset="0"/>
               <a:buChar char="•"/>
             </a:pPr>
             <a:r>
-              <a:rPr lang="en-US" u="sng" dirty="0">
-                <a:solidFill>
-                  <a:schemeClr val="accent2">
-                    <a:lumMod val="20000"/>
-                    <a:lumOff val="80000"/>
-                  </a:schemeClr>
+              <a:rPr lang="en-US" dirty="0">
+                <a:solidFill>
+                  <a:schemeClr val="bg1"/>
                 </a:solidFill>
               </a:rPr>
-              <a:t>OpenSSL (generate certificate)</a:t>
-            </a:r>
-          </a:p>
-          <a:p>
-            <a:pPr marL="285750" indent="-285750">
+              <a:t>ADR in TempDB</a:t>
+            </a:r>
+          </a:p>
+          <a:p>
+            <a:pPr marL="742950" lvl="1" indent="-285750">
               <a:buFont typeface="Arial" panose="020B0604020202020204" pitchFamily="34" charset="0"/>
               <a:buChar char="•"/>
             </a:pPr>
             <a:r>
-              <a:rPr lang="en-US" u="sng" dirty="0">
-                <a:solidFill>
-                  <a:schemeClr val="accent2">
-                    <a:lumMod val="20000"/>
-                    <a:lumOff val="80000"/>
-                  </a:schemeClr>
+              <a:rPr lang="en-US" dirty="0">
+                <a:solidFill>
+                  <a:schemeClr val="bg1"/>
                 </a:solidFill>
               </a:rPr>
-              <a:t>NGINX (HTTPS service)</a:t>
-            </a:r>
-          </a:p>
-          <a:p>
-            <a:pPr marL="285750" indent="-285750">
+              <a:t>Persisted statistics for readable secondaries thru Query Store</a:t>
+            </a:r>
+          </a:p>
+          <a:p>
+            <a:pPr marL="742950" lvl="1" indent="-285750">
               <a:buFont typeface="Arial" panose="020B0604020202020204" pitchFamily="34" charset="0"/>
               <a:buChar char="•"/>
             </a:pPr>
             <a:r>
-              <a:rPr lang="en-US" u="sng" dirty="0">
-                <a:solidFill>
-                  <a:schemeClr val="accent2">
-                    <a:lumMod val="20000"/>
-                    <a:lumOff val="80000"/>
-                  </a:schemeClr>
+              <a:rPr lang="en-US" dirty="0">
+                <a:solidFill>
+                  <a:schemeClr val="bg1"/>
                 </a:solidFill>
               </a:rPr>
-              <a:t>POSTMAN (test https post)</a:t>
-            </a:r>
-          </a:p>
-          <a:p>
-            <a:pPr marL="285750" indent="-285750">
+              <a:t>Auto cleanup for change tracking performance improvements</a:t>
+            </a:r>
+          </a:p>
+          <a:p>
+            <a:pPr marL="742950" lvl="1" indent="-285750">
               <a:buFont typeface="Arial" panose="020B0604020202020204" pitchFamily="34" charset="0"/>
               <a:buChar char="•"/>
             </a:pPr>
             <a:r>
-              <a:rPr lang="en-US" u="sng" dirty="0">
-                <a:solidFill>
-                  <a:schemeClr val="accent2">
-                    <a:lumMod val="20000"/>
-                    <a:lumOff val="80000"/>
-                  </a:schemeClr>
+              <a:rPr lang="en-US" dirty="0">
+                <a:solidFill>
+                  <a:schemeClr val="bg1"/>
                 </a:solidFill>
               </a:rPr>
-              <a:t>SP_CONFIGURE</a:t>
-            </a:r>
-          </a:p>
-          <a:p>
-            <a:pPr marL="285750" indent="-285750">
+              <a:t>Columnstore </a:t>
+            </a:r>
+            <a:r>
+              <a:rPr lang="en-US" dirty="0" err="1">
+                <a:solidFill>
+                  <a:schemeClr val="bg1"/>
+                </a:solidFill>
+              </a:rPr>
+              <a:t>improvents</a:t>
+            </a:r>
+            <a:endParaRPr lang="en-US" dirty="0">
+              <a:solidFill>
+                <a:schemeClr val="bg1"/>
+              </a:solidFill>
+            </a:endParaRPr>
+          </a:p>
+          <a:p>
+            <a:pPr marL="742950" lvl="1" indent="-285750">
               <a:buFont typeface="Arial" panose="020B0604020202020204" pitchFamily="34" charset="0"/>
               <a:buChar char="•"/>
             </a:pPr>
             <a:r>
-              <a:rPr lang="en-US" u="sng" dirty="0">
-                <a:solidFill>
-                  <a:schemeClr val="accent2">
-                    <a:lumMod val="20000"/>
-                    <a:lumOff val="80000"/>
-                  </a:schemeClr>
+              <a:rPr lang="en-US" dirty="0">
+                <a:solidFill>
+                  <a:schemeClr val="bg1"/>
                 </a:solidFill>
               </a:rPr>
-              <a:t>	external rest endpoint enabled</a:t>
-            </a:r>
-          </a:p>
-          <a:p>
-            <a:pPr marL="285750" indent="-285750">
+              <a:t>Can now remove In-Memory OLTP if all In-Memory OLTP objects are dropped</a:t>
+            </a:r>
+          </a:p>
+          <a:p>
+            <a:pPr marL="742950" lvl="1" indent="-285750">
               <a:buFont typeface="Arial" panose="020B0604020202020204" pitchFamily="34" charset="0"/>
               <a:buChar char="•"/>
             </a:pPr>
             <a:r>
-              <a:rPr lang="en-US" u="sng" dirty="0">
-                <a:solidFill>
-                  <a:schemeClr val="accent2">
-                    <a:lumMod val="20000"/>
-                    <a:lumOff val="80000"/>
-                  </a:schemeClr>
+              <a:rPr lang="en-US" dirty="0" err="1">
+                <a:solidFill>
+                  <a:schemeClr val="bg1"/>
                 </a:solidFill>
               </a:rPr>
-              <a:t>Create External Model</a:t>
-            </a:r>
-          </a:p>
-          <a:p>
-            <a:pPr marL="285750" indent="-285750">
+              <a:t>Tmpfs</a:t>
+            </a:r>
+            <a:r>
+              <a:rPr lang="en-US" dirty="0">
+                <a:solidFill>
+                  <a:schemeClr val="bg1"/>
+                </a:solidFill>
+              </a:rPr>
+              <a:t> for TempDB support added in Linux</a:t>
+            </a:r>
+          </a:p>
+          <a:p>
+            <a:pPr marL="742950" lvl="1" indent="-285750">
               <a:buFont typeface="Arial" panose="020B0604020202020204" pitchFamily="34" charset="0"/>
               <a:buChar char="•"/>
             </a:pPr>
             <a:r>
-              <a:rPr lang="en-US" u="sng" dirty="0">
-                <a:solidFill>
-                  <a:schemeClr val="accent2">
-                    <a:lumMod val="20000"/>
-                    <a:lumOff val="80000"/>
-                  </a:schemeClr>
+              <a:rPr lang="en-US" dirty="0">
+                <a:solidFill>
+                  <a:schemeClr val="bg1"/>
                 </a:solidFill>
               </a:rPr>
-              <a:t>AI_GENERATE_EMBEDDINGS (test model)</a:t>
-            </a:r>
-          </a:p>
-          <a:p>
-            <a:endParaRPr lang="en-US" dirty="0"/>
+              <a:t>Backup support ZSTD compression (fast and better)</a:t>
+            </a:r>
+          </a:p>
+          <a:p>
+            <a:pPr marL="742950" lvl="1" indent="-285750">
+              <a:buFont typeface="Arial" panose="020B0604020202020204" pitchFamily="34" charset="0"/>
+              <a:buChar char="•"/>
+            </a:pPr>
+            <a:r>
+              <a:rPr lang="en-US" dirty="0">
+                <a:solidFill>
+                  <a:schemeClr val="bg1"/>
+                </a:solidFill>
+              </a:rPr>
+              <a:t>OPTIMIZED_SP_EXECUTESQL</a:t>
+            </a:r>
+          </a:p>
+          <a:p>
+            <a:pPr marL="742950" lvl="1" indent="-285750">
+              <a:buFont typeface="Arial" panose="020B0604020202020204" pitchFamily="34" charset="0"/>
+              <a:buChar char="•"/>
+            </a:pPr>
+            <a:r>
+              <a:rPr lang="en-US" dirty="0">
+                <a:solidFill>
+                  <a:schemeClr val="bg1"/>
+                </a:solidFill>
+              </a:rPr>
+              <a:t>Time-bound event sessions</a:t>
+            </a:r>
+          </a:p>
+          <a:p>
+            <a:pPr marL="742950" lvl="1" indent="-285750">
+              <a:buFont typeface="Arial" panose="020B0604020202020204" pitchFamily="34" charset="0"/>
+              <a:buChar char="•"/>
+            </a:pPr>
+            <a:endParaRPr lang="en-US" dirty="0">
+              <a:solidFill>
+                <a:schemeClr val="bg1"/>
+              </a:solidFill>
+            </a:endParaRPr>
           </a:p>
         </p:txBody>
       </p:sp>
     </p:spTree>
     <p:extLst>
       <p:ext uri="{BB962C8B-B14F-4D97-AF65-F5344CB8AC3E}">
-        <p14:creationId xmlns:p14="http://schemas.microsoft.com/office/powerpoint/2010/main" val="1587207474"/>
+        <p14:creationId xmlns:p14="http://schemas.microsoft.com/office/powerpoint/2010/main" val="392237563"/>
       </p:ext>
     </p:extLst>
   </p:cSld>
@@ -13633,7 +15302,13 @@
   <p:cSld>
     <p:spTree>
       <p:nvGrpSpPr>
-        <p:cNvPr id="1" name=""/>
+        <p:cNvPr id="1" name="">
+          <a:extLst>
+            <a:ext uri="{FF2B5EF4-FFF2-40B4-BE49-F238E27FC236}">
+              <a16:creationId xmlns:a16="http://schemas.microsoft.com/office/drawing/2014/main" id="{9B0B0224-16CB-8720-A663-468A2A0479F9}"/>
+            </a:ext>
+          </a:extLst>
+        </p:cNvPr>
         <p:cNvGrpSpPr/>
         <p:nvPr/>
       </p:nvGrpSpPr>
@@ -13647,10 +15322,10 @@
       </p:grpSpPr>
       <p:sp>
         <p:nvSpPr>
-          <p:cNvPr id="4" name="Subtitle 3">
+          <p:cNvPr id="2" name="Title 1">
             <a:extLst>
               <a:ext uri="{FF2B5EF4-FFF2-40B4-BE49-F238E27FC236}">
-                <a16:creationId xmlns:a16="http://schemas.microsoft.com/office/drawing/2014/main" id="{260D053B-A40A-3228-B6D5-3371B9EE2E56}"/>
+                <a16:creationId xmlns:a16="http://schemas.microsoft.com/office/drawing/2014/main" id="{CAB82E68-7125-029C-989C-AA6DC59D22C5}"/>
               </a:ext>
             </a:extLst>
           </p:cNvPr>
@@ -13658,13 +15333,13 @@
             <a:spLocks noGrp="1"/>
           </p:cNvSpPr>
           <p:nvPr>
-            <p:ph type="subTitle" idx="1"/>
+            <p:ph type="title"/>
           </p:nvPr>
         </p:nvSpPr>
         <p:spPr>
           <a:xfrm>
-            <a:off x="321868" y="3484615"/>
-            <a:ext cx="11562303" cy="2387865"/>
+            <a:off x="321869" y="579120"/>
+            <a:ext cx="11548261" cy="492596"/>
           </a:xfrm>
         </p:spPr>
         <p:txBody>
@@ -13673,17 +15348,17 @@
           <a:p>
             <a:r>
               <a:rPr lang="en-US" dirty="0"/>
-              <a:t>Vector Demo</a:t>
+              <a:t>What’s New SQL 2025 04</a:t>
             </a:r>
           </a:p>
         </p:txBody>
       </p:sp>
       <p:sp>
         <p:nvSpPr>
-          <p:cNvPr id="3" name="Slide Number Placeholder 2">
+          <p:cNvPr id="4" name="Slide Number Placeholder 3">
             <a:extLst>
               <a:ext uri="{FF2B5EF4-FFF2-40B4-BE49-F238E27FC236}">
-                <a16:creationId xmlns:a16="http://schemas.microsoft.com/office/drawing/2014/main" id="{A6A971A9-0C5C-DDFC-67F9-2E5A55F12F67}"/>
+                <a16:creationId xmlns:a16="http://schemas.microsoft.com/office/drawing/2014/main" id="{336E21A7-35C2-B9C2-AC49-C6394B617298}"/>
               </a:ext>
             </a:extLst>
           </p:cNvPr>
@@ -13694,12 +15369,7 @@
             <p:ph type="sldNum" sz="quarter" idx="12"/>
           </p:nvPr>
         </p:nvSpPr>
-        <p:spPr>
-          <a:xfrm>
-            <a:off x="9140971" y="6226198"/>
-            <a:ext cx="2743200" cy="365125"/>
-          </a:xfrm>
-        </p:spPr>
+        <p:spPr/>
         <p:txBody>
           <a:bodyPr/>
           <a:lstStyle/>
@@ -13715,36 +15385,203 @@
       </p:sp>
       <p:sp>
         <p:nvSpPr>
-          <p:cNvPr id="6" name="Title 5">
+          <p:cNvPr id="5" name="TextBox 4">
             <a:extLst>
               <a:ext uri="{FF2B5EF4-FFF2-40B4-BE49-F238E27FC236}">
-                <a16:creationId xmlns:a16="http://schemas.microsoft.com/office/drawing/2014/main" id="{C4899B60-87A1-1D6B-E090-52C6F97BCC72}"/>
+                <a16:creationId xmlns:a16="http://schemas.microsoft.com/office/drawing/2014/main" id="{105E2372-65B0-C4F4-C33F-9E6AB9C5C63A}"/>
               </a:ext>
             </a:extLst>
           </p:cNvPr>
-          <p:cNvSpPr>
-            <a:spLocks noGrp="1"/>
-          </p:cNvSpPr>
-          <p:nvPr>
-            <p:ph type="title"/>
-          </p:nvPr>
+          <p:cNvSpPr txBox="1"/>
+          <p:nvPr/>
         </p:nvSpPr>
-        <p:spPr/>
+        <p:spPr>
+          <a:xfrm>
+            <a:off x="688259" y="1632155"/>
+            <a:ext cx="9458632" cy="2862322"/>
+          </a:xfrm>
+          <a:prstGeom prst="rect">
+            <a:avLst/>
+          </a:prstGeom>
+          <a:noFill/>
+        </p:spPr>
         <p:txBody>
-          <a:bodyPr/>
+          <a:bodyPr wrap="square" rtlCol="0">
+            <a:spAutoFit/>
+          </a:bodyPr>
           <a:lstStyle/>
           <a:p>
-            <a:r>
-              <a:rPr lang="en-US" dirty="0"/>
-              <a:t>Basic</a:t>
-            </a:r>
+            <a:pPr marL="285750" indent="-285750">
+              <a:buFont typeface="Arial" panose="020B0604020202020204" pitchFamily="34" charset="0"/>
+              <a:buChar char="•"/>
+            </a:pPr>
+            <a:r>
+              <a:rPr lang="en-US" dirty="0">
+                <a:solidFill>
+                  <a:schemeClr val="bg1"/>
+                </a:solidFill>
+              </a:rPr>
+              <a:t>Query Store and intelligent query processing</a:t>
+            </a:r>
+          </a:p>
+          <a:p>
+            <a:pPr marL="742950" lvl="1" indent="-285750">
+              <a:buFont typeface="Arial" panose="020B0604020202020204" pitchFamily="34" charset="0"/>
+              <a:buChar char="•"/>
+            </a:pPr>
+            <a:r>
+              <a:rPr lang="en-US" dirty="0">
+                <a:solidFill>
+                  <a:schemeClr val="bg1"/>
+                </a:solidFill>
+              </a:rPr>
+              <a:t>Cardinality estimation (CE) feedback for expressions</a:t>
+            </a:r>
+          </a:p>
+          <a:p>
+            <a:pPr marL="742950" lvl="1" indent="-285750">
+              <a:buFont typeface="Arial" panose="020B0604020202020204" pitchFamily="34" charset="0"/>
+              <a:buChar char="•"/>
+            </a:pPr>
+            <a:r>
+              <a:rPr lang="en-US" dirty="0">
+                <a:solidFill>
+                  <a:schemeClr val="bg1"/>
+                </a:solidFill>
+              </a:rPr>
+              <a:t>Optional parameter plan optimization (OPPO)</a:t>
+            </a:r>
+          </a:p>
+          <a:p>
+            <a:pPr marL="742950" lvl="1" indent="-285750">
+              <a:buFont typeface="Arial" panose="020B0604020202020204" pitchFamily="34" charset="0"/>
+              <a:buChar char="•"/>
+            </a:pPr>
+            <a:r>
+              <a:rPr lang="en-US" dirty="0">
+                <a:solidFill>
+                  <a:schemeClr val="bg1"/>
+                </a:solidFill>
+              </a:rPr>
+              <a:t>DOP on by default</a:t>
+            </a:r>
+          </a:p>
+          <a:p>
+            <a:pPr marL="742950" lvl="1" indent="-285750">
+              <a:buFont typeface="Arial" panose="020B0604020202020204" pitchFamily="34" charset="0"/>
+              <a:buChar char="•"/>
+            </a:pPr>
+            <a:r>
+              <a:rPr lang="en-US" dirty="0" err="1">
+                <a:solidFill>
+                  <a:schemeClr val="bg1"/>
+                </a:solidFill>
+              </a:rPr>
+              <a:t>QueryStore</a:t>
+            </a:r>
+            <a:r>
+              <a:rPr lang="en-US" dirty="0">
+                <a:solidFill>
+                  <a:schemeClr val="bg1"/>
+                </a:solidFill>
+              </a:rPr>
+              <a:t> for readable secondaries on by default</a:t>
+            </a:r>
+          </a:p>
+          <a:p>
+            <a:pPr marL="742950" lvl="1" indent="-285750">
+              <a:buFont typeface="Arial" panose="020B0604020202020204" pitchFamily="34" charset="0"/>
+              <a:buChar char="•"/>
+            </a:pPr>
+            <a:r>
+              <a:rPr lang="en-US" dirty="0">
+                <a:solidFill>
+                  <a:schemeClr val="bg1"/>
+                </a:solidFill>
+              </a:rPr>
+              <a:t>ABORT_QUERY_EXECUTION query hint</a:t>
+            </a:r>
+          </a:p>
+          <a:p>
+            <a:pPr marL="742950" lvl="1" indent="-285750">
+              <a:buFont typeface="Arial" panose="020B0604020202020204" pitchFamily="34" charset="0"/>
+              <a:buChar char="•"/>
+            </a:pPr>
+            <a:endParaRPr lang="en-US" dirty="0">
+              <a:solidFill>
+                <a:schemeClr val="bg1"/>
+              </a:solidFill>
+            </a:endParaRPr>
+          </a:p>
+          <a:p>
+            <a:pPr marL="742950" lvl="1" indent="-285750">
+              <a:buFont typeface="Arial" panose="020B0604020202020204" pitchFamily="34" charset="0"/>
+              <a:buChar char="•"/>
+            </a:pPr>
+            <a:endParaRPr lang="en-US" dirty="0">
+              <a:solidFill>
+                <a:schemeClr val="bg1"/>
+              </a:solidFill>
+            </a:endParaRPr>
+          </a:p>
+          <a:p>
+            <a:pPr marL="742950" lvl="1" indent="-285750">
+              <a:buFont typeface="Arial" panose="020B0604020202020204" pitchFamily="34" charset="0"/>
+              <a:buChar char="•"/>
+            </a:pPr>
+            <a:endParaRPr lang="en-US" dirty="0">
+              <a:solidFill>
+                <a:schemeClr val="bg1"/>
+              </a:solidFill>
+            </a:endParaRPr>
+          </a:p>
+          <a:p>
+            <a:pPr marL="742950" lvl="1" indent="-285750">
+              <a:buFont typeface="Arial" panose="020B0604020202020204" pitchFamily="34" charset="0"/>
+              <a:buChar char="•"/>
+            </a:pPr>
+            <a:endParaRPr lang="en-US" dirty="0">
+              <a:solidFill>
+                <a:schemeClr val="bg1"/>
+              </a:solidFill>
+            </a:endParaRPr>
           </a:p>
         </p:txBody>
       </p:sp>
+      <p:pic>
+        <p:nvPicPr>
+          <p:cNvPr id="6" name="Picture 5" descr="A group of rectangular signs&#10;&#10;AI-generated content may be incorrect.">
+            <a:extLst>
+              <a:ext uri="{FF2B5EF4-FFF2-40B4-BE49-F238E27FC236}">
+                <a16:creationId xmlns:a16="http://schemas.microsoft.com/office/drawing/2014/main" id="{A08D6B74-17C4-A824-601E-62521008AAA9}"/>
+              </a:ext>
+            </a:extLst>
+          </p:cNvPr>
+          <p:cNvPicPr>
+            <a:picLocks noChangeAspect="1"/>
+          </p:cNvPicPr>
+          <p:nvPr/>
+        </p:nvPicPr>
+        <p:blipFill>
+          <a:blip r:embed="rId2"/>
+          <a:stretch>
+            <a:fillRect/>
+          </a:stretch>
+        </p:blipFill>
+        <p:spPr>
+          <a:xfrm>
+            <a:off x="1163125" y="3518144"/>
+            <a:ext cx="7764566" cy="2760735"/>
+          </a:xfrm>
+          <a:prstGeom prst="rect">
+            <a:avLst/>
+          </a:prstGeom>
+        </p:spPr>
+      </p:pic>
     </p:spTree>
     <p:extLst>
       <p:ext uri="{BB962C8B-B14F-4D97-AF65-F5344CB8AC3E}">
-        <p14:creationId xmlns:p14="http://schemas.microsoft.com/office/powerpoint/2010/main" val="1397193754"/>
+        <p14:creationId xmlns:p14="http://schemas.microsoft.com/office/powerpoint/2010/main" val="1217385805"/>
       </p:ext>
     </p:extLst>
   </p:cSld>
@@ -13762,7 +15599,7 @@
         <p:cNvPr id="1" name="">
           <a:extLst>
             <a:ext uri="{FF2B5EF4-FFF2-40B4-BE49-F238E27FC236}">
-              <a16:creationId xmlns:a16="http://schemas.microsoft.com/office/drawing/2014/main" id="{1463BA05-8292-8036-4638-B6C9D9C49311}"/>
+              <a16:creationId xmlns:a16="http://schemas.microsoft.com/office/drawing/2014/main" id="{91CE759C-6F71-2C2A-8F81-8E4AF2E383E3}"/>
             </a:ext>
           </a:extLst>
         </p:cNvPr>
@@ -13779,10 +15616,10 @@
       </p:grpSpPr>
       <p:sp>
         <p:nvSpPr>
-          <p:cNvPr id="4" name="Subtitle 3">
+          <p:cNvPr id="2" name="Title 1">
             <a:extLst>
               <a:ext uri="{FF2B5EF4-FFF2-40B4-BE49-F238E27FC236}">
-                <a16:creationId xmlns:a16="http://schemas.microsoft.com/office/drawing/2014/main" id="{E2C49E47-25FF-8858-00AF-45AB41BFB913}"/>
+                <a16:creationId xmlns:a16="http://schemas.microsoft.com/office/drawing/2014/main" id="{2B95760D-3614-86EC-BD65-8AE9B33D9DF7}"/>
               </a:ext>
             </a:extLst>
           </p:cNvPr>
@@ -13790,13 +15627,13 @@
             <a:spLocks noGrp="1"/>
           </p:cNvSpPr>
           <p:nvPr>
-            <p:ph type="subTitle" idx="1"/>
+            <p:ph type="title"/>
           </p:nvPr>
         </p:nvSpPr>
         <p:spPr>
           <a:xfrm>
-            <a:off x="321868" y="3484615"/>
-            <a:ext cx="11562303" cy="2387865"/>
+            <a:off x="321869" y="579120"/>
+            <a:ext cx="11548261" cy="492596"/>
           </a:xfrm>
         </p:spPr>
         <p:txBody>
@@ -13805,17 +15642,17 @@
           <a:p>
             <a:r>
               <a:rPr lang="en-US" dirty="0"/>
-              <a:t>Vector Demo</a:t>
+              <a:t>What’s New SQL 2025 05</a:t>
             </a:r>
           </a:p>
         </p:txBody>
       </p:sp>
       <p:sp>
         <p:nvSpPr>
-          <p:cNvPr id="3" name="Slide Number Placeholder 2">
+          <p:cNvPr id="4" name="Slide Number Placeholder 3">
             <a:extLst>
               <a:ext uri="{FF2B5EF4-FFF2-40B4-BE49-F238E27FC236}">
-                <a16:creationId xmlns:a16="http://schemas.microsoft.com/office/drawing/2014/main" id="{BAFC85C7-C248-CD85-78E8-3EFF86F4459D}"/>
+                <a16:creationId xmlns:a16="http://schemas.microsoft.com/office/drawing/2014/main" id="{268D9CF2-5DEF-1A96-C887-F45C9C147FFD}"/>
               </a:ext>
             </a:extLst>
           </p:cNvPr>
@@ -13826,12 +15663,7 @@
             <p:ph type="sldNum" sz="quarter" idx="12"/>
           </p:nvPr>
         </p:nvSpPr>
-        <p:spPr>
-          <a:xfrm>
-            <a:off x="9140971" y="6226198"/>
-            <a:ext cx="2743200" cy="365125"/>
-          </a:xfrm>
-        </p:spPr>
+        <p:spPr/>
         <p:txBody>
           <a:bodyPr/>
           <a:lstStyle/>
@@ -13847,28 +15679,252 @@
       </p:sp>
       <p:sp>
         <p:nvSpPr>
-          <p:cNvPr id="6" name="Title 5">
+          <p:cNvPr id="5" name="TextBox 4">
             <a:extLst>
               <a:ext uri="{FF2B5EF4-FFF2-40B4-BE49-F238E27FC236}">
-                <a16:creationId xmlns:a16="http://schemas.microsoft.com/office/drawing/2014/main" id="{B501F9F2-6D3B-BC2E-57E0-E63F5B004867}"/>
+                <a16:creationId xmlns:a16="http://schemas.microsoft.com/office/drawing/2014/main" id="{6198BE56-0DF9-8DF3-46BF-21B798917A3A}"/>
               </a:ext>
             </a:extLst>
           </p:cNvPr>
-          <p:cNvSpPr>
-            <a:spLocks noGrp="1"/>
-          </p:cNvSpPr>
-          <p:nvPr>
-            <p:ph type="title"/>
-          </p:nvPr>
+          <p:cNvSpPr txBox="1"/>
+          <p:nvPr/>
         </p:nvSpPr>
-        <p:spPr/>
+        <p:spPr>
+          <a:xfrm>
+            <a:off x="688258" y="1632155"/>
+            <a:ext cx="9576619" cy="4247317"/>
+          </a:xfrm>
+          <a:prstGeom prst="rect">
+            <a:avLst/>
+          </a:prstGeom>
+          <a:noFill/>
+        </p:spPr>
         <p:txBody>
-          <a:bodyPr/>
+          <a:bodyPr wrap="square" rtlCol="0">
+            <a:spAutoFit/>
+          </a:bodyPr>
           <a:lstStyle/>
           <a:p>
-            <a:r>
-              <a:rPr lang="en-US" dirty="0"/>
-              <a:t>LLM SETUP</a:t>
+            <a:pPr marL="285750" indent="-285750">
+              <a:buFont typeface="Arial" panose="020B0604020202020204" pitchFamily="34" charset="0"/>
+              <a:buChar char="•"/>
+            </a:pPr>
+            <a:r>
+              <a:rPr lang="en-US" dirty="0">
+                <a:solidFill>
+                  <a:schemeClr val="bg1"/>
+                </a:solidFill>
+              </a:rPr>
+              <a:t>Language</a:t>
+            </a:r>
+          </a:p>
+          <a:p>
+            <a:pPr marL="742950" lvl="1" indent="-285750">
+              <a:buFont typeface="Arial" panose="020B0604020202020204" pitchFamily="34" charset="0"/>
+              <a:buChar char="•"/>
+            </a:pPr>
+            <a:r>
+              <a:rPr lang="en-US" dirty="0">
+                <a:solidFill>
+                  <a:schemeClr val="bg1"/>
+                </a:solidFill>
+              </a:rPr>
+              <a:t>Vector and AI models (coming up)</a:t>
+            </a:r>
+          </a:p>
+          <a:p>
+            <a:pPr marL="742950" lvl="1" indent="-285750">
+              <a:buFont typeface="Arial" panose="020B0604020202020204" pitchFamily="34" charset="0"/>
+              <a:buChar char="•"/>
+            </a:pPr>
+            <a:r>
+              <a:rPr lang="en-US" dirty="0">
+                <a:solidFill>
+                  <a:schemeClr val="bg1"/>
+                </a:solidFill>
+              </a:rPr>
+              <a:t>JSON (coming up)</a:t>
+            </a:r>
+          </a:p>
+          <a:p>
+            <a:pPr marL="742950" lvl="1" indent="-285750">
+              <a:buFont typeface="Arial" panose="020B0604020202020204" pitchFamily="34" charset="0"/>
+              <a:buChar char="•"/>
+            </a:pPr>
+            <a:r>
+              <a:rPr lang="en-US" dirty="0">
+                <a:solidFill>
+                  <a:schemeClr val="bg1"/>
+                </a:solidFill>
+              </a:rPr>
+              <a:t>SUBSTRING length is now optional</a:t>
+            </a:r>
+          </a:p>
+          <a:p>
+            <a:pPr marL="742950" lvl="1" indent="-285750">
+              <a:buFont typeface="Arial" panose="020B0604020202020204" pitchFamily="34" charset="0"/>
+              <a:buChar char="•"/>
+            </a:pPr>
+            <a:r>
+              <a:rPr lang="en-US" dirty="0">
+                <a:solidFill>
+                  <a:schemeClr val="bg1"/>
+                </a:solidFill>
+              </a:rPr>
+              <a:t>DATEADD supports </a:t>
+            </a:r>
+            <a:r>
+              <a:rPr lang="en-US" dirty="0" err="1">
+                <a:solidFill>
+                  <a:schemeClr val="bg1"/>
+                </a:solidFill>
+              </a:rPr>
+              <a:t>bigint</a:t>
+            </a:r>
+            <a:endParaRPr lang="en-US" dirty="0">
+              <a:solidFill>
+                <a:schemeClr val="bg1"/>
+              </a:solidFill>
+            </a:endParaRPr>
+          </a:p>
+          <a:p>
+            <a:pPr marL="742950" lvl="1" indent="-285750">
+              <a:buFont typeface="Arial" panose="020B0604020202020204" pitchFamily="34" charset="0"/>
+              <a:buChar char="•"/>
+            </a:pPr>
+            <a:r>
+              <a:rPr lang="en-US" dirty="0">
+                <a:solidFill>
+                  <a:schemeClr val="bg1"/>
+                </a:solidFill>
+              </a:rPr>
+              <a:t>UNISTR support UNICODE</a:t>
+            </a:r>
+          </a:p>
+          <a:p>
+            <a:pPr marL="742950" lvl="1" indent="-285750">
+              <a:buFont typeface="Arial" panose="020B0604020202020204" pitchFamily="34" charset="0"/>
+              <a:buChar char="•"/>
+            </a:pPr>
+            <a:r>
+              <a:rPr lang="en-US" dirty="0">
+                <a:solidFill>
+                  <a:schemeClr val="bg1"/>
+                </a:solidFill>
+              </a:rPr>
+              <a:t>PRODUCT new function</a:t>
+            </a:r>
+          </a:p>
+          <a:p>
+            <a:pPr marL="742950" lvl="1" indent="-285750">
+              <a:buFont typeface="Arial" panose="020B0604020202020204" pitchFamily="34" charset="0"/>
+              <a:buChar char="•"/>
+            </a:pPr>
+            <a:r>
+              <a:rPr lang="en-US" dirty="0">
+                <a:solidFill>
+                  <a:schemeClr val="bg1"/>
+                </a:solidFill>
+              </a:rPr>
+              <a:t>CURRENT_DATE new function</a:t>
+            </a:r>
+          </a:p>
+          <a:p>
+            <a:pPr marL="742950" lvl="1" indent="-285750">
+              <a:buFont typeface="Arial" panose="020B0604020202020204" pitchFamily="34" charset="0"/>
+              <a:buChar char="•"/>
+            </a:pPr>
+            <a:r>
+              <a:rPr lang="en-US" dirty="0">
+                <a:solidFill>
+                  <a:schemeClr val="bg1"/>
+                </a:solidFill>
+              </a:rPr>
+              <a:t>BASE64_ENCODE and BASE64_DECODE new function for database in Fabric</a:t>
+            </a:r>
+          </a:p>
+          <a:p>
+            <a:pPr marL="742950" lvl="1" indent="-285750">
+              <a:buFont typeface="Arial" panose="020B0604020202020204" pitchFamily="34" charset="0"/>
+              <a:buChar char="•"/>
+            </a:pPr>
+            <a:r>
+              <a:rPr lang="en-US" dirty="0">
+                <a:solidFill>
+                  <a:schemeClr val="bg1"/>
+                </a:solidFill>
+              </a:rPr>
+              <a:t>|| (String concatenation)</a:t>
+            </a:r>
+          </a:p>
+          <a:p>
+            <a:pPr marL="742950" lvl="1" indent="-285750">
+              <a:buFont typeface="Arial" panose="020B0604020202020204" pitchFamily="34" charset="0"/>
+              <a:buChar char="•"/>
+            </a:pPr>
+            <a:r>
+              <a:rPr lang="en-US" dirty="0">
+                <a:solidFill>
+                  <a:schemeClr val="bg1"/>
+                </a:solidFill>
+              </a:rPr>
+              <a:t>PREVIEW_FEATURES = { ON | OFF } </a:t>
+            </a:r>
+          </a:p>
+          <a:p>
+            <a:pPr marL="285750" indent="-285750">
+              <a:buFont typeface="Arial" panose="020B0604020202020204" pitchFamily="34" charset="0"/>
+              <a:buChar char="•"/>
+            </a:pPr>
+            <a:r>
+              <a:rPr lang="en-US" dirty="0">
+                <a:solidFill>
+                  <a:schemeClr val="bg1"/>
+                </a:solidFill>
+              </a:rPr>
+              <a:t>Fabric Mirroring performance enhancements</a:t>
+            </a:r>
+          </a:p>
+          <a:p>
+            <a:pPr marL="285750" indent="-285750">
+              <a:buFont typeface="Arial" panose="020B0604020202020204" pitchFamily="34" charset="0"/>
+              <a:buChar char="•"/>
+            </a:pPr>
+            <a:r>
+              <a:rPr lang="en-US" dirty="0">
+                <a:solidFill>
+                  <a:schemeClr val="bg1"/>
+                </a:solidFill>
+              </a:rPr>
+              <a:t>SSAS improvement</a:t>
+            </a:r>
+          </a:p>
+          <a:p>
+            <a:pPr marL="285750" indent="-285750">
+              <a:buFont typeface="Arial" panose="020B0604020202020204" pitchFamily="34" charset="0"/>
+              <a:buChar char="•"/>
+            </a:pPr>
+            <a:r>
+              <a:rPr lang="en-US" dirty="0">
+                <a:solidFill>
+                  <a:schemeClr val="bg1"/>
+                </a:solidFill>
+              </a:rPr>
+              <a:t>SSRS moving to PBIRS  (SSRS on SQL 2022 end of life 1/11/33)</a:t>
+            </a:r>
+          </a:p>
+          <a:p>
+            <a:pPr marL="285750" indent="-285750">
+              <a:buFont typeface="Arial" panose="020B0604020202020204" pitchFamily="34" charset="0"/>
+              <a:buChar char="•"/>
+            </a:pPr>
+            <a:r>
+              <a:rPr lang="en-US" dirty="0">
+                <a:solidFill>
+                  <a:schemeClr val="bg1"/>
+                </a:solidFill>
+              </a:rPr>
+              <a:t>SSIS number of changes older things are being deprecated</a:t>
             </a:r>
           </a:p>
         </p:txBody>
@@ -13876,7 +15932,7 @@
     </p:spTree>
     <p:extLst>
       <p:ext uri="{BB962C8B-B14F-4D97-AF65-F5344CB8AC3E}">
-        <p14:creationId xmlns:p14="http://schemas.microsoft.com/office/powerpoint/2010/main" val="3587703786"/>
+        <p14:creationId xmlns:p14="http://schemas.microsoft.com/office/powerpoint/2010/main" val="1970751310"/>
       </p:ext>
     </p:extLst>
   </p:cSld>
@@ -14678,15 +16734,6 @@
 </file>
 
 <file path=customXml/item1.xml><?xml version="1.0" encoding="utf-8"?>
-<?mso-contentType ?>
-<FormTemplates xmlns="http://schemas.microsoft.com/sharepoint/v3/contenttype/forms">
-  <Display>DocumentLibraryForm</Display>
-  <Edit>DocumentLibraryForm</Edit>
-  <New>DocumentLibraryForm</New>
-</FormTemplates>
-</file>
-
-<file path=customXml/item2.xml><?xml version="1.0" encoding="utf-8"?>
 <p:properties xmlns:p="http://schemas.microsoft.com/office/2006/metadata/properties" xmlns:xsi="http://www.w3.org/2001/XMLSchema-instance" xmlns:pc="http://schemas.microsoft.com/office/infopath/2007/PartnerControls">
   <documentManagement>
     <_ip_UnifiedCompliancePolicyUIAction xmlns="http://schemas.microsoft.com/sharepoint/v3" xsi:nil="true"/>
@@ -14704,6 +16751,15 @@
     <MediaServiceKeyPoints xmlns="71af3243-3dd4-4a8d-8c0d-dd76da1f02a5" xsi:nil="true"/>
   </documentManagement>
 </p:properties>
+</file>
+
+<file path=customXml/item2.xml><?xml version="1.0" encoding="utf-8"?>
+<?mso-contentType ?>
+<FormTemplates xmlns="http://schemas.microsoft.com/sharepoint/v3/contenttype/forms">
+  <Display>DocumentLibraryForm</Display>
+  <Edit>DocumentLibraryForm</Edit>
+  <New>DocumentLibraryForm</New>
+</FormTemplates>
 </file>
 
 <file path=customXml/item3.xml><?xml version="1.0" encoding="utf-8"?>
@@ -15019,14 +17075,6 @@
 </file>
 
 <file path=customXml/itemProps1.xml><?xml version="1.0" encoding="utf-8"?>
-<ds:datastoreItem xmlns:ds="http://schemas.openxmlformats.org/officeDocument/2006/customXml" ds:itemID="{44137456-21FC-4AE2-8A94-BF06CAF2EB9B}">
-  <ds:schemaRefs>
-    <ds:schemaRef ds:uri="http://schemas.microsoft.com/sharepoint/v3/contenttype/forms"/>
-  </ds:schemaRefs>
-</ds:datastoreItem>
-</file>
-
-<file path=customXml/itemProps2.xml><?xml version="1.0" encoding="utf-8"?>
 <ds:datastoreItem xmlns:ds="http://schemas.openxmlformats.org/officeDocument/2006/customXml" ds:itemID="{E305301E-11B3-4B9D-A588-21F3C9809371}">
   <ds:schemaRefs>
     <ds:schemaRef ds:uri="http://schemas.microsoft.com/office/2006/metadata/properties"/>
@@ -15034,6 +17082,14 @@
     <ds:schemaRef ds:uri="http://schemas.microsoft.com/sharepoint/v3"/>
     <ds:schemaRef ds:uri="71af3243-3dd4-4a8d-8c0d-dd76da1f02a5"/>
     <ds:schemaRef ds:uri="230e9df3-be65-4c73-a93b-d1236ebd677e"/>
+  </ds:schemaRefs>
+</ds:datastoreItem>
+</file>
+
+<file path=customXml/itemProps2.xml><?xml version="1.0" encoding="utf-8"?>
+<ds:datastoreItem xmlns:ds="http://schemas.openxmlformats.org/officeDocument/2006/customXml" ds:itemID="{44137456-21FC-4AE2-8A94-BF06CAF2EB9B}">
+  <ds:schemaRefs>
+    <ds:schemaRef ds:uri="http://schemas.microsoft.com/sharepoint/v3/contenttype/forms"/>
   </ds:schemaRefs>
 </ds:datastoreItem>
 </file>

</xml_diff>